<commit_message>
added Pattern examples and worked on PPT
</commit_message>
<xml_diff>
--- a/presentation/Design Patterns.pptx
+++ b/presentation/Design Patterns.pptx
@@ -5,7 +5,7 @@
     <p:sldMasterId id="2147483660" r:id="rId1"/>
   </p:sldMasterIdLst>
   <p:notesMasterIdLst>
-    <p:notesMasterId r:id="rId10"/>
+    <p:notesMasterId r:id="rId19"/>
   </p:notesMasterIdLst>
   <p:sldIdLst>
     <p:sldId id="256" r:id="rId2"/>
@@ -15,7 +15,16 @@
     <p:sldId id="262" r:id="rId6"/>
     <p:sldId id="261" r:id="rId7"/>
     <p:sldId id="263" r:id="rId8"/>
-    <p:sldId id="259" r:id="rId9"/>
+    <p:sldId id="264" r:id="rId9"/>
+    <p:sldId id="265" r:id="rId10"/>
+    <p:sldId id="266" r:id="rId11"/>
+    <p:sldId id="267" r:id="rId12"/>
+    <p:sldId id="268" r:id="rId13"/>
+    <p:sldId id="269" r:id="rId14"/>
+    <p:sldId id="270" r:id="rId15"/>
+    <p:sldId id="271" r:id="rId16"/>
+    <p:sldId id="272" r:id="rId17"/>
+    <p:sldId id="259" r:id="rId18"/>
   </p:sldIdLst>
   <p:sldSz cx="9144000" cy="6858000" type="screen4x3"/>
   <p:notesSz cx="6858000" cy="9144000"/>
@@ -5374,6 +5383,220 @@
 </p:notes>
 </file>
 
+<file path=ppt/notesSlides/notesSlide3.xml><?xml version="1.0" encoding="utf-8"?>
+<p:notes xmlns:a="http://schemas.openxmlformats.org/drawingml/2006/main" xmlns:r="http://schemas.openxmlformats.org/officeDocument/2006/relationships" xmlns:p="http://schemas.openxmlformats.org/presentationml/2006/main">
+  <p:cSld>
+    <p:spTree>
+      <p:nvGrpSpPr>
+        <p:cNvPr id="1" name=""/>
+        <p:cNvGrpSpPr/>
+        <p:nvPr/>
+      </p:nvGrpSpPr>
+      <p:grpSpPr>
+        <a:xfrm>
+          <a:off x="0" y="0"/>
+          <a:ext cx="0" cy="0"/>
+          <a:chOff x="0" y="0"/>
+          <a:chExt cx="0" cy="0"/>
+        </a:xfrm>
+      </p:grpSpPr>
+      <p:sp>
+        <p:nvSpPr>
+          <p:cNvPr id="2" name="Folienbildplatzhalter 1"/>
+          <p:cNvSpPr>
+            <a:spLocks noGrp="1" noRot="1" noChangeAspect="1"/>
+          </p:cNvSpPr>
+          <p:nvPr>
+            <p:ph type="sldImg"/>
+          </p:nvPr>
+        </p:nvSpPr>
+        <p:spPr/>
+      </p:sp>
+      <p:sp>
+        <p:nvSpPr>
+          <p:cNvPr id="3" name="Notizenplatzhalter 2"/>
+          <p:cNvSpPr>
+            <a:spLocks noGrp="1"/>
+          </p:cNvSpPr>
+          <p:nvPr>
+            <p:ph type="body" idx="1"/>
+          </p:nvPr>
+        </p:nvSpPr>
+        <p:spPr/>
+        <p:txBody>
+          <a:bodyPr>
+            <a:normAutofit/>
+          </a:bodyPr>
+          <a:lstStyle/>
+          <a:p>
+            <a:r>
+              <a:rPr lang="en-US" sz="1200" b="1" i="0" kern="1200" dirty="0" smtClean="0">
+                <a:solidFill>
+                  <a:schemeClr val="tx1"/>
+                </a:solidFill>
+                <a:latin typeface="+mn-lt"/>
+                <a:ea typeface="+mn-ea"/>
+                <a:cs typeface="+mn-cs"/>
+              </a:rPr>
+              <a:t>Creational Patterns</a:t>
+            </a:r>
+            <a:r>
+              <a:rPr lang="en-US" dirty="0" smtClean="0"/>
+              <a:t/>
+            </a:r>
+            <a:br>
+              <a:rPr lang="en-US" dirty="0" smtClean="0"/>
+            </a:br>
+            <a:r>
+              <a:rPr lang="en-US" sz="1200" b="0" i="0" kern="1200" dirty="0" smtClean="0">
+                <a:solidFill>
+                  <a:schemeClr val="tx1"/>
+                </a:solidFill>
+                <a:latin typeface="+mn-lt"/>
+                <a:ea typeface="+mn-ea"/>
+                <a:cs typeface="+mn-cs"/>
+              </a:rPr>
+              <a:t>These design patterns provide a way to create objects while hiding the creation logic, rather than instantiating objects directly using new </a:t>
+            </a:r>
+            <a:r>
+              <a:rPr lang="en-US" sz="1200" b="0" i="0" kern="1200" dirty="0" err="1" smtClean="0">
+                <a:solidFill>
+                  <a:schemeClr val="tx1"/>
+                </a:solidFill>
+                <a:latin typeface="+mn-lt"/>
+                <a:ea typeface="+mn-ea"/>
+                <a:cs typeface="+mn-cs"/>
+              </a:rPr>
+              <a:t>opreator</a:t>
+            </a:r>
+            <a:r>
+              <a:rPr lang="en-US" sz="1200" b="0" i="0" kern="1200" dirty="0" smtClean="0">
+                <a:solidFill>
+                  <a:schemeClr val="tx1"/>
+                </a:solidFill>
+                <a:latin typeface="+mn-lt"/>
+                <a:ea typeface="+mn-ea"/>
+                <a:cs typeface="+mn-cs"/>
+              </a:rPr>
+              <a:t>. This gives program more flexibility in deciding which objects need to be created for a given use case.</a:t>
+            </a:r>
+          </a:p>
+          <a:p>
+            <a:endParaRPr lang="en-US" sz="1200" b="0" i="0" kern="1200" dirty="0" smtClean="0">
+              <a:solidFill>
+                <a:schemeClr val="tx1"/>
+              </a:solidFill>
+              <a:latin typeface="+mn-lt"/>
+              <a:ea typeface="+mn-ea"/>
+              <a:cs typeface="+mn-cs"/>
+            </a:endParaRPr>
+          </a:p>
+          <a:p>
+            <a:r>
+              <a:rPr lang="en-US" sz="1200" b="1" i="0" kern="1200" dirty="0" smtClean="0">
+                <a:solidFill>
+                  <a:schemeClr val="tx1"/>
+                </a:solidFill>
+                <a:latin typeface="+mn-lt"/>
+                <a:ea typeface="+mn-ea"/>
+                <a:cs typeface="+mn-cs"/>
+              </a:rPr>
+              <a:t>Structural Patterns</a:t>
+            </a:r>
+            <a:r>
+              <a:rPr lang="en-US" dirty="0" smtClean="0"/>
+              <a:t/>
+            </a:r>
+            <a:br>
+              <a:rPr lang="en-US" dirty="0" smtClean="0"/>
+            </a:br>
+            <a:r>
+              <a:rPr lang="en-US" sz="1200" b="0" i="0" kern="1200" dirty="0" smtClean="0">
+                <a:solidFill>
+                  <a:schemeClr val="tx1"/>
+                </a:solidFill>
+                <a:latin typeface="+mn-lt"/>
+                <a:ea typeface="+mn-ea"/>
+                <a:cs typeface="+mn-cs"/>
+              </a:rPr>
+              <a:t>These design patterns concern class and object composition. Concept of inheritance is used to compose interfaces and define ways to compose objects to obtain new functionalities.</a:t>
+            </a:r>
+          </a:p>
+          <a:p>
+            <a:endParaRPr lang="en-US" sz="1200" b="0" i="0" kern="1200" dirty="0" smtClean="0">
+              <a:solidFill>
+                <a:schemeClr val="tx1"/>
+              </a:solidFill>
+              <a:latin typeface="+mn-lt"/>
+              <a:ea typeface="+mn-ea"/>
+              <a:cs typeface="+mn-cs"/>
+            </a:endParaRPr>
+          </a:p>
+          <a:p>
+            <a:r>
+              <a:rPr lang="en-US" sz="1200" b="1" i="0" kern="1200" dirty="0" smtClean="0">
+                <a:solidFill>
+                  <a:schemeClr val="tx1"/>
+                </a:solidFill>
+                <a:latin typeface="+mn-lt"/>
+                <a:ea typeface="+mn-ea"/>
+                <a:cs typeface="+mn-cs"/>
+              </a:rPr>
+              <a:t>Behavioral Patterns</a:t>
+            </a:r>
+            <a:r>
+              <a:rPr lang="en-US" dirty="0" smtClean="0"/>
+              <a:t/>
+            </a:r>
+            <a:br>
+              <a:rPr lang="en-US" dirty="0" smtClean="0"/>
+            </a:br>
+            <a:r>
+              <a:rPr lang="en-US" sz="1200" b="0" i="0" kern="1200" dirty="0" smtClean="0">
+                <a:solidFill>
+                  <a:schemeClr val="tx1"/>
+                </a:solidFill>
+                <a:latin typeface="+mn-lt"/>
+                <a:ea typeface="+mn-ea"/>
+                <a:cs typeface="+mn-cs"/>
+              </a:rPr>
+              <a:t>These design patterns are specifically concerned with communication between objects.</a:t>
+            </a:r>
+            <a:endParaRPr lang="de-DE" dirty="0"/>
+          </a:p>
+        </p:txBody>
+      </p:sp>
+      <p:sp>
+        <p:nvSpPr>
+          <p:cNvPr id="4" name="Foliennummernplatzhalter 3"/>
+          <p:cNvSpPr>
+            <a:spLocks noGrp="1"/>
+          </p:cNvSpPr>
+          <p:nvPr>
+            <p:ph type="sldNum" sz="quarter" idx="10"/>
+          </p:nvPr>
+        </p:nvSpPr>
+        <p:spPr/>
+        <p:txBody>
+          <a:bodyPr/>
+          <a:lstStyle/>
+          <a:p>
+            <a:fld id="{5652F815-8907-4933-9379-FDD7E595D6C2}" type="slidenum">
+              <a:rPr lang="de-DE" smtClean="0"/>
+              <a:t>7</a:t>
+            </a:fld>
+            <a:endParaRPr lang="de-DE"/>
+          </a:p>
+        </p:txBody>
+      </p:sp>
+    </p:spTree>
+  </p:cSld>
+  <p:clrMapOvr>
+    <a:masterClrMapping/>
+  </p:clrMapOvr>
+</p:notes>
+</file>
+
 <file path=ppt/slideLayouts/slideLayout1.xml><?xml version="1.0" encoding="utf-8"?>
 <p:sldLayout xmlns:a="http://schemas.openxmlformats.org/drawingml/2006/main" xmlns:r="http://schemas.openxmlformats.org/officeDocument/2006/relationships" xmlns:p="http://schemas.openxmlformats.org/presentationml/2006/main" showMasterSp="0" type="title" preserve="1">
   <p:cSld name="Titelfolie">
@@ -9454,6 +9677,1975 @@
 </p:sld>
 </file>
 
+<file path=ppt/slides/slide10.xml><?xml version="1.0" encoding="utf-8"?>
+<p:sld xmlns:a="http://schemas.openxmlformats.org/drawingml/2006/main" xmlns:r="http://schemas.openxmlformats.org/officeDocument/2006/relationships" xmlns:p="http://schemas.openxmlformats.org/presentationml/2006/main">
+  <p:cSld>
+    <p:spTree>
+      <p:nvGrpSpPr>
+        <p:cNvPr id="1" name=""/>
+        <p:cNvGrpSpPr/>
+        <p:nvPr/>
+      </p:nvGrpSpPr>
+      <p:grpSpPr>
+        <a:xfrm>
+          <a:off x="0" y="0"/>
+          <a:ext cx="0" cy="0"/>
+          <a:chOff x="0" y="0"/>
+          <a:chExt cx="0" cy="0"/>
+        </a:xfrm>
+      </p:grpSpPr>
+      <p:sp>
+        <p:nvSpPr>
+          <p:cNvPr id="2" name="Titel 1"/>
+          <p:cNvSpPr>
+            <a:spLocks noGrp="1"/>
+          </p:cNvSpPr>
+          <p:nvPr>
+            <p:ph type="title"/>
+          </p:nvPr>
+        </p:nvSpPr>
+        <p:spPr/>
+        <p:txBody>
+          <a:bodyPr>
+            <a:normAutofit fontScale="90000"/>
+          </a:bodyPr>
+          <a:lstStyle/>
+          <a:p>
+            <a:r>
+              <a:rPr lang="en-US" smtClean="0"/>
+              <a:t>Important</a:t>
+            </a:r>
+            <a:r>
+              <a:rPr lang="en-US" smtClean="0"/>
+              <a:t> Design Patterns </a:t>
+            </a:r>
+            <a:r>
+              <a:rPr lang="en-US" smtClean="0"/>
+              <a:t>(</a:t>
+            </a:r>
+            <a:r>
+              <a:rPr lang="en-US" smtClean="0"/>
+              <a:t>for </a:t>
+            </a:r>
+            <a:r>
+              <a:rPr lang="en-US" smtClean="0"/>
+              <a:t>Java)</a:t>
+            </a:r>
+            <a:endParaRPr lang="en-US"/>
+          </a:p>
+        </p:txBody>
+      </p:sp>
+      <p:sp>
+        <p:nvSpPr>
+          <p:cNvPr id="3" name="Inhaltsplatzhalter 2"/>
+          <p:cNvSpPr>
+            <a:spLocks noGrp="1"/>
+          </p:cNvSpPr>
+          <p:nvPr>
+            <p:ph idx="1"/>
+          </p:nvPr>
+        </p:nvSpPr>
+        <p:spPr>
+          <a:xfrm>
+            <a:off x="457200" y="2249424"/>
+            <a:ext cx="5194920" cy="4325112"/>
+          </a:xfrm>
+        </p:spPr>
+        <p:txBody>
+          <a:bodyPr/>
+          <a:lstStyle/>
+          <a:p>
+            <a:r>
+              <a:rPr lang="en-US" dirty="0" smtClean="0"/>
+              <a:t>Composite</a:t>
+            </a:r>
+          </a:p>
+          <a:p>
+            <a:pPr lvl="2"/>
+            <a:r>
+              <a:rPr lang="en-US" dirty="0" smtClean="0"/>
+              <a:t>Represent a tree structure</a:t>
+            </a:r>
+          </a:p>
+          <a:p>
+            <a:pPr lvl="2"/>
+            <a:r>
+              <a:rPr lang="en-US" dirty="0" smtClean="0"/>
+              <a:t>User treats individual objects and compositions uniformly</a:t>
+            </a:r>
+          </a:p>
+          <a:p>
+            <a:pPr lvl="2"/>
+            <a:r>
+              <a:rPr lang="en-US" dirty="0" smtClean="0"/>
+              <a:t>Example:</a:t>
+            </a:r>
+            <a:br>
+              <a:rPr lang="en-US" dirty="0" smtClean="0"/>
+            </a:br>
+            <a:r>
+              <a:rPr lang="en-US" dirty="0" smtClean="0"/>
+              <a:t>Graphic components that are formed by other components also formed by components.</a:t>
+            </a:r>
+            <a:endParaRPr lang="en-US" dirty="0"/>
+          </a:p>
+        </p:txBody>
+      </p:sp>
+      <p:pic>
+        <p:nvPicPr>
+          <p:cNvPr id="26626" name="Picture 2" descr="Composite Pattern UML Diagram"/>
+          <p:cNvPicPr>
+            <a:picLocks noChangeAspect="1" noChangeArrowheads="1"/>
+          </p:cNvPicPr>
+          <p:nvPr/>
+        </p:nvPicPr>
+        <p:blipFill>
+          <a:blip r:embed="rId2" cstate="print"/>
+          <a:srcRect/>
+          <a:stretch>
+            <a:fillRect/>
+          </a:stretch>
+        </p:blipFill>
+        <p:spPr bwMode="auto">
+          <a:xfrm>
+            <a:off x="5652120" y="2236811"/>
+            <a:ext cx="3409950" cy="4000501"/>
+          </a:xfrm>
+          <a:prstGeom prst="rect">
+            <a:avLst/>
+          </a:prstGeom>
+          <a:noFill/>
+        </p:spPr>
+      </p:pic>
+      <p:pic>
+        <p:nvPicPr>
+          <p:cNvPr id="26627" name="Picture 3"/>
+          <p:cNvPicPr>
+            <a:picLocks noChangeAspect="1" noChangeArrowheads="1"/>
+          </p:cNvPicPr>
+          <p:nvPr/>
+        </p:nvPicPr>
+        <p:blipFill>
+          <a:blip r:embed="rId3" cstate="print"/>
+          <a:srcRect/>
+          <a:stretch>
+            <a:fillRect/>
+          </a:stretch>
+        </p:blipFill>
+        <p:spPr bwMode="auto">
+          <a:xfrm>
+            <a:off x="661796" y="2204864"/>
+            <a:ext cx="8352928" cy="3935647"/>
+          </a:xfrm>
+          <a:prstGeom prst="rect">
+            <a:avLst/>
+          </a:prstGeom>
+          <a:noFill/>
+          <a:ln w="9525">
+            <a:noFill/>
+            <a:miter lim="800000"/>
+            <a:headEnd/>
+            <a:tailEnd/>
+          </a:ln>
+        </p:spPr>
+      </p:pic>
+    </p:spTree>
+  </p:cSld>
+  <p:clrMapOvr>
+    <a:masterClrMapping/>
+  </p:clrMapOvr>
+  <p:timing>
+    <p:tnLst>
+      <p:par>
+        <p:cTn id="1" dur="indefinite" restart="never" nodeType="tmRoot">
+          <p:childTnLst>
+            <p:seq concurrent="1" nextAc="seek">
+              <p:cTn id="2" dur="indefinite" nodeType="mainSeq">
+                <p:childTnLst>
+                  <p:par>
+                    <p:cTn id="3" fill="hold">
+                      <p:stCondLst>
+                        <p:cond delay="indefinite"/>
+                      </p:stCondLst>
+                      <p:childTnLst>
+                        <p:par>
+                          <p:cTn id="4" fill="hold">
+                            <p:stCondLst>
+                              <p:cond delay="0"/>
+                            </p:stCondLst>
+                            <p:childTnLst>
+                              <p:par>
+                                <p:cTn id="5" presetID="1" presetClass="entr" presetSubtype="0" fill="hold" nodeType="clickEffect">
+                                  <p:stCondLst>
+                                    <p:cond delay="0"/>
+                                  </p:stCondLst>
+                                  <p:childTnLst>
+                                    <p:set>
+                                      <p:cBhvr>
+                                        <p:cTn id="6" dur="1" fill="hold">
+                                          <p:stCondLst>
+                                            <p:cond delay="0"/>
+                                          </p:stCondLst>
+                                        </p:cTn>
+                                        <p:tgtEl>
+                                          <p:spTgt spid="26627"/>
+                                        </p:tgtEl>
+                                        <p:attrNameLst>
+                                          <p:attrName>style.visibility</p:attrName>
+                                        </p:attrNameLst>
+                                      </p:cBhvr>
+                                      <p:to>
+                                        <p:strVal val="visible"/>
+                                      </p:to>
+                                    </p:set>
+                                  </p:childTnLst>
+                                </p:cTn>
+                              </p:par>
+                            </p:childTnLst>
+                          </p:cTn>
+                        </p:par>
+                      </p:childTnLst>
+                    </p:cTn>
+                  </p:par>
+                  <p:par>
+                    <p:cTn id="7" fill="hold">
+                      <p:stCondLst>
+                        <p:cond delay="indefinite"/>
+                      </p:stCondLst>
+                      <p:childTnLst>
+                        <p:par>
+                          <p:cTn id="8" fill="hold">
+                            <p:stCondLst>
+                              <p:cond delay="0"/>
+                            </p:stCondLst>
+                            <p:childTnLst>
+                              <p:par>
+                                <p:cTn id="9" presetID="1" presetClass="exit" presetSubtype="0" fill="hold" nodeType="clickEffect">
+                                  <p:stCondLst>
+                                    <p:cond delay="0"/>
+                                  </p:stCondLst>
+                                  <p:childTnLst>
+                                    <p:set>
+                                      <p:cBhvr>
+                                        <p:cTn id="10" dur="1" fill="hold">
+                                          <p:stCondLst>
+                                            <p:cond delay="0"/>
+                                          </p:stCondLst>
+                                        </p:cTn>
+                                        <p:tgtEl>
+                                          <p:spTgt spid="26627"/>
+                                        </p:tgtEl>
+                                        <p:attrNameLst>
+                                          <p:attrName>style.visibility</p:attrName>
+                                        </p:attrNameLst>
+                                      </p:cBhvr>
+                                      <p:to>
+                                        <p:strVal val="hidden"/>
+                                      </p:to>
+                                    </p:set>
+                                  </p:childTnLst>
+                                </p:cTn>
+                              </p:par>
+                            </p:childTnLst>
+                          </p:cTn>
+                        </p:par>
+                      </p:childTnLst>
+                    </p:cTn>
+                  </p:par>
+                </p:childTnLst>
+              </p:cTn>
+              <p:prevCondLst>
+                <p:cond evt="onPrev" delay="0">
+                  <p:tgtEl>
+                    <p:sldTgt/>
+                  </p:tgtEl>
+                </p:cond>
+              </p:prevCondLst>
+              <p:nextCondLst>
+                <p:cond evt="onNext" delay="0">
+                  <p:tgtEl>
+                    <p:sldTgt/>
+                  </p:tgtEl>
+                </p:cond>
+              </p:nextCondLst>
+            </p:seq>
+          </p:childTnLst>
+        </p:cTn>
+      </p:par>
+    </p:tnLst>
+  </p:timing>
+</p:sld>
+</file>
+
+<file path=ppt/slides/slide11.xml><?xml version="1.0" encoding="utf-8"?>
+<p:sld xmlns:a="http://schemas.openxmlformats.org/drawingml/2006/main" xmlns:r="http://schemas.openxmlformats.org/officeDocument/2006/relationships" xmlns:p="http://schemas.openxmlformats.org/presentationml/2006/main">
+  <p:cSld>
+    <p:spTree>
+      <p:nvGrpSpPr>
+        <p:cNvPr id="1" name=""/>
+        <p:cNvGrpSpPr/>
+        <p:nvPr/>
+      </p:nvGrpSpPr>
+      <p:grpSpPr>
+        <a:xfrm>
+          <a:off x="0" y="0"/>
+          <a:ext cx="0" cy="0"/>
+          <a:chOff x="0" y="0"/>
+          <a:chExt cx="0" cy="0"/>
+        </a:xfrm>
+      </p:grpSpPr>
+      <p:sp>
+        <p:nvSpPr>
+          <p:cNvPr id="6" name="Titel 5"/>
+          <p:cNvSpPr>
+            <a:spLocks noGrp="1"/>
+          </p:cNvSpPr>
+          <p:nvPr>
+            <p:ph type="title"/>
+          </p:nvPr>
+        </p:nvSpPr>
+        <p:spPr/>
+        <p:txBody>
+          <a:bodyPr/>
+          <a:lstStyle/>
+          <a:p>
+            <a:endParaRPr lang="de-DE"/>
+          </a:p>
+        </p:txBody>
+      </p:sp>
+      <p:sp>
+        <p:nvSpPr>
+          <p:cNvPr id="7" name="Inhaltsplatzhalter 6"/>
+          <p:cNvSpPr>
+            <a:spLocks noGrp="1"/>
+          </p:cNvSpPr>
+          <p:nvPr>
+            <p:ph idx="1"/>
+          </p:nvPr>
+        </p:nvSpPr>
+        <p:spPr/>
+        <p:txBody>
+          <a:bodyPr/>
+          <a:lstStyle/>
+          <a:p>
+            <a:endParaRPr lang="de-DE" dirty="0"/>
+          </a:p>
+        </p:txBody>
+      </p:sp>
+      <p:sp>
+        <p:nvSpPr>
+          <p:cNvPr id="9" name="Rechteck 8"/>
+          <p:cNvSpPr/>
+          <p:nvPr/>
+        </p:nvSpPr>
+        <p:spPr>
+          <a:xfrm>
+            <a:off x="0" y="0"/>
+            <a:ext cx="9144000" cy="6858000"/>
+          </a:xfrm>
+          <a:prstGeom prst="rect">
+            <a:avLst/>
+          </a:prstGeom>
+          <a:solidFill>
+            <a:schemeClr val="tx1"/>
+          </a:solidFill>
+          <a:ln>
+            <a:solidFill>
+              <a:schemeClr val="tx1"/>
+            </a:solidFill>
+          </a:ln>
+        </p:spPr>
+        <p:style>
+          <a:lnRef idx="2">
+            <a:schemeClr val="accent1">
+              <a:shade val="50000"/>
+            </a:schemeClr>
+          </a:lnRef>
+          <a:fillRef idx="1">
+            <a:schemeClr val="accent1"/>
+          </a:fillRef>
+          <a:effectRef idx="0">
+            <a:schemeClr val="accent1"/>
+          </a:effectRef>
+          <a:fontRef idx="minor">
+            <a:schemeClr val="lt1"/>
+          </a:fontRef>
+        </p:style>
+        <p:txBody>
+          <a:bodyPr rtlCol="0" anchor="ctr"/>
+          <a:lstStyle/>
+          <a:p>
+            <a:pPr algn="ctr"/>
+            <a:endParaRPr lang="de-DE"/>
+          </a:p>
+        </p:txBody>
+      </p:sp>
+      <p:pic>
+        <p:nvPicPr>
+          <p:cNvPr id="28675" name="Picture 3"/>
+          <p:cNvPicPr>
+            <a:picLocks noChangeAspect="1" noChangeArrowheads="1"/>
+          </p:cNvPicPr>
+          <p:nvPr/>
+        </p:nvPicPr>
+        <p:blipFill>
+          <a:blip r:embed="rId2" cstate="print"/>
+          <a:srcRect/>
+          <a:stretch>
+            <a:fillRect/>
+          </a:stretch>
+        </p:blipFill>
+        <p:spPr bwMode="auto">
+          <a:xfrm>
+            <a:off x="0" y="0"/>
+            <a:ext cx="5306012" cy="6858000"/>
+          </a:xfrm>
+          <a:prstGeom prst="rect">
+            <a:avLst/>
+          </a:prstGeom>
+          <a:noFill/>
+          <a:ln w="9525">
+            <a:noFill/>
+            <a:miter lim="800000"/>
+            <a:headEnd/>
+            <a:tailEnd/>
+          </a:ln>
+        </p:spPr>
+      </p:pic>
+      <p:pic>
+        <p:nvPicPr>
+          <p:cNvPr id="28676" name="Picture 4"/>
+          <p:cNvPicPr>
+            <a:picLocks noChangeAspect="1" noChangeArrowheads="1"/>
+          </p:cNvPicPr>
+          <p:nvPr/>
+        </p:nvPicPr>
+        <p:blipFill>
+          <a:blip r:embed="rId3" cstate="print"/>
+          <a:srcRect/>
+          <a:stretch>
+            <a:fillRect/>
+          </a:stretch>
+        </p:blipFill>
+        <p:spPr bwMode="auto">
+          <a:xfrm>
+            <a:off x="4139952" y="908720"/>
+            <a:ext cx="4608512" cy="1682884"/>
+          </a:xfrm>
+          <a:prstGeom prst="rect">
+            <a:avLst/>
+          </a:prstGeom>
+          <a:ln w="38100" cap="sq">
+            <a:solidFill>
+              <a:srgbClr val="000000"/>
+            </a:solidFill>
+            <a:prstDash val="solid"/>
+            <a:miter lim="800000"/>
+          </a:ln>
+          <a:effectLst>
+            <a:outerShdw blurRad="50800" dist="38100" dir="2700000" algn="tl" rotWithShape="0">
+              <a:srgbClr val="000000">
+                <a:alpha val="43000"/>
+              </a:srgbClr>
+            </a:outerShdw>
+          </a:effectLst>
+        </p:spPr>
+      </p:pic>
+    </p:spTree>
+  </p:cSld>
+  <p:clrMapOvr>
+    <a:masterClrMapping/>
+  </p:clrMapOvr>
+  <p:timing>
+    <p:tnLst>
+      <p:par>
+        <p:cTn id="1" dur="indefinite" restart="never" nodeType="tmRoot"/>
+      </p:par>
+    </p:tnLst>
+  </p:timing>
+</p:sld>
+</file>
+
+<file path=ppt/slides/slide12.xml><?xml version="1.0" encoding="utf-8"?>
+<p:sld xmlns:a="http://schemas.openxmlformats.org/drawingml/2006/main" xmlns:r="http://schemas.openxmlformats.org/officeDocument/2006/relationships" xmlns:p="http://schemas.openxmlformats.org/presentationml/2006/main">
+  <p:cSld>
+    <p:spTree>
+      <p:nvGrpSpPr>
+        <p:cNvPr id="1" name=""/>
+        <p:cNvGrpSpPr/>
+        <p:nvPr/>
+      </p:nvGrpSpPr>
+      <p:grpSpPr>
+        <a:xfrm>
+          <a:off x="0" y="0"/>
+          <a:ext cx="0" cy="0"/>
+          <a:chOff x="0" y="0"/>
+          <a:chExt cx="0" cy="0"/>
+        </a:xfrm>
+      </p:grpSpPr>
+      <p:sp>
+        <p:nvSpPr>
+          <p:cNvPr id="2" name="Titel 1"/>
+          <p:cNvSpPr>
+            <a:spLocks noGrp="1"/>
+          </p:cNvSpPr>
+          <p:nvPr>
+            <p:ph type="title"/>
+          </p:nvPr>
+        </p:nvSpPr>
+        <p:spPr/>
+        <p:txBody>
+          <a:bodyPr>
+            <a:normAutofit fontScale="90000"/>
+          </a:bodyPr>
+          <a:lstStyle/>
+          <a:p>
+            <a:r>
+              <a:rPr lang="en-US" dirty="0" smtClean="0"/>
+              <a:t>Important Design Patterns (for Java)</a:t>
+            </a:r>
+            <a:endParaRPr lang="en-US" dirty="0"/>
+          </a:p>
+        </p:txBody>
+      </p:sp>
+      <p:sp>
+        <p:nvSpPr>
+          <p:cNvPr id="3" name="Inhaltsplatzhalter 2"/>
+          <p:cNvSpPr>
+            <a:spLocks noGrp="1"/>
+          </p:cNvSpPr>
+          <p:nvPr>
+            <p:ph idx="1"/>
+          </p:nvPr>
+        </p:nvSpPr>
+        <p:spPr>
+          <a:xfrm>
+            <a:off x="457200" y="2249424"/>
+            <a:ext cx="8219256" cy="4325112"/>
+          </a:xfrm>
+        </p:spPr>
+        <p:txBody>
+          <a:bodyPr/>
+          <a:lstStyle/>
+          <a:p>
+            <a:r>
+              <a:rPr lang="en-US" dirty="0" smtClean="0"/>
+              <a:t>Decorator / Wrapper</a:t>
+            </a:r>
+          </a:p>
+          <a:p>
+            <a:pPr lvl="2"/>
+            <a:r>
+              <a:rPr lang="en-US" dirty="0" smtClean="0"/>
+              <a:t>Attach additional responsibilities to an object dynamically</a:t>
+            </a:r>
+            <a:br>
+              <a:rPr lang="en-US" dirty="0" smtClean="0"/>
+            </a:br>
+            <a:r>
+              <a:rPr lang="en-US" dirty="0" smtClean="0"/>
+              <a:t>(not to the whole class)</a:t>
+            </a:r>
+          </a:p>
+          <a:p>
+            <a:pPr lvl="2"/>
+            <a:r>
+              <a:rPr lang="en-US" dirty="0" smtClean="0"/>
+              <a:t>Alternative to </a:t>
+            </a:r>
+            <a:r>
+              <a:rPr lang="en-US" dirty="0" err="1" smtClean="0"/>
+              <a:t>subclassing</a:t>
+            </a:r>
+            <a:endParaRPr lang="en-US" dirty="0" smtClean="0"/>
+          </a:p>
+          <a:p>
+            <a:pPr lvl="2"/>
+            <a:r>
+              <a:rPr lang="en-US" dirty="0" smtClean="0"/>
+              <a:t>Allows nesting, because of recursion and transparency</a:t>
+            </a:r>
+          </a:p>
+        </p:txBody>
+      </p:sp>
+    </p:spTree>
+  </p:cSld>
+  <p:clrMapOvr>
+    <a:masterClrMapping/>
+  </p:clrMapOvr>
+  <p:timing>
+    <p:tnLst>
+      <p:par>
+        <p:cTn id="1" dur="indefinite" restart="never" nodeType="tmRoot"/>
+      </p:par>
+    </p:tnLst>
+  </p:timing>
+</p:sld>
+</file>
+
+<file path=ppt/slides/slide13.xml><?xml version="1.0" encoding="utf-8"?>
+<p:sld xmlns:a="http://schemas.openxmlformats.org/drawingml/2006/main" xmlns:r="http://schemas.openxmlformats.org/officeDocument/2006/relationships" xmlns:p="http://schemas.openxmlformats.org/presentationml/2006/main">
+  <p:cSld>
+    <p:spTree>
+      <p:nvGrpSpPr>
+        <p:cNvPr id="1" name=""/>
+        <p:cNvGrpSpPr/>
+        <p:nvPr/>
+      </p:nvGrpSpPr>
+      <p:grpSpPr>
+        <a:xfrm>
+          <a:off x="0" y="0"/>
+          <a:ext cx="0" cy="0"/>
+          <a:chOff x="0" y="0"/>
+          <a:chExt cx="0" cy="0"/>
+        </a:xfrm>
+      </p:grpSpPr>
+      <p:sp>
+        <p:nvSpPr>
+          <p:cNvPr id="2" name="Titel 1"/>
+          <p:cNvSpPr>
+            <a:spLocks noGrp="1"/>
+          </p:cNvSpPr>
+          <p:nvPr>
+            <p:ph type="title"/>
+          </p:nvPr>
+        </p:nvSpPr>
+        <p:spPr/>
+        <p:txBody>
+          <a:bodyPr>
+            <a:normAutofit fontScale="90000"/>
+          </a:bodyPr>
+          <a:lstStyle/>
+          <a:p>
+            <a:r>
+              <a:rPr lang="en-US" dirty="0" smtClean="0"/>
+              <a:t>Important Design Patterns (for Java)</a:t>
+            </a:r>
+            <a:endParaRPr lang="en-US" dirty="0"/>
+          </a:p>
+        </p:txBody>
+      </p:sp>
+      <p:pic>
+        <p:nvPicPr>
+          <p:cNvPr id="29699" name="Picture 3"/>
+          <p:cNvPicPr>
+            <a:picLocks noChangeAspect="1" noChangeArrowheads="1"/>
+          </p:cNvPicPr>
+          <p:nvPr/>
+        </p:nvPicPr>
+        <p:blipFill>
+          <a:blip r:embed="rId2" cstate="print"/>
+          <a:srcRect/>
+          <a:stretch>
+            <a:fillRect/>
+          </a:stretch>
+        </p:blipFill>
+        <p:spPr bwMode="auto">
+          <a:xfrm>
+            <a:off x="393898" y="2257772"/>
+            <a:ext cx="8210550" cy="3619500"/>
+          </a:xfrm>
+          <a:prstGeom prst="rect">
+            <a:avLst/>
+          </a:prstGeom>
+          <a:noFill/>
+          <a:ln w="9525">
+            <a:noFill/>
+            <a:miter lim="800000"/>
+            <a:headEnd/>
+            <a:tailEnd/>
+          </a:ln>
+        </p:spPr>
+      </p:pic>
+    </p:spTree>
+  </p:cSld>
+  <p:clrMapOvr>
+    <a:masterClrMapping/>
+  </p:clrMapOvr>
+  <p:timing>
+    <p:tnLst>
+      <p:par>
+        <p:cTn id="1" dur="indefinite" restart="never" nodeType="tmRoot"/>
+      </p:par>
+    </p:tnLst>
+  </p:timing>
+</p:sld>
+</file>
+
+<file path=ppt/slides/slide14.xml><?xml version="1.0" encoding="utf-8"?>
+<p:sld xmlns:a="http://schemas.openxmlformats.org/drawingml/2006/main" xmlns:r="http://schemas.openxmlformats.org/officeDocument/2006/relationships" xmlns:p="http://schemas.openxmlformats.org/presentationml/2006/main">
+  <p:cSld>
+    <p:spTree>
+      <p:nvGrpSpPr>
+        <p:cNvPr id="1" name=""/>
+        <p:cNvGrpSpPr/>
+        <p:nvPr/>
+      </p:nvGrpSpPr>
+      <p:grpSpPr>
+        <a:xfrm>
+          <a:off x="0" y="0"/>
+          <a:ext cx="0" cy="0"/>
+          <a:chOff x="0" y="0"/>
+          <a:chExt cx="0" cy="0"/>
+        </a:xfrm>
+      </p:grpSpPr>
+      <p:sp>
+        <p:nvSpPr>
+          <p:cNvPr id="6" name="Titel 5"/>
+          <p:cNvSpPr>
+            <a:spLocks noGrp="1"/>
+          </p:cNvSpPr>
+          <p:nvPr>
+            <p:ph type="title"/>
+          </p:nvPr>
+        </p:nvSpPr>
+        <p:spPr/>
+        <p:txBody>
+          <a:bodyPr/>
+          <a:lstStyle/>
+          <a:p>
+            <a:endParaRPr lang="de-DE"/>
+          </a:p>
+        </p:txBody>
+      </p:sp>
+      <p:sp>
+        <p:nvSpPr>
+          <p:cNvPr id="7" name="Inhaltsplatzhalter 6"/>
+          <p:cNvSpPr>
+            <a:spLocks noGrp="1"/>
+          </p:cNvSpPr>
+          <p:nvPr>
+            <p:ph idx="1"/>
+          </p:nvPr>
+        </p:nvSpPr>
+        <p:spPr/>
+        <p:txBody>
+          <a:bodyPr/>
+          <a:lstStyle/>
+          <a:p>
+            <a:endParaRPr lang="de-DE" dirty="0"/>
+          </a:p>
+        </p:txBody>
+      </p:sp>
+      <p:sp>
+        <p:nvSpPr>
+          <p:cNvPr id="9" name="Rechteck 8"/>
+          <p:cNvSpPr/>
+          <p:nvPr/>
+        </p:nvSpPr>
+        <p:spPr>
+          <a:xfrm>
+            <a:off x="0" y="0"/>
+            <a:ext cx="9144000" cy="6858000"/>
+          </a:xfrm>
+          <a:prstGeom prst="rect">
+            <a:avLst/>
+          </a:prstGeom>
+          <a:solidFill>
+            <a:schemeClr val="tx1"/>
+          </a:solidFill>
+          <a:ln>
+            <a:solidFill>
+              <a:schemeClr val="tx1"/>
+            </a:solidFill>
+          </a:ln>
+        </p:spPr>
+        <p:style>
+          <a:lnRef idx="2">
+            <a:schemeClr val="accent1">
+              <a:shade val="50000"/>
+            </a:schemeClr>
+          </a:lnRef>
+          <a:fillRef idx="1">
+            <a:schemeClr val="accent1"/>
+          </a:fillRef>
+          <a:effectRef idx="0">
+            <a:schemeClr val="accent1"/>
+          </a:effectRef>
+          <a:fontRef idx="minor">
+            <a:schemeClr val="lt1"/>
+          </a:fontRef>
+        </p:style>
+        <p:txBody>
+          <a:bodyPr rtlCol="0" anchor="ctr"/>
+          <a:lstStyle/>
+          <a:p>
+            <a:pPr algn="ctr"/>
+            <a:endParaRPr lang="de-DE"/>
+          </a:p>
+        </p:txBody>
+      </p:sp>
+      <p:pic>
+        <p:nvPicPr>
+          <p:cNvPr id="30722" name="Picture 2"/>
+          <p:cNvPicPr>
+            <a:picLocks noChangeAspect="1" noChangeArrowheads="1"/>
+          </p:cNvPicPr>
+          <p:nvPr/>
+        </p:nvPicPr>
+        <p:blipFill>
+          <a:blip r:embed="rId2" cstate="print"/>
+          <a:srcRect/>
+          <a:stretch>
+            <a:fillRect/>
+          </a:stretch>
+        </p:blipFill>
+        <p:spPr bwMode="auto">
+          <a:xfrm>
+            <a:off x="354807" y="260648"/>
+            <a:ext cx="2628900" cy="600075"/>
+          </a:xfrm>
+          <a:prstGeom prst="rect">
+            <a:avLst/>
+          </a:prstGeom>
+          <a:noFill/>
+          <a:ln w="9525">
+            <a:noFill/>
+            <a:miter lim="800000"/>
+            <a:headEnd/>
+            <a:tailEnd/>
+          </a:ln>
+        </p:spPr>
+      </p:pic>
+      <p:pic>
+        <p:nvPicPr>
+          <p:cNvPr id="30723" name="Picture 3"/>
+          <p:cNvPicPr>
+            <a:picLocks noChangeAspect="1" noChangeArrowheads="1"/>
+          </p:cNvPicPr>
+          <p:nvPr/>
+        </p:nvPicPr>
+        <p:blipFill>
+          <a:blip r:embed="rId3" cstate="print"/>
+          <a:srcRect/>
+          <a:stretch>
+            <a:fillRect/>
+          </a:stretch>
+        </p:blipFill>
+        <p:spPr bwMode="auto">
+          <a:xfrm>
+            <a:off x="323528" y="1340768"/>
+            <a:ext cx="2695575" cy="1333500"/>
+          </a:xfrm>
+          <a:prstGeom prst="rect">
+            <a:avLst/>
+          </a:prstGeom>
+          <a:noFill/>
+          <a:ln w="9525">
+            <a:noFill/>
+            <a:miter lim="800000"/>
+            <a:headEnd/>
+            <a:tailEnd/>
+          </a:ln>
+        </p:spPr>
+      </p:pic>
+      <p:pic>
+        <p:nvPicPr>
+          <p:cNvPr id="30724" name="Picture 4"/>
+          <p:cNvPicPr>
+            <a:picLocks noChangeAspect="1" noChangeArrowheads="1"/>
+          </p:cNvPicPr>
+          <p:nvPr/>
+        </p:nvPicPr>
+        <p:blipFill>
+          <a:blip r:embed="rId4" cstate="print"/>
+          <a:srcRect/>
+          <a:stretch>
+            <a:fillRect/>
+          </a:stretch>
+        </p:blipFill>
+        <p:spPr bwMode="auto">
+          <a:xfrm>
+            <a:off x="3995936" y="332656"/>
+            <a:ext cx="4057650" cy="2381250"/>
+          </a:xfrm>
+          <a:prstGeom prst="rect">
+            <a:avLst/>
+          </a:prstGeom>
+          <a:noFill/>
+          <a:ln w="9525">
+            <a:noFill/>
+            <a:miter lim="800000"/>
+            <a:headEnd/>
+            <a:tailEnd/>
+          </a:ln>
+        </p:spPr>
+      </p:pic>
+      <p:pic>
+        <p:nvPicPr>
+          <p:cNvPr id="30725" name="Picture 5"/>
+          <p:cNvPicPr>
+            <a:picLocks noChangeAspect="1" noChangeArrowheads="1"/>
+          </p:cNvPicPr>
+          <p:nvPr/>
+        </p:nvPicPr>
+        <p:blipFill>
+          <a:blip r:embed="rId5" cstate="print"/>
+          <a:srcRect/>
+          <a:stretch>
+            <a:fillRect/>
+          </a:stretch>
+        </p:blipFill>
+        <p:spPr bwMode="auto">
+          <a:xfrm>
+            <a:off x="773807" y="3501008"/>
+            <a:ext cx="4086225" cy="3257550"/>
+          </a:xfrm>
+          <a:prstGeom prst="rect">
+            <a:avLst/>
+          </a:prstGeom>
+          <a:noFill/>
+          <a:ln w="9525">
+            <a:noFill/>
+            <a:miter lim="800000"/>
+            <a:headEnd/>
+            <a:tailEnd/>
+          </a:ln>
+        </p:spPr>
+      </p:pic>
+      <p:pic>
+        <p:nvPicPr>
+          <p:cNvPr id="30726" name="Picture 6"/>
+          <p:cNvPicPr>
+            <a:picLocks noChangeAspect="1" noChangeArrowheads="1"/>
+          </p:cNvPicPr>
+          <p:nvPr/>
+        </p:nvPicPr>
+        <p:blipFill>
+          <a:blip r:embed="rId6" cstate="print"/>
+          <a:srcRect/>
+          <a:stretch>
+            <a:fillRect/>
+          </a:stretch>
+        </p:blipFill>
+        <p:spPr bwMode="auto">
+          <a:xfrm>
+            <a:off x="5076056" y="3501008"/>
+            <a:ext cx="3895725" cy="3238500"/>
+          </a:xfrm>
+          <a:prstGeom prst="rect">
+            <a:avLst/>
+          </a:prstGeom>
+          <a:noFill/>
+          <a:ln w="9525">
+            <a:noFill/>
+            <a:miter lim="800000"/>
+            <a:headEnd/>
+            <a:tailEnd/>
+          </a:ln>
+        </p:spPr>
+      </p:pic>
+      <p:cxnSp>
+        <p:nvCxnSpPr>
+          <p:cNvPr id="14" name="Gerade Verbindung mit Pfeil 13"/>
+          <p:cNvCxnSpPr>
+            <a:stCxn id="30723" idx="0"/>
+            <a:endCxn id="30722" idx="2"/>
+          </p:cNvCxnSpPr>
+          <p:nvPr/>
+        </p:nvCxnSpPr>
+        <p:spPr>
+          <a:xfrm flipH="1" flipV="1">
+            <a:off x="1669257" y="860723"/>
+            <a:ext cx="2059" cy="480045"/>
+          </a:xfrm>
+          <a:prstGeom prst="straightConnector1">
+            <a:avLst/>
+          </a:prstGeom>
+          <a:ln w="38100">
+            <a:solidFill>
+              <a:schemeClr val="bg1"/>
+            </a:solidFill>
+            <a:headEnd type="none" w="med" len="med"/>
+            <a:tailEnd type="triangle" w="med" len="med"/>
+          </a:ln>
+        </p:spPr>
+        <p:style>
+          <a:lnRef idx="1">
+            <a:schemeClr val="accent1"/>
+          </a:lnRef>
+          <a:fillRef idx="0">
+            <a:schemeClr val="accent1"/>
+          </a:fillRef>
+          <a:effectRef idx="0">
+            <a:schemeClr val="accent1"/>
+          </a:effectRef>
+          <a:fontRef idx="minor">
+            <a:schemeClr val="tx1"/>
+          </a:fontRef>
+        </p:style>
+      </p:cxnSp>
+      <p:cxnSp>
+        <p:nvCxnSpPr>
+          <p:cNvPr id="17" name="Gerade Verbindung mit Pfeil 16"/>
+          <p:cNvCxnSpPr>
+            <a:stCxn id="30724" idx="1"/>
+            <a:endCxn id="30722" idx="3"/>
+          </p:cNvCxnSpPr>
+          <p:nvPr/>
+        </p:nvCxnSpPr>
+        <p:spPr>
+          <a:xfrm flipH="1" flipV="1">
+            <a:off x="2983707" y="560686"/>
+            <a:ext cx="1012229" cy="962595"/>
+          </a:xfrm>
+          <a:prstGeom prst="straightConnector1">
+            <a:avLst/>
+          </a:prstGeom>
+          <a:ln w="38100">
+            <a:solidFill>
+              <a:schemeClr val="bg1"/>
+            </a:solidFill>
+            <a:headEnd type="none" w="med" len="med"/>
+            <a:tailEnd type="triangle" w="med" len="med"/>
+          </a:ln>
+        </p:spPr>
+        <p:style>
+          <a:lnRef idx="1">
+            <a:schemeClr val="accent1"/>
+          </a:lnRef>
+          <a:fillRef idx="0">
+            <a:schemeClr val="accent1"/>
+          </a:fillRef>
+          <a:effectRef idx="0">
+            <a:schemeClr val="accent1"/>
+          </a:effectRef>
+          <a:fontRef idx="minor">
+            <a:schemeClr val="tx1"/>
+          </a:fontRef>
+        </p:style>
+      </p:cxnSp>
+      <p:cxnSp>
+        <p:nvCxnSpPr>
+          <p:cNvPr id="22" name="Gewinkelte Verbindung 21"/>
+          <p:cNvCxnSpPr>
+            <a:stCxn id="30724" idx="2"/>
+            <a:endCxn id="30725" idx="0"/>
+          </p:cNvCxnSpPr>
+          <p:nvPr/>
+        </p:nvCxnSpPr>
+        <p:spPr>
+          <a:xfrm rot="5400000">
+            <a:off x="4027290" y="1503537"/>
+            <a:ext cx="787102" cy="3207841"/>
+          </a:xfrm>
+          <a:prstGeom prst="bentConnector3">
+            <a:avLst>
+              <a:gd name="adj1" fmla="val 50000"/>
+            </a:avLst>
+          </a:prstGeom>
+          <a:ln w="38100">
+            <a:solidFill>
+              <a:schemeClr val="bg1"/>
+            </a:solidFill>
+            <a:headEnd type="triangle" w="med" len="med"/>
+            <a:tailEnd type="none" w="med" len="med"/>
+          </a:ln>
+        </p:spPr>
+        <p:style>
+          <a:lnRef idx="1">
+            <a:schemeClr val="accent1"/>
+          </a:lnRef>
+          <a:fillRef idx="0">
+            <a:schemeClr val="accent1"/>
+          </a:fillRef>
+          <a:effectRef idx="0">
+            <a:schemeClr val="accent1"/>
+          </a:effectRef>
+          <a:fontRef idx="minor">
+            <a:schemeClr val="tx1"/>
+          </a:fontRef>
+        </p:style>
+      </p:cxnSp>
+      <p:cxnSp>
+        <p:nvCxnSpPr>
+          <p:cNvPr id="25" name="Gewinkelte Verbindung 24"/>
+          <p:cNvCxnSpPr>
+            <a:stCxn id="30724" idx="2"/>
+            <a:endCxn id="30726" idx="0"/>
+          </p:cNvCxnSpPr>
+          <p:nvPr/>
+        </p:nvCxnSpPr>
+        <p:spPr>
+          <a:xfrm rot="16200000" flipH="1">
+            <a:off x="6130789" y="2607878"/>
+            <a:ext cx="787102" cy="999158"/>
+          </a:xfrm>
+          <a:prstGeom prst="bentConnector3">
+            <a:avLst>
+              <a:gd name="adj1" fmla="val 50000"/>
+            </a:avLst>
+          </a:prstGeom>
+          <a:ln w="38100">
+            <a:solidFill>
+              <a:schemeClr val="bg1"/>
+            </a:solidFill>
+            <a:headEnd type="triangle" w="med" len="med"/>
+            <a:tailEnd type="none" w="med" len="med"/>
+          </a:ln>
+        </p:spPr>
+        <p:style>
+          <a:lnRef idx="1">
+            <a:schemeClr val="accent1"/>
+          </a:lnRef>
+          <a:fillRef idx="0">
+            <a:schemeClr val="accent1"/>
+          </a:fillRef>
+          <a:effectRef idx="0">
+            <a:schemeClr val="accent1"/>
+          </a:effectRef>
+          <a:fontRef idx="minor">
+            <a:schemeClr val="tx1"/>
+          </a:fontRef>
+        </p:style>
+      </p:cxnSp>
+      <p:pic>
+        <p:nvPicPr>
+          <p:cNvPr id="30727" name="Picture 7"/>
+          <p:cNvPicPr>
+            <a:picLocks noChangeAspect="1" noChangeArrowheads="1"/>
+          </p:cNvPicPr>
+          <p:nvPr/>
+        </p:nvPicPr>
+        <p:blipFill>
+          <a:blip r:embed="rId7" cstate="print"/>
+          <a:srcRect/>
+          <a:stretch>
+            <a:fillRect/>
+          </a:stretch>
+        </p:blipFill>
+        <p:spPr bwMode="auto">
+          <a:xfrm>
+            <a:off x="1945705" y="1970534"/>
+            <a:ext cx="5252591" cy="2916932"/>
+          </a:xfrm>
+          <a:prstGeom prst="rect">
+            <a:avLst/>
+          </a:prstGeom>
+          <a:solidFill>
+            <a:srgbClr val="000000">
+              <a:shade val="95000"/>
+            </a:srgbClr>
+          </a:solidFill>
+          <a:ln w="1016000" cap="sq" cmpd="sng">
+            <a:solidFill>
+              <a:srgbClr val="000000"/>
+            </a:solidFill>
+            <a:prstDash val="solid"/>
+            <a:miter lim="800000"/>
+          </a:ln>
+          <a:effectLst>
+            <a:outerShdw blurRad="254000" dist="190500" dir="2700000" algn="bl" rotWithShape="0">
+              <a:srgbClr val="000000">
+                <a:alpha val="40000"/>
+              </a:srgbClr>
+            </a:outerShdw>
+          </a:effectLst>
+        </p:spPr>
+      </p:pic>
+    </p:spTree>
+  </p:cSld>
+  <p:clrMapOvr>
+    <a:masterClrMapping/>
+  </p:clrMapOvr>
+  <p:timing>
+    <p:tnLst>
+      <p:par>
+        <p:cTn id="1" dur="indefinite" restart="never" nodeType="tmRoot">
+          <p:childTnLst>
+            <p:seq concurrent="1" nextAc="seek">
+              <p:cTn id="2" dur="indefinite" nodeType="mainSeq">
+                <p:childTnLst>
+                  <p:par>
+                    <p:cTn id="3" fill="hold">
+                      <p:stCondLst>
+                        <p:cond delay="indefinite"/>
+                      </p:stCondLst>
+                      <p:childTnLst>
+                        <p:par>
+                          <p:cTn id="4" fill="hold">
+                            <p:stCondLst>
+                              <p:cond delay="0"/>
+                            </p:stCondLst>
+                            <p:childTnLst>
+                              <p:par>
+                                <p:cTn id="5" presetID="1" presetClass="entr" presetSubtype="0" fill="hold" nodeType="clickEffect">
+                                  <p:stCondLst>
+                                    <p:cond delay="0"/>
+                                  </p:stCondLst>
+                                  <p:childTnLst>
+                                    <p:set>
+                                      <p:cBhvr>
+                                        <p:cTn id="6" dur="1" fill="hold">
+                                          <p:stCondLst>
+                                            <p:cond delay="0"/>
+                                          </p:stCondLst>
+                                        </p:cTn>
+                                        <p:tgtEl>
+                                          <p:spTgt spid="30727"/>
+                                        </p:tgtEl>
+                                        <p:attrNameLst>
+                                          <p:attrName>style.visibility</p:attrName>
+                                        </p:attrNameLst>
+                                      </p:cBhvr>
+                                      <p:to>
+                                        <p:strVal val="visible"/>
+                                      </p:to>
+                                    </p:set>
+                                  </p:childTnLst>
+                                </p:cTn>
+                              </p:par>
+                            </p:childTnLst>
+                          </p:cTn>
+                        </p:par>
+                      </p:childTnLst>
+                    </p:cTn>
+                  </p:par>
+                </p:childTnLst>
+              </p:cTn>
+              <p:prevCondLst>
+                <p:cond evt="onPrev" delay="0">
+                  <p:tgtEl>
+                    <p:sldTgt/>
+                  </p:tgtEl>
+                </p:cond>
+              </p:prevCondLst>
+              <p:nextCondLst>
+                <p:cond evt="onNext" delay="0">
+                  <p:tgtEl>
+                    <p:sldTgt/>
+                  </p:tgtEl>
+                </p:cond>
+              </p:nextCondLst>
+            </p:seq>
+          </p:childTnLst>
+        </p:cTn>
+      </p:par>
+    </p:tnLst>
+  </p:timing>
+</p:sld>
+</file>
+
+<file path=ppt/slides/slide15.xml><?xml version="1.0" encoding="utf-8"?>
+<p:sld xmlns:a="http://schemas.openxmlformats.org/drawingml/2006/main" xmlns:r="http://schemas.openxmlformats.org/officeDocument/2006/relationships" xmlns:p="http://schemas.openxmlformats.org/presentationml/2006/main">
+  <p:cSld>
+    <p:spTree>
+      <p:nvGrpSpPr>
+        <p:cNvPr id="1" name=""/>
+        <p:cNvGrpSpPr/>
+        <p:nvPr/>
+      </p:nvGrpSpPr>
+      <p:grpSpPr>
+        <a:xfrm>
+          <a:off x="0" y="0"/>
+          <a:ext cx="0" cy="0"/>
+          <a:chOff x="0" y="0"/>
+          <a:chExt cx="0" cy="0"/>
+        </a:xfrm>
+      </p:grpSpPr>
+      <p:sp>
+        <p:nvSpPr>
+          <p:cNvPr id="2" name="Titel 1"/>
+          <p:cNvSpPr>
+            <a:spLocks noGrp="1"/>
+          </p:cNvSpPr>
+          <p:nvPr>
+            <p:ph type="title"/>
+          </p:nvPr>
+        </p:nvSpPr>
+        <p:spPr/>
+        <p:txBody>
+          <a:bodyPr>
+            <a:normAutofit fontScale="90000"/>
+          </a:bodyPr>
+          <a:lstStyle/>
+          <a:p>
+            <a:r>
+              <a:rPr lang="en-US" dirty="0" smtClean="0"/>
+              <a:t>Important Design Patterns (for Java)</a:t>
+            </a:r>
+            <a:endParaRPr lang="en-US" dirty="0"/>
+          </a:p>
+        </p:txBody>
+      </p:sp>
+      <p:sp>
+        <p:nvSpPr>
+          <p:cNvPr id="3" name="Inhaltsplatzhalter 2"/>
+          <p:cNvSpPr>
+            <a:spLocks noGrp="1"/>
+          </p:cNvSpPr>
+          <p:nvPr>
+            <p:ph idx="1"/>
+          </p:nvPr>
+        </p:nvSpPr>
+        <p:spPr>
+          <a:xfrm>
+            <a:off x="457200" y="2249424"/>
+            <a:ext cx="4906888" cy="4325112"/>
+          </a:xfrm>
+        </p:spPr>
+        <p:txBody>
+          <a:bodyPr/>
+          <a:lstStyle/>
+          <a:p>
+            <a:r>
+              <a:rPr lang="en-US" dirty="0" smtClean="0"/>
+              <a:t>Memento / Token</a:t>
+            </a:r>
+          </a:p>
+          <a:p>
+            <a:pPr lvl="2"/>
+            <a:r>
+              <a:rPr lang="en-US" dirty="0" smtClean="0"/>
+              <a:t>Capture an object’s internal state to allow restoring this state</a:t>
+            </a:r>
+          </a:p>
+          <a:p>
+            <a:pPr lvl="2"/>
+            <a:r>
+              <a:rPr lang="en-US" dirty="0" smtClean="0"/>
+              <a:t>Therefore it has to be externalized without violating encapsulation</a:t>
+            </a:r>
+          </a:p>
+          <a:p>
+            <a:pPr lvl="2"/>
+            <a:r>
+              <a:rPr lang="en-US" dirty="0" smtClean="0"/>
+              <a:t>Used for: </a:t>
+            </a:r>
+            <a:br>
+              <a:rPr lang="en-US" dirty="0" smtClean="0"/>
+            </a:br>
+            <a:r>
+              <a:rPr lang="en-US" dirty="0" smtClean="0"/>
+              <a:t>Undo mechanisms</a:t>
+            </a:r>
+          </a:p>
+        </p:txBody>
+      </p:sp>
+      <p:pic>
+        <p:nvPicPr>
+          <p:cNvPr id="31746" name="Picture 2" descr="Memento Pattern UML Diagram"/>
+          <p:cNvPicPr>
+            <a:picLocks noChangeAspect="1" noChangeArrowheads="1"/>
+          </p:cNvPicPr>
+          <p:nvPr/>
+        </p:nvPicPr>
+        <p:blipFill>
+          <a:blip r:embed="rId2" cstate="print"/>
+          <a:srcRect l="33750" t="1961"/>
+          <a:stretch>
+            <a:fillRect/>
+          </a:stretch>
+        </p:blipFill>
+        <p:spPr bwMode="auto">
+          <a:xfrm>
+            <a:off x="5224474" y="2348880"/>
+            <a:ext cx="3784646" cy="3600400"/>
+          </a:xfrm>
+          <a:prstGeom prst="rect">
+            <a:avLst/>
+          </a:prstGeom>
+          <a:noFill/>
+        </p:spPr>
+      </p:pic>
+    </p:spTree>
+  </p:cSld>
+  <p:clrMapOvr>
+    <a:masterClrMapping/>
+  </p:clrMapOvr>
+  <p:timing>
+    <p:tnLst>
+      <p:par>
+        <p:cTn id="1" dur="indefinite" restart="never" nodeType="tmRoot"/>
+      </p:par>
+    </p:tnLst>
+  </p:timing>
+</p:sld>
+</file>
+
+<file path=ppt/slides/slide16.xml><?xml version="1.0" encoding="utf-8"?>
+<p:sld xmlns:a="http://schemas.openxmlformats.org/drawingml/2006/main" xmlns:r="http://schemas.openxmlformats.org/officeDocument/2006/relationships" xmlns:p="http://schemas.openxmlformats.org/presentationml/2006/main">
+  <p:cSld>
+    <p:spTree>
+      <p:nvGrpSpPr>
+        <p:cNvPr id="1" name=""/>
+        <p:cNvGrpSpPr/>
+        <p:nvPr/>
+      </p:nvGrpSpPr>
+      <p:grpSpPr>
+        <a:xfrm>
+          <a:off x="0" y="0"/>
+          <a:ext cx="0" cy="0"/>
+          <a:chOff x="0" y="0"/>
+          <a:chExt cx="0" cy="0"/>
+        </a:xfrm>
+      </p:grpSpPr>
+      <p:sp>
+        <p:nvSpPr>
+          <p:cNvPr id="6" name="Titel 5"/>
+          <p:cNvSpPr>
+            <a:spLocks noGrp="1"/>
+          </p:cNvSpPr>
+          <p:nvPr>
+            <p:ph type="title"/>
+          </p:nvPr>
+        </p:nvSpPr>
+        <p:spPr/>
+        <p:txBody>
+          <a:bodyPr/>
+          <a:lstStyle/>
+          <a:p>
+            <a:endParaRPr lang="de-DE"/>
+          </a:p>
+        </p:txBody>
+      </p:sp>
+      <p:sp>
+        <p:nvSpPr>
+          <p:cNvPr id="7" name="Inhaltsplatzhalter 6"/>
+          <p:cNvSpPr>
+            <a:spLocks noGrp="1"/>
+          </p:cNvSpPr>
+          <p:nvPr>
+            <p:ph idx="1"/>
+          </p:nvPr>
+        </p:nvSpPr>
+        <p:spPr/>
+        <p:txBody>
+          <a:bodyPr/>
+          <a:lstStyle/>
+          <a:p>
+            <a:endParaRPr lang="de-DE" dirty="0"/>
+          </a:p>
+        </p:txBody>
+      </p:sp>
+      <p:sp>
+        <p:nvSpPr>
+          <p:cNvPr id="9" name="Rechteck 8"/>
+          <p:cNvSpPr/>
+          <p:nvPr/>
+        </p:nvSpPr>
+        <p:spPr>
+          <a:xfrm>
+            <a:off x="0" y="0"/>
+            <a:ext cx="9144000" cy="6858000"/>
+          </a:xfrm>
+          <a:prstGeom prst="rect">
+            <a:avLst/>
+          </a:prstGeom>
+          <a:solidFill>
+            <a:schemeClr val="tx1"/>
+          </a:solidFill>
+          <a:ln>
+            <a:solidFill>
+              <a:schemeClr val="tx1"/>
+            </a:solidFill>
+          </a:ln>
+        </p:spPr>
+        <p:style>
+          <a:lnRef idx="2">
+            <a:schemeClr val="accent1">
+              <a:shade val="50000"/>
+            </a:schemeClr>
+          </a:lnRef>
+          <a:fillRef idx="1">
+            <a:schemeClr val="accent1"/>
+          </a:fillRef>
+          <a:effectRef idx="0">
+            <a:schemeClr val="accent1"/>
+          </a:effectRef>
+          <a:fontRef idx="minor">
+            <a:schemeClr val="lt1"/>
+          </a:fontRef>
+        </p:style>
+        <p:txBody>
+          <a:bodyPr rtlCol="0" anchor="ctr"/>
+          <a:lstStyle/>
+          <a:p>
+            <a:pPr algn="ctr"/>
+            <a:endParaRPr lang="de-DE"/>
+          </a:p>
+        </p:txBody>
+      </p:sp>
+      <p:pic>
+        <p:nvPicPr>
+          <p:cNvPr id="33794" name="Picture 2"/>
+          <p:cNvPicPr>
+            <a:picLocks noChangeAspect="1" noChangeArrowheads="1"/>
+          </p:cNvPicPr>
+          <p:nvPr/>
+        </p:nvPicPr>
+        <p:blipFill>
+          <a:blip r:embed="rId2" cstate="print"/>
+          <a:srcRect/>
+          <a:stretch>
+            <a:fillRect/>
+          </a:stretch>
+        </p:blipFill>
+        <p:spPr bwMode="auto">
+          <a:xfrm>
+            <a:off x="4888185" y="908720"/>
+            <a:ext cx="2924175" cy="2238375"/>
+          </a:xfrm>
+          <a:prstGeom prst="rect">
+            <a:avLst/>
+          </a:prstGeom>
+          <a:noFill/>
+          <a:ln w="9525">
+            <a:noFill/>
+            <a:miter lim="800000"/>
+            <a:headEnd/>
+            <a:tailEnd/>
+          </a:ln>
+        </p:spPr>
+      </p:pic>
+      <p:pic>
+        <p:nvPicPr>
+          <p:cNvPr id="33795" name="Picture 3"/>
+          <p:cNvPicPr>
+            <a:picLocks noChangeAspect="1" noChangeArrowheads="1"/>
+          </p:cNvPicPr>
+          <p:nvPr/>
+        </p:nvPicPr>
+        <p:blipFill>
+          <a:blip r:embed="rId3" cstate="print"/>
+          <a:srcRect/>
+          <a:stretch>
+            <a:fillRect/>
+          </a:stretch>
+        </p:blipFill>
+        <p:spPr bwMode="auto">
+          <a:xfrm>
+            <a:off x="107504" y="116632"/>
+            <a:ext cx="3962400" cy="3838575"/>
+          </a:xfrm>
+          <a:prstGeom prst="rect">
+            <a:avLst/>
+          </a:prstGeom>
+          <a:noFill/>
+          <a:ln w="9525">
+            <a:noFill/>
+            <a:miter lim="800000"/>
+            <a:headEnd/>
+            <a:tailEnd/>
+          </a:ln>
+        </p:spPr>
+      </p:pic>
+      <p:pic>
+        <p:nvPicPr>
+          <p:cNvPr id="33796" name="Picture 4"/>
+          <p:cNvPicPr>
+            <a:picLocks noChangeAspect="1" noChangeArrowheads="1"/>
+          </p:cNvPicPr>
+          <p:nvPr/>
+        </p:nvPicPr>
+        <p:blipFill>
+          <a:blip r:embed="rId4" cstate="print"/>
+          <a:srcRect/>
+          <a:stretch>
+            <a:fillRect/>
+          </a:stretch>
+        </p:blipFill>
+        <p:spPr bwMode="auto">
+          <a:xfrm>
+            <a:off x="3947864" y="4221088"/>
+            <a:ext cx="4800600" cy="2228850"/>
+          </a:xfrm>
+          <a:prstGeom prst="rect">
+            <a:avLst/>
+          </a:prstGeom>
+          <a:noFill/>
+          <a:ln w="9525">
+            <a:noFill/>
+            <a:miter lim="800000"/>
+            <a:headEnd/>
+            <a:tailEnd/>
+          </a:ln>
+        </p:spPr>
+      </p:pic>
+      <p:pic>
+        <p:nvPicPr>
+          <p:cNvPr id="33797" name="Picture 5"/>
+          <p:cNvPicPr>
+            <a:picLocks noChangeAspect="1" noChangeArrowheads="1"/>
+          </p:cNvPicPr>
+          <p:nvPr/>
+        </p:nvPicPr>
+        <p:blipFill>
+          <a:blip r:embed="rId5" cstate="print"/>
+          <a:srcRect/>
+          <a:stretch>
+            <a:fillRect/>
+          </a:stretch>
+        </p:blipFill>
+        <p:spPr bwMode="auto">
+          <a:xfrm>
+            <a:off x="1762125" y="904875"/>
+            <a:ext cx="5619750" cy="5048250"/>
+          </a:xfrm>
+          <a:prstGeom prst="rect">
+            <a:avLst/>
+          </a:prstGeom>
+          <a:solidFill>
+            <a:srgbClr val="000000">
+              <a:shade val="95000"/>
+            </a:srgbClr>
+          </a:solidFill>
+          <a:ln w="1905000" cap="sq">
+            <a:solidFill>
+              <a:srgbClr val="000000"/>
+            </a:solidFill>
+            <a:miter lim="800000"/>
+          </a:ln>
+          <a:effectLst>
+            <a:outerShdw blurRad="254000" dist="190500" dir="2700000" sy="90000" algn="bl" rotWithShape="0">
+              <a:srgbClr val="000000">
+                <a:alpha val="40000"/>
+              </a:srgbClr>
+            </a:outerShdw>
+          </a:effectLst>
+        </p:spPr>
+      </p:pic>
+      <p:cxnSp>
+        <p:nvCxnSpPr>
+          <p:cNvPr id="20" name="Gerade Verbindung mit Pfeil 19"/>
+          <p:cNvCxnSpPr>
+            <a:stCxn id="33794" idx="1"/>
+            <a:endCxn id="33795" idx="3"/>
+          </p:cNvCxnSpPr>
+          <p:nvPr/>
+        </p:nvCxnSpPr>
+        <p:spPr>
+          <a:xfrm flipH="1">
+            <a:off x="4069904" y="2027908"/>
+            <a:ext cx="818281" cy="8012"/>
+          </a:xfrm>
+          <a:prstGeom prst="straightConnector1">
+            <a:avLst/>
+          </a:prstGeom>
+          <a:ln w="19050">
+            <a:solidFill>
+              <a:schemeClr val="bg1"/>
+            </a:solidFill>
+            <a:prstDash val="dash"/>
+            <a:headEnd type="arrow" w="med" len="med"/>
+            <a:tailEnd type="none" w="med" len="med"/>
+          </a:ln>
+        </p:spPr>
+        <p:style>
+          <a:lnRef idx="1">
+            <a:schemeClr val="accent1"/>
+          </a:lnRef>
+          <a:fillRef idx="0">
+            <a:schemeClr val="accent1"/>
+          </a:fillRef>
+          <a:effectRef idx="0">
+            <a:schemeClr val="accent1"/>
+          </a:effectRef>
+          <a:fontRef idx="minor">
+            <a:schemeClr val="tx1"/>
+          </a:fontRef>
+        </p:style>
+      </p:cxnSp>
+      <p:cxnSp>
+        <p:nvCxnSpPr>
+          <p:cNvPr id="21" name="Gerade Verbindung mit Pfeil 20"/>
+          <p:cNvCxnSpPr>
+            <a:stCxn id="33794" idx="2"/>
+            <a:endCxn id="33796" idx="0"/>
+          </p:cNvCxnSpPr>
+          <p:nvPr/>
+        </p:nvCxnSpPr>
+        <p:spPr>
+          <a:xfrm flipH="1">
+            <a:off x="6348164" y="3147095"/>
+            <a:ext cx="2109" cy="1073993"/>
+          </a:xfrm>
+          <a:prstGeom prst="straightConnector1">
+            <a:avLst/>
+          </a:prstGeom>
+          <a:ln w="19050">
+            <a:solidFill>
+              <a:schemeClr val="bg1"/>
+            </a:solidFill>
+            <a:prstDash val="dash"/>
+            <a:headEnd type="arrow" w="med" len="med"/>
+            <a:tailEnd type="none" w="med" len="med"/>
+          </a:ln>
+        </p:spPr>
+        <p:style>
+          <a:lnRef idx="1">
+            <a:schemeClr val="accent1"/>
+          </a:lnRef>
+          <a:fillRef idx="0">
+            <a:schemeClr val="accent1"/>
+          </a:fillRef>
+          <a:effectRef idx="0">
+            <a:schemeClr val="accent1"/>
+          </a:effectRef>
+          <a:fontRef idx="minor">
+            <a:schemeClr val="tx1"/>
+          </a:fontRef>
+        </p:style>
+      </p:cxnSp>
+    </p:spTree>
+  </p:cSld>
+  <p:clrMapOvr>
+    <a:masterClrMapping/>
+  </p:clrMapOvr>
+  <p:timing>
+    <p:tnLst>
+      <p:par>
+        <p:cTn id="1" dur="indefinite" restart="never" nodeType="tmRoot">
+          <p:childTnLst>
+            <p:seq concurrent="1" nextAc="seek">
+              <p:cTn id="2" dur="indefinite" nodeType="mainSeq">
+                <p:childTnLst>
+                  <p:par>
+                    <p:cTn id="3" fill="hold">
+                      <p:stCondLst>
+                        <p:cond delay="indefinite"/>
+                      </p:stCondLst>
+                      <p:childTnLst>
+                        <p:par>
+                          <p:cTn id="4" fill="hold">
+                            <p:stCondLst>
+                              <p:cond delay="0"/>
+                            </p:stCondLst>
+                            <p:childTnLst>
+                              <p:par>
+                                <p:cTn id="5" presetID="1" presetClass="entr" presetSubtype="0" fill="hold" nodeType="clickEffect">
+                                  <p:stCondLst>
+                                    <p:cond delay="0"/>
+                                  </p:stCondLst>
+                                  <p:childTnLst>
+                                    <p:set>
+                                      <p:cBhvr>
+                                        <p:cTn id="6" dur="1" fill="hold">
+                                          <p:stCondLst>
+                                            <p:cond delay="0"/>
+                                          </p:stCondLst>
+                                        </p:cTn>
+                                        <p:tgtEl>
+                                          <p:spTgt spid="33797"/>
+                                        </p:tgtEl>
+                                        <p:attrNameLst>
+                                          <p:attrName>style.visibility</p:attrName>
+                                        </p:attrNameLst>
+                                      </p:cBhvr>
+                                      <p:to>
+                                        <p:strVal val="visible"/>
+                                      </p:to>
+                                    </p:set>
+                                  </p:childTnLst>
+                                </p:cTn>
+                              </p:par>
+                            </p:childTnLst>
+                          </p:cTn>
+                        </p:par>
+                      </p:childTnLst>
+                    </p:cTn>
+                  </p:par>
+                </p:childTnLst>
+              </p:cTn>
+              <p:prevCondLst>
+                <p:cond evt="onPrev" delay="0">
+                  <p:tgtEl>
+                    <p:sldTgt/>
+                  </p:tgtEl>
+                </p:cond>
+              </p:prevCondLst>
+              <p:nextCondLst>
+                <p:cond evt="onNext" delay="0">
+                  <p:tgtEl>
+                    <p:sldTgt/>
+                  </p:tgtEl>
+                </p:cond>
+              </p:nextCondLst>
+            </p:seq>
+          </p:childTnLst>
+        </p:cTn>
+      </p:par>
+    </p:tnLst>
+  </p:timing>
+</p:sld>
+</file>
+
+<file path=ppt/slides/slide17.xml><?xml version="1.0" encoding="utf-8"?>
+<p:sld xmlns:a="http://schemas.openxmlformats.org/drawingml/2006/main" xmlns:r="http://schemas.openxmlformats.org/officeDocument/2006/relationships" xmlns:p="http://schemas.openxmlformats.org/presentationml/2006/main">
+  <p:cSld>
+    <p:spTree>
+      <p:nvGrpSpPr>
+        <p:cNvPr id="1" name=""/>
+        <p:cNvGrpSpPr/>
+        <p:nvPr/>
+      </p:nvGrpSpPr>
+      <p:grpSpPr>
+        <a:xfrm>
+          <a:off x="0" y="0"/>
+          <a:ext cx="0" cy="0"/>
+          <a:chOff x="0" y="0"/>
+          <a:chExt cx="0" cy="0"/>
+        </a:xfrm>
+      </p:grpSpPr>
+      <p:sp>
+        <p:nvSpPr>
+          <p:cNvPr id="2" name="Titel 1"/>
+          <p:cNvSpPr>
+            <a:spLocks noGrp="1"/>
+          </p:cNvSpPr>
+          <p:nvPr>
+            <p:ph type="title"/>
+          </p:nvPr>
+        </p:nvSpPr>
+        <p:spPr/>
+        <p:txBody>
+          <a:bodyPr/>
+          <a:lstStyle/>
+          <a:p>
+            <a:r>
+              <a:rPr lang="en-US" smtClean="0"/>
+              <a:t>Sources</a:t>
+            </a:r>
+            <a:endParaRPr lang="en-US"/>
+          </a:p>
+        </p:txBody>
+      </p:sp>
+      <p:sp>
+        <p:nvSpPr>
+          <p:cNvPr id="3" name="Inhaltsplatzhalter 2"/>
+          <p:cNvSpPr>
+            <a:spLocks noGrp="1"/>
+          </p:cNvSpPr>
+          <p:nvPr>
+            <p:ph idx="1"/>
+          </p:nvPr>
+        </p:nvSpPr>
+        <p:spPr/>
+        <p:txBody>
+          <a:bodyPr/>
+          <a:lstStyle/>
+          <a:p>
+            <a:r>
+              <a:rPr lang="en-US" smtClean="0"/>
+              <a:t>Christopher Alexander, </a:t>
+            </a:r>
+            <a:r>
+              <a:rPr lang="en-US" smtClean="0"/>
+              <a:t>Sara </a:t>
+            </a:r>
+            <a:r>
+              <a:rPr lang="en-US" smtClean="0"/>
+              <a:t>Ishikawa</a:t>
+            </a:r>
+            <a:r>
+              <a:rPr lang="en-US" smtClean="0"/>
+              <a:t>, </a:t>
+            </a:r>
+            <a:r>
+              <a:rPr lang="en-US" smtClean="0"/>
+              <a:t>MurraySilverstein</a:t>
+            </a:r>
+            <a:r>
+              <a:rPr lang="en-US" smtClean="0"/>
+              <a:t>, Max </a:t>
+            </a:r>
+            <a:r>
+              <a:rPr lang="en-US" smtClean="0"/>
+              <a:t>Jacobson</a:t>
+            </a:r>
+            <a:r>
+              <a:rPr lang="en-US" smtClean="0"/>
+              <a:t>, Ingrid </a:t>
+            </a:r>
+            <a:r>
+              <a:rPr lang="en-US" smtClean="0"/>
+              <a:t>Fiksdahl-King</a:t>
+            </a:r>
+            <a:r>
+              <a:rPr lang="en-US" smtClean="0"/>
+              <a:t>, and Shlomo </a:t>
+            </a:r>
+            <a:r>
+              <a:rPr lang="en-US" smtClean="0"/>
+              <a:t>Angel.</a:t>
+            </a:r>
+            <a:r>
+              <a:rPr lang="en-US" i="1" smtClean="0"/>
+              <a:t>A Pattern </a:t>
+            </a:r>
+            <a:r>
+              <a:rPr lang="en-US" i="1" smtClean="0"/>
+              <a:t>Language</a:t>
+            </a:r>
+            <a:r>
+              <a:rPr lang="en-US" i="1" smtClean="0"/>
+              <a:t>. Oxford University </a:t>
+            </a:r>
+            <a:r>
+              <a:rPr lang="en-US" smtClean="0"/>
+              <a:t>Press</a:t>
+            </a:r>
+            <a:r>
+              <a:rPr lang="en-US" smtClean="0"/>
+              <a:t>, </a:t>
+            </a:r>
+            <a:r>
+              <a:rPr lang="en-US" smtClean="0"/>
+              <a:t>NewYork</a:t>
+            </a:r>
+            <a:r>
+              <a:rPr lang="en-US" smtClean="0"/>
+              <a:t>, </a:t>
+            </a:r>
+            <a:r>
+              <a:rPr lang="en-US" smtClean="0"/>
+              <a:t>1977.</a:t>
+            </a:r>
+            <a:endParaRPr lang="en-US" smtClean="0"/>
+          </a:p>
+          <a:p>
+            <a:r>
+              <a:rPr lang="en-US" smtClean="0"/>
+              <a:t>All others are in the </a:t>
+            </a:r>
+            <a:r>
+              <a:rPr lang="en-US" smtClean="0"/>
+              <a:t>file</a:t>
+            </a:r>
+            <a:r>
+              <a:rPr lang="en-US" smtClean="0"/>
+              <a:t>: </a:t>
+            </a:r>
+            <a:r>
+              <a:rPr lang="en-US" sz="2400" smtClean="0">
+                <a:latin typeface="Bell MT" pitchFamily="18" charset="0"/>
+                <a:cs typeface="Arial" pitchFamily="34" charset="0"/>
+              </a:rPr>
+              <a:t>Presentation/Outline.docx</a:t>
+            </a:r>
+            <a:endParaRPr lang="en-US">
+              <a:latin typeface="Bell MT" pitchFamily="18" charset="0"/>
+              <a:cs typeface="Arial" pitchFamily="34" charset="0"/>
+            </a:endParaRPr>
+          </a:p>
+        </p:txBody>
+      </p:sp>
+    </p:spTree>
+  </p:cSld>
+  <p:clrMapOvr>
+    <a:masterClrMapping/>
+  </p:clrMapOvr>
+  <p:timing>
+    <p:tnLst>
+      <p:par>
+        <p:cTn id="1" dur="indefinite" restart="never" nodeType="tmRoot"/>
+      </p:par>
+    </p:tnLst>
+  </p:timing>
+</p:sld>
+</file>
+
 <file path=ppt/slides/slide2.xml><?xml version="1.0" encoding="utf-8"?>
 <p:sld xmlns:a="http://schemas.openxmlformats.org/drawingml/2006/main" xmlns:r="http://schemas.openxmlformats.org/officeDocument/2006/relationships" xmlns:p="http://schemas.openxmlformats.org/presentationml/2006/main">
   <p:cSld>
@@ -10484,14 +12676,14 @@
             <a:p>
               <a:pPr algn="ctr"/>
               <a:r>
-                <a:rPr lang="en-US" sz="1100" smtClean="0"/>
+                <a:rPr lang="en-US" sz="1100" b="1" smtClean="0"/>
                 <a:t>Factory </a:t>
               </a:r>
               <a:r>
-                <a:rPr lang="en-US" sz="1100" smtClean="0"/>
+                <a:rPr lang="en-US" sz="1100" b="1" smtClean="0"/>
                 <a:t>Method</a:t>
               </a:r>
-              <a:endParaRPr lang="en-US" sz="1100"/>
+              <a:endParaRPr lang="en-US" sz="1100" b="1"/>
             </a:p>
           </p:txBody>
         </p:sp>
@@ -10519,14 +12711,14 @@
             <a:p>
               <a:pPr algn="ctr"/>
               <a:r>
-                <a:rPr lang="en-US" dirty="0" smtClean="0">
+                <a:rPr lang="en-US" b="1" dirty="0" smtClean="0">
                   <a:solidFill>
                     <a:schemeClr val="tx2"/>
                   </a:solidFill>
                 </a:rPr>
                 <a:t>Creational</a:t>
               </a:r>
-              <a:endParaRPr lang="en-US" dirty="0">
+              <a:endParaRPr lang="en-US" b="1" dirty="0">
                 <a:solidFill>
                   <a:schemeClr val="tx2"/>
                 </a:solidFill>
@@ -10569,47 +12761,47 @@
             <a:p>
               <a:pPr algn="ctr"/>
               <a:r>
-                <a:rPr lang="en-US" sz="1100" smtClean="0"/>
+                <a:rPr lang="en-US" sz="1100" b="1" smtClean="0"/>
                 <a:t>Abstract Factory, </a:t>
               </a:r>
               <a:r>
-                <a:rPr lang="en-US" sz="1100" smtClean="0"/>
+                <a:rPr lang="en-US" sz="1100" b="1" smtClean="0"/>
                 <a:t/>
               </a:r>
               <a:br>
-                <a:rPr lang="en-US" sz="1100" smtClean="0"/>
+                <a:rPr lang="en-US" sz="1100" b="1" smtClean="0"/>
               </a:br>
               <a:r>
-                <a:rPr lang="en-US" sz="1100" smtClean="0"/>
+                <a:rPr lang="en-US" sz="1100" b="1" smtClean="0"/>
                 <a:t>Builder</a:t>
               </a:r>
               <a:r>
-                <a:rPr lang="en-US" sz="1100" smtClean="0"/>
+                <a:rPr lang="en-US" sz="1100" b="1" smtClean="0"/>
                 <a:t>, </a:t>
               </a:r>
               <a:r>
-                <a:rPr lang="en-US" sz="1100" smtClean="0"/>
+                <a:rPr lang="en-US" sz="1100" b="1" smtClean="0"/>
                 <a:t/>
               </a:r>
               <a:br>
-                <a:rPr lang="en-US" sz="1100" smtClean="0"/>
+                <a:rPr lang="en-US" sz="1100" b="1" smtClean="0"/>
               </a:br>
               <a:r>
-                <a:rPr lang="en-US" sz="1100" smtClean="0"/>
+                <a:rPr lang="en-US" sz="1100" b="1" smtClean="0"/>
                 <a:t>Prototype,</a:t>
               </a:r>
               <a:r>
-                <a:rPr lang="en-US" sz="1100" smtClean="0"/>
+                <a:rPr lang="en-US" sz="1100" b="1" smtClean="0"/>
                 <a:t/>
               </a:r>
               <a:br>
-                <a:rPr lang="en-US" sz="1100" smtClean="0"/>
+                <a:rPr lang="en-US" sz="1100" b="1" smtClean="0"/>
               </a:br>
               <a:r>
-                <a:rPr lang="en-US" sz="1100" smtClean="0"/>
+                <a:rPr lang="en-US" sz="1100" b="1" smtClean="0"/>
                 <a:t>Singleton</a:t>
               </a:r>
-              <a:endParaRPr lang="en-US" sz="1100"/>
+              <a:endParaRPr lang="en-US" sz="1100" b="1"/>
             </a:p>
           </p:txBody>
         </p:sp>
@@ -10652,14 +12844,14 @@
             <a:p>
               <a:pPr algn="ctr"/>
               <a:r>
-                <a:rPr lang="en-US" dirty="0" smtClean="0">
+                <a:rPr lang="en-US" b="1" dirty="0" smtClean="0">
                   <a:solidFill>
                     <a:schemeClr val="tx2"/>
                   </a:solidFill>
                 </a:rPr>
                 <a:t>Structural</a:t>
               </a:r>
-              <a:endParaRPr lang="en-US" dirty="0">
+              <a:endParaRPr lang="en-US" b="1" dirty="0">
                 <a:solidFill>
                   <a:schemeClr val="tx2"/>
                 </a:solidFill>
@@ -10702,10 +12894,10 @@
             <a:p>
               <a:pPr algn="ctr"/>
               <a:r>
-                <a:rPr lang="en-US" sz="1100" smtClean="0"/>
+                <a:rPr lang="en-US" sz="1100" b="1" smtClean="0"/>
                 <a:t>Adapter</a:t>
               </a:r>
-              <a:endParaRPr lang="en-US" sz="1100"/>
+              <a:endParaRPr lang="en-US" sz="1100" b="1"/>
             </a:p>
           </p:txBody>
         </p:sp>
@@ -10744,49 +12936,49 @@
             <a:p>
               <a:pPr algn="ctr"/>
               <a:r>
-                <a:rPr lang="en-US" sz="1100" dirty="0" smtClean="0"/>
+                <a:rPr lang="en-US" sz="1100" b="1" dirty="0" smtClean="0"/>
                 <a:t>Adapter, </a:t>
               </a:r>
               <a:br>
-                <a:rPr lang="en-US" sz="1100" dirty="0" smtClean="0"/>
+                <a:rPr lang="en-US" sz="1100" b="1" dirty="0" smtClean="0"/>
               </a:br>
               <a:r>
-                <a:rPr lang="en-US" sz="1100" dirty="0" smtClean="0"/>
+                <a:rPr lang="en-US" sz="1100" b="1" dirty="0" smtClean="0"/>
                 <a:t>Bridge, </a:t>
               </a:r>
               <a:br>
-                <a:rPr lang="en-US" sz="1100" dirty="0" smtClean="0"/>
+                <a:rPr lang="en-US" sz="1100" b="1" dirty="0" smtClean="0"/>
               </a:br>
               <a:r>
-                <a:rPr lang="en-US" sz="1100" dirty="0" smtClean="0"/>
+                <a:rPr lang="en-US" sz="1100" b="1" dirty="0" smtClean="0"/>
                 <a:t>Composite, Decorator, </a:t>
               </a:r>
               <a:br>
-                <a:rPr lang="en-US" sz="1100" dirty="0" smtClean="0"/>
+                <a:rPr lang="en-US" sz="1100" b="1" dirty="0" smtClean="0"/>
               </a:br>
               <a:r>
-                <a:rPr lang="en-US" sz="1100" dirty="0" smtClean="0"/>
+                <a:rPr lang="en-US" sz="1100" b="1" dirty="0" smtClean="0"/>
                 <a:t>Facade, </a:t>
               </a:r>
               <a:br>
-                <a:rPr lang="en-US" sz="1100" dirty="0" smtClean="0"/>
+                <a:rPr lang="en-US" sz="1100" b="1" dirty="0" smtClean="0"/>
               </a:br>
               <a:r>
-                <a:rPr lang="en-US" sz="1100" dirty="0" err="1" smtClean="0"/>
+                <a:rPr lang="en-US" sz="1100" b="1" dirty="0" err="1" smtClean="0"/>
                 <a:t>lywight</a:t>
               </a:r>
               <a:r>
-                <a:rPr lang="en-US" sz="1100" dirty="0" smtClean="0"/>
+                <a:rPr lang="en-US" sz="1100" b="1" dirty="0" smtClean="0"/>
                 <a:t>, </a:t>
               </a:r>
               <a:br>
-                <a:rPr lang="en-US" sz="1100" dirty="0" smtClean="0"/>
+                <a:rPr lang="en-US" sz="1100" b="1" dirty="0" smtClean="0"/>
               </a:br>
               <a:r>
-                <a:rPr lang="en-US" sz="1100" dirty="0" smtClean="0"/>
+                <a:rPr lang="en-US" sz="1100" b="1" dirty="0" smtClean="0"/>
                 <a:t>Proxy</a:t>
               </a:r>
-              <a:endParaRPr lang="en-US" sz="1100" dirty="0"/>
+              <a:endParaRPr lang="en-US" sz="1100" b="1" dirty="0"/>
             </a:p>
           </p:txBody>
         </p:sp>
@@ -10829,14 +13021,14 @@
             <a:p>
               <a:pPr algn="ctr"/>
               <a:r>
-                <a:rPr lang="en-US" dirty="0" smtClean="0">
+                <a:rPr lang="en-US" b="1" dirty="0" smtClean="0">
                   <a:solidFill>
                     <a:schemeClr val="tx2"/>
                   </a:solidFill>
                 </a:rPr>
                 <a:t>Behavioral</a:t>
               </a:r>
-              <a:endParaRPr lang="en-US" dirty="0">
+              <a:endParaRPr lang="en-US" b="1" dirty="0">
                 <a:solidFill>
                   <a:schemeClr val="tx2"/>
                 </a:solidFill>
@@ -10879,21 +13071,21 @@
             <a:p>
               <a:pPr algn="ctr"/>
               <a:r>
-                <a:rPr lang="en-US" sz="1100" smtClean="0"/>
+                <a:rPr lang="en-US" sz="1100" b="1" smtClean="0"/>
                 <a:t>Interpreter,</a:t>
               </a:r>
               <a:br>
-                <a:rPr lang="en-US" sz="1100" smtClean="0"/>
+                <a:rPr lang="en-US" sz="1100" b="1" smtClean="0"/>
               </a:br>
               <a:r>
-                <a:rPr lang="en-US" sz="1100" smtClean="0"/>
+                <a:rPr lang="en-US" sz="1100" b="1" smtClean="0"/>
                 <a:t>Template </a:t>
               </a:r>
               <a:r>
-                <a:rPr lang="en-US" sz="1100" smtClean="0"/>
+                <a:rPr lang="en-US" sz="1100" b="1" smtClean="0"/>
                 <a:t>Method</a:t>
               </a:r>
-              <a:endParaRPr lang="en-US" sz="1100"/>
+              <a:endParaRPr lang="en-US" sz="1100" b="1"/>
             </a:p>
           </p:txBody>
         </p:sp>
@@ -10932,70 +13124,78 @@
             <a:p>
               <a:pPr algn="ctr"/>
               <a:r>
-                <a:rPr lang="en-US" sz="1100" dirty="0" smtClean="0"/>
-                <a:t>Chain of Responsibility, </a:t>
+                <a:rPr lang="en-US" sz="1100" b="1" dirty="0" smtClean="0"/>
+                <a:t>Chain of </a:t>
+              </a:r>
+              <a:r>
+                <a:rPr lang="en-US" sz="1100" b="1" dirty="0" err="1" smtClean="0"/>
+                <a:t>Responsi-bility</a:t>
+              </a:r>
+              <a:r>
+                <a:rPr lang="en-US" sz="1100" b="1" dirty="0" smtClean="0"/>
+                <a:t>, </a:t>
               </a:r>
               <a:br>
-                <a:rPr lang="en-US" sz="1100" dirty="0" smtClean="0"/>
+                <a:rPr lang="en-US" sz="1100" b="1" dirty="0" smtClean="0"/>
               </a:br>
               <a:r>
-                <a:rPr lang="en-US" sz="1100" dirty="0" smtClean="0"/>
+                <a:rPr lang="en-US" sz="1100" b="1" dirty="0" smtClean="0"/>
                 <a:t>Command, </a:t>
               </a:r>
               <a:br>
-                <a:rPr lang="en-US" sz="1100" dirty="0" smtClean="0"/>
+                <a:rPr lang="en-US" sz="1100" b="1" dirty="0" smtClean="0"/>
               </a:br>
               <a:r>
-                <a:rPr lang="en-US" sz="1100" dirty="0" err="1" smtClean="0"/>
+                <a:rPr lang="en-US" sz="1100" b="1" dirty="0" err="1" smtClean="0"/>
                 <a:t>Iterator</a:t>
               </a:r>
               <a:r>
-                <a:rPr lang="en-US" sz="1100" dirty="0" smtClean="0"/>
+                <a:rPr lang="en-US" sz="1100" b="1" dirty="0" smtClean="0"/>
                 <a:t>, </a:t>
               </a:r>
               <a:br>
-                <a:rPr lang="en-US" sz="1100" dirty="0" smtClean="0"/>
+                <a:rPr lang="en-US" sz="1100" b="1" dirty="0" smtClean="0"/>
               </a:br>
               <a:r>
-                <a:rPr lang="en-US" sz="1100" dirty="0" smtClean="0"/>
+                <a:rPr lang="en-US" sz="1100" b="1" dirty="0" smtClean="0"/>
                 <a:t>Mediator, </a:t>
               </a:r>
               <a:br>
-                <a:rPr lang="en-US" sz="1100" dirty="0" smtClean="0"/>
+                <a:rPr lang="en-US" sz="1100" b="1" dirty="0" smtClean="0"/>
               </a:br>
               <a:r>
-                <a:rPr lang="en-US" sz="1100" dirty="0" smtClean="0"/>
+                <a:rPr lang="en-US" sz="1100" b="1" dirty="0" smtClean="0"/>
                 <a:t>Memento, </a:t>
               </a:r>
               <a:br>
-                <a:rPr lang="en-US" sz="1100" dirty="0" smtClean="0"/>
+                <a:rPr lang="en-US" sz="1100" b="1" dirty="0" smtClean="0"/>
               </a:br>
               <a:r>
-                <a:rPr lang="en-US" sz="1100" dirty="0" smtClean="0"/>
+                <a:rPr lang="en-US" sz="1100" b="1" dirty="0" smtClean="0"/>
                 <a:t>Observer, </a:t>
               </a:r>
               <a:br>
-                <a:rPr lang="en-US" sz="1100" dirty="0" smtClean="0"/>
+                <a:rPr lang="en-US" sz="1100" b="1" dirty="0" smtClean="0"/>
               </a:br>
               <a:r>
-                <a:rPr lang="en-US" sz="1100" dirty="0" smtClean="0"/>
+                <a:rPr lang="en-US" sz="1100" b="1" dirty="0" smtClean="0"/>
                 <a:t>State, </a:t>
               </a:r>
               <a:br>
-                <a:rPr lang="en-US" sz="1100" dirty="0" smtClean="0"/>
+                <a:rPr lang="en-US" sz="1100" b="1" dirty="0" smtClean="0"/>
               </a:br>
               <a:r>
-                <a:rPr lang="en-US" sz="1100" dirty="0" smtClean="0"/>
+                <a:rPr lang="en-US" sz="1100" b="1" dirty="0" smtClean="0"/>
                 <a:t>Strategy, </a:t>
               </a:r>
               <a:br>
-                <a:rPr lang="en-US" sz="1100" dirty="0" smtClean="0"/>
+                <a:rPr lang="en-US" sz="1100" b="1" dirty="0" smtClean="0"/>
               </a:br>
               <a:r>
-                <a:rPr lang="en-US" sz="1100" dirty="0" smtClean="0"/>
+                <a:rPr lang="en-US" sz="1100" b="1" dirty="0" smtClean="0"/>
                 <a:t>Visitor</a:t>
               </a:r>
-              <a:endParaRPr lang="en-US" sz="1100" dirty="0"/>
+              <a:endParaRPr lang="en-US" sz="1100" b="1" dirty="0"/>
             </a:p>
           </p:txBody>
         </p:sp>
@@ -11104,12 +13304,30 @@
         </p:nvSpPr>
         <p:spPr/>
         <p:txBody>
-          <a:bodyPr/>
+          <a:bodyPr>
+            <a:normAutofit fontScale="90000"/>
+          </a:bodyPr>
           <a:lstStyle/>
           <a:p>
             <a:r>
               <a:rPr lang="en-US" smtClean="0"/>
-              <a:t>Sources</a:t>
+              <a:t>Important</a:t>
+            </a:r>
+            <a:r>
+              <a:rPr lang="en-US" smtClean="0"/>
+              <a:t> Design Patterns </a:t>
+            </a:r>
+            <a:r>
+              <a:rPr lang="en-US" smtClean="0"/>
+              <a:t>(</a:t>
+            </a:r>
+            <a:r>
+              <a:rPr lang="en-US" smtClean="0"/>
+              <a:t>for </a:t>
+            </a:r>
+            <a:r>
+              <a:rPr lang="en-US" smtClean="0"/>
+              <a:t>Java)</a:t>
             </a:r>
             <a:endParaRPr lang="en-US"/>
           </a:p>
@@ -11125,116 +13343,226 @@
             <p:ph idx="1"/>
           </p:nvPr>
         </p:nvSpPr>
+        <p:spPr>
+          <a:xfrm>
+            <a:off x="457200" y="2249424"/>
+            <a:ext cx="5194920" cy="4325112"/>
+          </a:xfrm>
+        </p:spPr>
+        <p:txBody>
+          <a:bodyPr/>
+          <a:lstStyle/>
+          <a:p>
+            <a:r>
+              <a:rPr lang="en-US" smtClean="0"/>
+              <a:t>Singleton</a:t>
+            </a:r>
+          </a:p>
+          <a:p>
+            <a:pPr lvl="2"/>
+            <a:r>
+              <a:rPr lang="en-US" smtClean="0"/>
+              <a:t>Guarantees that there is only one instance of a particular </a:t>
+            </a:r>
+            <a:r>
+              <a:rPr lang="en-US" smtClean="0"/>
+              <a:t>object</a:t>
+            </a:r>
+            <a:endParaRPr lang="en-US" smtClean="0"/>
+          </a:p>
+          <a:p>
+            <a:pPr lvl="2"/>
+            <a:r>
+              <a:rPr lang="en-US" smtClean="0"/>
+              <a:t>Be careful -&gt; do not use it when in </a:t>
+            </a:r>
+            <a:r>
+              <a:rPr lang="en-US" smtClean="0"/>
+              <a:t>doubt</a:t>
+            </a:r>
+            <a:endParaRPr lang="en-US" smtClean="0"/>
+          </a:p>
+          <a:p>
+            <a:endParaRPr lang="en-US"/>
+          </a:p>
+        </p:txBody>
+      </p:sp>
+      <p:pic>
+        <p:nvPicPr>
+          <p:cNvPr id="20482" name="Picture 2" descr="Singleton Pattern UML Diagram"/>
+          <p:cNvPicPr>
+            <a:picLocks noChangeAspect="1" noChangeArrowheads="1"/>
+          </p:cNvPicPr>
+          <p:nvPr/>
+        </p:nvPicPr>
+        <p:blipFill>
+          <a:blip r:embed="rId2" cstate="print"/>
+          <a:srcRect/>
+          <a:stretch>
+            <a:fillRect/>
+          </a:stretch>
+        </p:blipFill>
+        <p:spPr bwMode="auto">
+          <a:xfrm>
+            <a:off x="5796136" y="2348880"/>
+            <a:ext cx="3057525" cy="3819525"/>
+          </a:xfrm>
+          <a:prstGeom prst="rect">
+            <a:avLst/>
+          </a:prstGeom>
+          <a:noFill/>
+        </p:spPr>
+      </p:pic>
+    </p:spTree>
+  </p:cSld>
+  <p:clrMapOvr>
+    <a:masterClrMapping/>
+  </p:clrMapOvr>
+  <p:timing>
+    <p:tnLst>
+      <p:par>
+        <p:cTn id="1" dur="indefinite" restart="never" nodeType="tmRoot"/>
+      </p:par>
+    </p:tnLst>
+  </p:timing>
+</p:sld>
+</file>
+
+<file path=ppt/slides/slide9.xml><?xml version="1.0" encoding="utf-8"?>
+<p:sld xmlns:a="http://schemas.openxmlformats.org/drawingml/2006/main" xmlns:r="http://schemas.openxmlformats.org/officeDocument/2006/relationships" xmlns:p="http://schemas.openxmlformats.org/presentationml/2006/main">
+  <p:cSld>
+    <p:spTree>
+      <p:nvGrpSpPr>
+        <p:cNvPr id="1" name=""/>
+        <p:cNvGrpSpPr/>
+        <p:nvPr/>
+      </p:nvGrpSpPr>
+      <p:grpSpPr>
+        <a:xfrm>
+          <a:off x="0" y="0"/>
+          <a:ext cx="0" cy="0"/>
+          <a:chOff x="0" y="0"/>
+          <a:chExt cx="0" cy="0"/>
+        </a:xfrm>
+      </p:grpSpPr>
+      <p:sp>
+        <p:nvSpPr>
+          <p:cNvPr id="6" name="Titel 5"/>
+          <p:cNvSpPr>
+            <a:spLocks noGrp="1"/>
+          </p:cNvSpPr>
+          <p:nvPr>
+            <p:ph type="title"/>
+          </p:nvPr>
+        </p:nvSpPr>
         <p:spPr/>
         <p:txBody>
           <a:bodyPr/>
           <a:lstStyle/>
           <a:p>
-            <a:r>
-              <a:rPr lang="en-US" smtClean="0"/>
-              <a:t>Christopher Alexander, </a:t>
-            </a:r>
-            <a:r>
-              <a:rPr lang="en-US" smtClean="0"/>
-              <a:t>Sara </a:t>
-            </a:r>
-            <a:r>
-              <a:rPr lang="en-US" smtClean="0"/>
-              <a:t>Ishikawa</a:t>
-            </a:r>
-            <a:r>
-              <a:rPr lang="en-US" smtClean="0"/>
-              <a:t>, </a:t>
-            </a:r>
-            <a:r>
-              <a:rPr lang="en-US" smtClean="0"/>
-              <a:t>MurraySilverstein</a:t>
-            </a:r>
-            <a:r>
-              <a:rPr lang="en-US" smtClean="0"/>
-              <a:t>, Max </a:t>
-            </a:r>
-            <a:r>
-              <a:rPr lang="en-US" smtClean="0"/>
-              <a:t>Jacobson</a:t>
-            </a:r>
-            <a:r>
-              <a:rPr lang="en-US" smtClean="0"/>
-              <a:t>, Ingrid </a:t>
-            </a:r>
-            <a:r>
-              <a:rPr lang="en-US" smtClean="0"/>
-              <a:t>Fiksdahl-King</a:t>
-            </a:r>
-            <a:r>
-              <a:rPr lang="en-US" smtClean="0"/>
-              <a:t>, and Shlomo </a:t>
-            </a:r>
-            <a:r>
-              <a:rPr lang="en-US" smtClean="0"/>
-              <a:t>Angel.</a:t>
-            </a:r>
-            <a:r>
-              <a:rPr lang="en-US" i="1" smtClean="0"/>
-              <a:t>A Pattern </a:t>
-            </a:r>
-            <a:r>
-              <a:rPr lang="en-US" i="1" smtClean="0"/>
-              <a:t>Language</a:t>
-            </a:r>
-            <a:r>
-              <a:rPr lang="en-US" i="1" smtClean="0"/>
-              <a:t>. Oxford University </a:t>
-            </a:r>
-            <a:r>
-              <a:rPr lang="en-US" smtClean="0"/>
-              <a:t>Press</a:t>
-            </a:r>
-            <a:r>
-              <a:rPr lang="en-US" smtClean="0"/>
-              <a:t>, </a:t>
-            </a:r>
-            <a:r>
-              <a:rPr lang="en-US" smtClean="0"/>
-              <a:t>NewYork</a:t>
-            </a:r>
-            <a:r>
-              <a:rPr lang="en-US" smtClean="0"/>
-              <a:t>, </a:t>
-            </a:r>
-            <a:r>
-              <a:rPr lang="en-US" smtClean="0"/>
-              <a:t>1977.</a:t>
-            </a:r>
-            <a:endParaRPr lang="en-US" smtClean="0"/>
-          </a:p>
-          <a:p>
-            <a:r>
-              <a:rPr lang="en-US" smtClean="0"/>
-              <a:t>All others are in the </a:t>
-            </a:r>
-            <a:r>
-              <a:rPr lang="en-US" smtClean="0"/>
-              <a:t>file</a:t>
-            </a:r>
-            <a:r>
-              <a:rPr lang="en-US" smtClean="0"/>
-              <a:t>: </a:t>
-            </a:r>
-            <a:r>
-              <a:rPr lang="en-US" sz="2400" smtClean="0">
-                <a:latin typeface="Bell MT" pitchFamily="18" charset="0"/>
-                <a:cs typeface="Arial" pitchFamily="34" charset="0"/>
-              </a:rPr>
-              <a:t>Presentation/Outline.docx</a:t>
-            </a:r>
-            <a:endParaRPr lang="en-US">
-              <a:latin typeface="Bell MT" pitchFamily="18" charset="0"/>
-              <a:cs typeface="Arial" pitchFamily="34" charset="0"/>
-            </a:endParaRPr>
+            <a:endParaRPr lang="de-DE"/>
           </a:p>
         </p:txBody>
       </p:sp>
+      <p:sp>
+        <p:nvSpPr>
+          <p:cNvPr id="7" name="Inhaltsplatzhalter 6"/>
+          <p:cNvSpPr>
+            <a:spLocks noGrp="1"/>
+          </p:cNvSpPr>
+          <p:nvPr>
+            <p:ph idx="1"/>
+          </p:nvPr>
+        </p:nvSpPr>
+        <p:spPr/>
+        <p:txBody>
+          <a:bodyPr/>
+          <a:lstStyle/>
+          <a:p>
+            <a:endParaRPr lang="de-DE" dirty="0"/>
+          </a:p>
+        </p:txBody>
+      </p:sp>
+      <p:sp>
+        <p:nvSpPr>
+          <p:cNvPr id="9" name="Rechteck 8"/>
+          <p:cNvSpPr/>
+          <p:nvPr/>
+        </p:nvSpPr>
+        <p:spPr>
+          <a:xfrm>
+            <a:off x="0" y="0"/>
+            <a:ext cx="9144000" cy="6858000"/>
+          </a:xfrm>
+          <a:prstGeom prst="rect">
+            <a:avLst/>
+          </a:prstGeom>
+          <a:solidFill>
+            <a:schemeClr val="tx1"/>
+          </a:solidFill>
+          <a:ln>
+            <a:solidFill>
+              <a:schemeClr val="tx1"/>
+            </a:solidFill>
+          </a:ln>
+        </p:spPr>
+        <p:style>
+          <a:lnRef idx="2">
+            <a:schemeClr val="accent1">
+              <a:shade val="50000"/>
+            </a:schemeClr>
+          </a:lnRef>
+          <a:fillRef idx="1">
+            <a:schemeClr val="accent1"/>
+          </a:fillRef>
+          <a:effectRef idx="0">
+            <a:schemeClr val="accent1"/>
+          </a:effectRef>
+          <a:fontRef idx="minor">
+            <a:schemeClr val="lt1"/>
+          </a:fontRef>
+        </p:style>
+        <p:txBody>
+          <a:bodyPr rtlCol="0" anchor="ctr"/>
+          <a:lstStyle/>
+          <a:p>
+            <a:pPr algn="ctr"/>
+            <a:endParaRPr lang="de-DE"/>
+          </a:p>
+        </p:txBody>
+      </p:sp>
+      <p:pic>
+        <p:nvPicPr>
+          <p:cNvPr id="27649" name="Picture 1"/>
+          <p:cNvPicPr>
+            <a:picLocks noChangeAspect="1" noChangeArrowheads="1"/>
+          </p:cNvPicPr>
+          <p:nvPr/>
+        </p:nvPicPr>
+        <p:blipFill>
+          <a:blip r:embed="rId2" cstate="print"/>
+          <a:srcRect/>
+          <a:stretch>
+            <a:fillRect/>
+          </a:stretch>
+        </p:blipFill>
+        <p:spPr bwMode="auto">
+          <a:xfrm>
+            <a:off x="1475656" y="188640"/>
+            <a:ext cx="5924550" cy="6419850"/>
+          </a:xfrm>
+          <a:prstGeom prst="rect">
+            <a:avLst/>
+          </a:prstGeom>
+          <a:noFill/>
+          <a:ln w="9525">
+            <a:noFill/>
+            <a:miter lim="800000"/>
+            <a:headEnd/>
+            <a:tailEnd/>
+          </a:ln>
+        </p:spPr>
+      </p:pic>
     </p:spTree>
   </p:cSld>
   <p:clrMapOvr>

</xml_diff>

<commit_message>
modified readme and the presentation files
</commit_message>
<xml_diff>
--- a/presentation/Design Patterns.pptx
+++ b/presentation/Design Patterns.pptx
@@ -5,7 +5,7 @@
     <p:sldMasterId id="2147483660" r:id="rId1"/>
   </p:sldMasterIdLst>
   <p:notesMasterIdLst>
-    <p:notesMasterId r:id="rId19"/>
+    <p:notesMasterId r:id="rId20"/>
   </p:notesMasterIdLst>
   <p:sldIdLst>
     <p:sldId id="256" r:id="rId2"/>
@@ -24,7 +24,8 @@
     <p:sldId id="270" r:id="rId15"/>
     <p:sldId id="271" r:id="rId16"/>
     <p:sldId id="272" r:id="rId17"/>
-    <p:sldId id="259" r:id="rId18"/>
+    <p:sldId id="273" r:id="rId18"/>
+    <p:sldId id="259" r:id="rId19"/>
   </p:sldIdLst>
   <p:sldSz cx="9144000" cy="6858000" type="screen4x3"/>
   <p:notesSz cx="6858000" cy="9144000"/>
@@ -11263,49 +11264,6 @@
           </a:ln>
         </p:spPr>
       </p:pic>
-      <p:pic>
-        <p:nvPicPr>
-          <p:cNvPr id="33797" name="Picture 5"/>
-          <p:cNvPicPr>
-            <a:picLocks noChangeAspect="1" noChangeArrowheads="1"/>
-          </p:cNvPicPr>
-          <p:nvPr/>
-        </p:nvPicPr>
-        <p:blipFill>
-          <a:blip r:embed="rId5" cstate="print"/>
-          <a:srcRect/>
-          <a:stretch>
-            <a:fillRect/>
-          </a:stretch>
-        </p:blipFill>
-        <p:spPr bwMode="auto">
-          <a:xfrm>
-            <a:off x="1762125" y="904875"/>
-            <a:ext cx="5619750" cy="5048250"/>
-          </a:xfrm>
-          <a:prstGeom prst="rect">
-            <a:avLst/>
-          </a:prstGeom>
-          <a:solidFill>
-            <a:srgbClr val="000000">
-              <a:shade val="95000"/>
-            </a:srgbClr>
-          </a:solidFill>
-          <a:ln w="1905000" cap="sq">
-            <a:solidFill>
-              <a:srgbClr val="000000"/>
-            </a:solidFill>
-            <a:miter lim="800000"/>
-          </a:ln>
-          <a:effectLst>
-            <a:outerShdw blurRad="254000" dist="190500" dir="2700000" sy="90000" algn="bl" rotWithShape="0">
-              <a:srgbClr val="000000">
-                <a:alpha val="40000"/>
-              </a:srgbClr>
-            </a:outerShdw>
-          </a:effectLst>
-        </p:spPr>
-      </p:pic>
       <p:cxnSp>
         <p:nvCxnSpPr>
           <p:cNvPr id="20" name="Gerade Verbindung mit Pfeil 19"/>
@@ -11388,6 +11346,49 @@
           </a:fontRef>
         </p:style>
       </p:cxnSp>
+      <p:pic>
+        <p:nvPicPr>
+          <p:cNvPr id="33797" name="Picture 5"/>
+          <p:cNvPicPr>
+            <a:picLocks noChangeAspect="1" noChangeArrowheads="1"/>
+          </p:cNvPicPr>
+          <p:nvPr/>
+        </p:nvPicPr>
+        <p:blipFill>
+          <a:blip r:embed="rId5" cstate="print"/>
+          <a:srcRect/>
+          <a:stretch>
+            <a:fillRect/>
+          </a:stretch>
+        </p:blipFill>
+        <p:spPr bwMode="auto">
+          <a:xfrm>
+            <a:off x="1762125" y="904875"/>
+            <a:ext cx="5619750" cy="5048250"/>
+          </a:xfrm>
+          <a:prstGeom prst="rect">
+            <a:avLst/>
+          </a:prstGeom>
+          <a:solidFill>
+            <a:srgbClr val="000000">
+              <a:shade val="95000"/>
+            </a:srgbClr>
+          </a:solidFill>
+          <a:ln w="1905000" cap="sq">
+            <a:solidFill>
+              <a:srgbClr val="000000"/>
+            </a:solidFill>
+            <a:miter lim="800000"/>
+          </a:ln>
+          <a:effectLst>
+            <a:outerShdw blurRad="254000" dist="190500" dir="2700000" sy="90000" algn="bl" rotWithShape="0">
+              <a:srgbClr val="000000">
+                <a:alpha val="40000"/>
+              </a:srgbClr>
+            </a:outerShdw>
+          </a:effectLst>
+        </p:spPr>
+      </p:pic>
     </p:spTree>
   </p:cSld>
   <p:clrMapOvr>
@@ -11472,6 +11473,87 @@
 </file>
 
 <file path=ppt/slides/slide17.xml><?xml version="1.0" encoding="utf-8"?>
+<p:sld xmlns:a="http://schemas.openxmlformats.org/drawingml/2006/main" xmlns:r="http://schemas.openxmlformats.org/officeDocument/2006/relationships" xmlns:p="http://schemas.openxmlformats.org/presentationml/2006/main">
+  <p:cSld>
+    <p:spTree>
+      <p:nvGrpSpPr>
+        <p:cNvPr id="1" name=""/>
+        <p:cNvGrpSpPr/>
+        <p:nvPr/>
+      </p:nvGrpSpPr>
+      <p:grpSpPr>
+        <a:xfrm>
+          <a:off x="0" y="0"/>
+          <a:ext cx="0" cy="0"/>
+          <a:chOff x="0" y="0"/>
+          <a:chExt cx="0" cy="0"/>
+        </a:xfrm>
+      </p:grpSpPr>
+      <p:sp>
+        <p:nvSpPr>
+          <p:cNvPr id="2" name="Titel 1"/>
+          <p:cNvSpPr>
+            <a:spLocks noGrp="1"/>
+          </p:cNvSpPr>
+          <p:nvPr>
+            <p:ph type="title"/>
+          </p:nvPr>
+        </p:nvSpPr>
+        <p:spPr/>
+        <p:txBody>
+          <a:bodyPr>
+            <a:noAutofit/>
+          </a:bodyPr>
+          <a:lstStyle/>
+          <a:p>
+            <a:pPr lvl="0"/>
+            <a:r>
+              <a:rPr lang="en-US" sz="3200" dirty="0" smtClean="0"/>
+              <a:t>Patterns </a:t>
+            </a:r>
+            <a:r>
+              <a:rPr lang="en-US" sz="3200" dirty="0" smtClean="0"/>
+              <a:t>for Concurrent and Networked </a:t>
+            </a:r>
+            <a:r>
+              <a:rPr lang="en-US" sz="3200" dirty="0" smtClean="0"/>
+              <a:t>Objects</a:t>
+            </a:r>
+            <a:br>
+              <a:rPr lang="en-US" sz="3200" dirty="0" smtClean="0"/>
+            </a:br>
+            <a:endParaRPr lang="en-US" sz="3200" dirty="0"/>
+          </a:p>
+        </p:txBody>
+      </p:sp>
+      <p:sp>
+        <p:nvSpPr>
+          <p:cNvPr id="3" name="Inhaltsplatzhalter 2"/>
+          <p:cNvSpPr>
+            <a:spLocks noGrp="1"/>
+          </p:cNvSpPr>
+          <p:nvPr>
+            <p:ph idx="1"/>
+          </p:nvPr>
+        </p:nvSpPr>
+        <p:spPr/>
+        <p:txBody>
+          <a:bodyPr/>
+          <a:lstStyle/>
+          <a:p>
+            <a:endParaRPr lang="en-US"/>
+          </a:p>
+        </p:txBody>
+      </p:sp>
+    </p:spTree>
+  </p:cSld>
+  <p:clrMapOvr>
+    <a:masterClrMapping/>
+  </p:clrMapOvr>
+</p:sld>
+</file>
+
+<file path=ppt/slides/slide18.xml><?xml version="1.0" encoding="utf-8"?>
 <p:sld xmlns:a="http://schemas.openxmlformats.org/drawingml/2006/main" xmlns:r="http://schemas.openxmlformats.org/officeDocument/2006/relationships" xmlns:p="http://schemas.openxmlformats.org/presentationml/2006/main">
   <p:cSld>
     <p:spTree>

</xml_diff>

<commit_message>
worked on presentation -> demo part
</commit_message>
<xml_diff>
--- a/presentation/Design Patterns.pptx
+++ b/presentation/Design Patterns.pptx
@@ -5,7 +5,7 @@
     <p:sldMasterId id="2147483660" r:id="rId1"/>
   </p:sldMasterIdLst>
   <p:notesMasterIdLst>
-    <p:notesMasterId r:id="rId27"/>
+    <p:notesMasterId r:id="rId31"/>
   </p:notesMasterIdLst>
   <p:sldIdLst>
     <p:sldId id="256" r:id="rId2"/>
@@ -32,7 +32,11 @@
     <p:sldId id="279" r:id="rId23"/>
     <p:sldId id="280" r:id="rId24"/>
     <p:sldId id="278" r:id="rId25"/>
-    <p:sldId id="259" r:id="rId26"/>
+    <p:sldId id="281" r:id="rId26"/>
+    <p:sldId id="283" r:id="rId27"/>
+    <p:sldId id="282" r:id="rId28"/>
+    <p:sldId id="284" r:id="rId29"/>
+    <p:sldId id="259" r:id="rId30"/>
   </p:sldIdLst>
   <p:sldSz cx="9144000" cy="6858000" type="screen4x3"/>
   <p:notesSz cx="6858000" cy="9144000"/>
@@ -3877,6 +3881,13 @@
         </dgm:presLayoutVars>
       </dgm:prSet>
       <dgm:spPr/>
+      <dgm:t>
+        <a:bodyPr/>
+        <a:lstStyle/>
+        <a:p>
+          <a:endParaRPr lang="de-DE"/>
+        </a:p>
+      </dgm:t>
     </dgm:pt>
     <dgm:pt modelId="{FB5F408D-1C69-4101-BD49-63EC282DF85D}" type="pres">
       <dgm:prSet presAssocID="{A2B8A66F-00A2-489B-A4AD-A84E9CA6D163}" presName="linNode" presStyleCnt="0"/>
@@ -3914,6 +3925,13 @@
         </dgm:presLayoutVars>
       </dgm:prSet>
       <dgm:spPr/>
+      <dgm:t>
+        <a:bodyPr/>
+        <a:lstStyle/>
+        <a:p>
+          <a:endParaRPr lang="de-DE"/>
+        </a:p>
+      </dgm:t>
     </dgm:pt>
     <dgm:pt modelId="{8DD53816-F4CF-411E-AE79-8E3BA97722E8}" type="pres">
       <dgm:prSet presAssocID="{CFCE6456-C4BB-4A14-8C1A-685F7BEA0B87}" presName="sp" presStyleCnt="0"/>
@@ -3955,18 +3973,25 @@
         </dgm:presLayoutVars>
       </dgm:prSet>
       <dgm:spPr/>
+      <dgm:t>
+        <a:bodyPr/>
+        <a:lstStyle/>
+        <a:p>
+          <a:endParaRPr lang="de-DE"/>
+        </a:p>
+      </dgm:t>
     </dgm:pt>
   </dgm:ptLst>
   <dgm:cxnLst>
+    <dgm:cxn modelId="{DBEA0B5A-A90D-4DAA-BA5C-9677C4715319}" type="presOf" srcId="{9BC09347-B33D-4979-9BDB-E36C7B30CBBA}" destId="{E63503F8-AAFE-4BAA-8D4E-448F984C98D8}" srcOrd="0" destOrd="0" presId="urn:microsoft.com/office/officeart/2005/8/layout/vList5"/>
+    <dgm:cxn modelId="{0E21A504-B936-4C33-8A75-641DA3707E7F}" srcId="{9B094859-64CF-43E2-84E3-5C2C137C1AE4}" destId="{552DEA89-C539-4395-A106-B0D2CFAEC0C4}" srcOrd="3" destOrd="0" parTransId="{4E93E06C-44D9-4AD8-9417-E359CCD1CC4C}" sibTransId="{C876DB4F-7528-4CCF-83D8-03DA5F64EBB9}"/>
+    <dgm:cxn modelId="{2815016F-AA00-4522-9087-9EBE388F41D5}" type="presOf" srcId="{552DEA89-C539-4395-A106-B0D2CFAEC0C4}" destId="{60494F3F-B686-4940-983F-1C72649574BB}" srcOrd="0" destOrd="0" presId="urn:microsoft.com/office/officeart/2005/8/layout/vList5"/>
+    <dgm:cxn modelId="{9DACFB29-D503-47DE-A112-9608887D92A1}" type="presOf" srcId="{9B094859-64CF-43E2-84E3-5C2C137C1AE4}" destId="{111A599B-EA97-4DC2-BF4C-8A6DA8FE7850}" srcOrd="0" destOrd="0" presId="urn:microsoft.com/office/officeart/2005/8/layout/vList5"/>
+    <dgm:cxn modelId="{14099E3B-A0C4-4EE6-AED6-D3E228B8A8F7}" type="presOf" srcId="{A2B8A66F-00A2-489B-A4AD-A84E9CA6D163}" destId="{082BB027-6359-45A9-905C-ACA83F9E48B2}" srcOrd="0" destOrd="0" presId="urn:microsoft.com/office/officeart/2005/8/layout/vList5"/>
+    <dgm:cxn modelId="{0D960763-A5E3-405B-899A-B575859CD7B8}" type="presOf" srcId="{19363DDF-615E-40BE-9E5E-4D3D9BB3CAA6}" destId="{87CD7CF8-79B5-416A-967B-F89FBA3DBED1}" srcOrd="0" destOrd="0" presId="urn:microsoft.com/office/officeart/2005/8/layout/vList5"/>
     <dgm:cxn modelId="{5C7C83F4-A3F9-46C8-B997-B717E9651361}" srcId="{9B094859-64CF-43E2-84E3-5C2C137C1AE4}" destId="{A2B8A66F-00A2-489B-A4AD-A84E9CA6D163}" srcOrd="0" destOrd="0" parTransId="{AA678909-AD5D-469C-AFA9-69B96C003BBB}" sibTransId="{90EDBD5F-B7B0-45C8-859F-7ED3086B50DC}"/>
-    <dgm:cxn modelId="{9DACFB29-D503-47DE-A112-9608887D92A1}" type="presOf" srcId="{9B094859-64CF-43E2-84E3-5C2C137C1AE4}" destId="{111A599B-EA97-4DC2-BF4C-8A6DA8FE7850}" srcOrd="0" destOrd="0" presId="urn:microsoft.com/office/officeart/2005/8/layout/vList5"/>
-    <dgm:cxn modelId="{0D960763-A5E3-405B-899A-B575859CD7B8}" type="presOf" srcId="{19363DDF-615E-40BE-9E5E-4D3D9BB3CAA6}" destId="{87CD7CF8-79B5-416A-967B-F89FBA3DBED1}" srcOrd="0" destOrd="0" presId="urn:microsoft.com/office/officeart/2005/8/layout/vList5"/>
+    <dgm:cxn modelId="{C344B9F3-4A37-4607-B718-D2DEBE1D5C6E}" srcId="{9B094859-64CF-43E2-84E3-5C2C137C1AE4}" destId="{9BC09347-B33D-4979-9BDB-E36C7B30CBBA}" srcOrd="2" destOrd="0" parTransId="{A7B10C6A-5E76-4F3B-93CA-9027D009C27B}" sibTransId="{5F6C0C8C-6177-488A-A37D-925D034EFCAC}"/>
     <dgm:cxn modelId="{B4147CAF-6A66-4AD5-80B9-30BC3C4F17E1}" srcId="{9B094859-64CF-43E2-84E3-5C2C137C1AE4}" destId="{19363DDF-615E-40BE-9E5E-4D3D9BB3CAA6}" srcOrd="1" destOrd="0" parTransId="{E3A5C0A8-31A9-48E7-92DB-42DF2B29BAB1}" sibTransId="{CFCE6456-C4BB-4A14-8C1A-685F7BEA0B87}"/>
-    <dgm:cxn modelId="{14099E3B-A0C4-4EE6-AED6-D3E228B8A8F7}" type="presOf" srcId="{A2B8A66F-00A2-489B-A4AD-A84E9CA6D163}" destId="{082BB027-6359-45A9-905C-ACA83F9E48B2}" srcOrd="0" destOrd="0" presId="urn:microsoft.com/office/officeart/2005/8/layout/vList5"/>
-    <dgm:cxn modelId="{0E21A504-B936-4C33-8A75-641DA3707E7F}" srcId="{9B094859-64CF-43E2-84E3-5C2C137C1AE4}" destId="{552DEA89-C539-4395-A106-B0D2CFAEC0C4}" srcOrd="3" destOrd="0" parTransId="{4E93E06C-44D9-4AD8-9417-E359CCD1CC4C}" sibTransId="{C876DB4F-7528-4CCF-83D8-03DA5F64EBB9}"/>
-    <dgm:cxn modelId="{DBEA0B5A-A90D-4DAA-BA5C-9677C4715319}" type="presOf" srcId="{9BC09347-B33D-4979-9BDB-E36C7B30CBBA}" destId="{E63503F8-AAFE-4BAA-8D4E-448F984C98D8}" srcOrd="0" destOrd="0" presId="urn:microsoft.com/office/officeart/2005/8/layout/vList5"/>
-    <dgm:cxn modelId="{C344B9F3-4A37-4607-B718-D2DEBE1D5C6E}" srcId="{9B094859-64CF-43E2-84E3-5C2C137C1AE4}" destId="{9BC09347-B33D-4979-9BDB-E36C7B30CBBA}" srcOrd="2" destOrd="0" parTransId="{A7B10C6A-5E76-4F3B-93CA-9027D009C27B}" sibTransId="{5F6C0C8C-6177-488A-A37D-925D034EFCAC}"/>
-    <dgm:cxn modelId="{2815016F-AA00-4522-9087-9EBE388F41D5}" type="presOf" srcId="{552DEA89-C539-4395-A106-B0D2CFAEC0C4}" destId="{60494F3F-B686-4940-983F-1C72649574BB}" srcOrd="0" destOrd="0" presId="urn:microsoft.com/office/officeart/2005/8/layout/vList5"/>
     <dgm:cxn modelId="{3C1F2102-CD8A-4343-A860-5BE7B6C14B41}" type="presParOf" srcId="{111A599B-EA97-4DC2-BF4C-8A6DA8FE7850}" destId="{FB5F408D-1C69-4101-BD49-63EC282DF85D}" srcOrd="0" destOrd="0" presId="urn:microsoft.com/office/officeart/2005/8/layout/vList5"/>
     <dgm:cxn modelId="{0146E2F0-2E73-4B1D-87B6-71BD2EB64C2D}" type="presParOf" srcId="{FB5F408D-1C69-4101-BD49-63EC282DF85D}" destId="{082BB027-6359-45A9-905C-ACA83F9E48B2}" srcOrd="0" destOrd="0" presId="urn:microsoft.com/office/officeart/2005/8/layout/vList5"/>
     <dgm:cxn modelId="{6035159D-5BC2-47DE-8375-B10C07B88641}" type="presParOf" srcId="{111A599B-EA97-4DC2-BF4C-8A6DA8FE7850}" destId="{1C4285F0-7F7E-4417-BC38-6822BA52F0FF}" srcOrd="1" destOrd="0" presId="urn:microsoft.com/office/officeart/2005/8/layout/vList5"/>
@@ -4292,6 +4317,13 @@
         </dgm:presLayoutVars>
       </dgm:prSet>
       <dgm:spPr/>
+      <dgm:t>
+        <a:bodyPr/>
+        <a:lstStyle/>
+        <a:p>
+          <a:endParaRPr lang="de-DE"/>
+        </a:p>
+      </dgm:t>
     </dgm:pt>
     <dgm:pt modelId="{FB5F408D-1C69-4101-BD49-63EC282DF85D}" type="pres">
       <dgm:prSet presAssocID="{A2B8A66F-00A2-489B-A4AD-A84E9CA6D163}" presName="linNode" presStyleCnt="0"/>
@@ -4344,6 +4376,13 @@
         </dgm:presLayoutVars>
       </dgm:prSet>
       <dgm:spPr/>
+      <dgm:t>
+        <a:bodyPr/>
+        <a:lstStyle/>
+        <a:p>
+          <a:endParaRPr lang="de-DE"/>
+        </a:p>
+      </dgm:t>
     </dgm:pt>
     <dgm:pt modelId="{CFA3EF0F-E32F-4919-8FAD-A97203F6D04C}" type="pres">
       <dgm:prSet presAssocID="{19363DDF-615E-40BE-9E5E-4D3D9BB3CAA6}" presName="descendantText" presStyleLbl="alignAccFollowNode1" presStyleIdx="1" presStyleCnt="4" custScaleY="113084">
@@ -4415,6 +4454,13 @@
         </dgm:presLayoutVars>
       </dgm:prSet>
       <dgm:spPr/>
+      <dgm:t>
+        <a:bodyPr/>
+        <a:lstStyle/>
+        <a:p>
+          <a:endParaRPr lang="de-DE"/>
+        </a:p>
+      </dgm:t>
     </dgm:pt>
     <dgm:pt modelId="{E245088C-AE90-4831-A6ED-F041C588B53D}" type="pres">
       <dgm:prSet presAssocID="{552DEA89-C539-4395-A106-B0D2CFAEC0C4}" presName="descendantText" presStyleLbl="alignAccFollowNode1" presStyleIdx="3" presStyleCnt="4" custScaleY="113084">
@@ -4433,23 +4479,23 @@
     </dgm:pt>
   </dgm:ptLst>
   <dgm:cxnLst>
+    <dgm:cxn modelId="{C344B9F3-4A37-4607-B718-D2DEBE1D5C6E}" srcId="{9B094859-64CF-43E2-84E3-5C2C137C1AE4}" destId="{9BC09347-B33D-4979-9BDB-E36C7B30CBBA}" srcOrd="2" destOrd="0" parTransId="{A7B10C6A-5E76-4F3B-93CA-9027D009C27B}" sibTransId="{5F6C0C8C-6177-488A-A37D-925D034EFCAC}"/>
+    <dgm:cxn modelId="{1238CC98-DD3B-4BC5-8E64-E07E41C97C9D}" type="presOf" srcId="{9B094859-64CF-43E2-84E3-5C2C137C1AE4}" destId="{111A599B-EA97-4DC2-BF4C-8A6DA8FE7850}" srcOrd="0" destOrd="0" presId="urn:microsoft.com/office/officeart/2005/8/layout/vList5"/>
+    <dgm:cxn modelId="{2FB3C88A-9F6A-4884-BD03-9BB760CC7590}" type="presOf" srcId="{3E96148D-D17F-4733-B179-D5496FEB499F}" destId="{CFA3EF0F-E32F-4919-8FAD-A97203F6D04C}" srcOrd="0" destOrd="0" presId="urn:microsoft.com/office/officeart/2005/8/layout/vList5"/>
+    <dgm:cxn modelId="{D44312E4-74CF-4B2F-910B-7E06C9D55ABE}" srcId="{9BC09347-B33D-4979-9BDB-E36C7B30CBBA}" destId="{B6DB679C-C865-4F82-8C1F-D10AFF82174F}" srcOrd="0" destOrd="0" parTransId="{6A858F0D-FB09-4262-B0BC-A93F9ED5665B}" sibTransId="{50B38557-20D0-4551-87B9-BE63C766CC2B}"/>
+    <dgm:cxn modelId="{07548154-88E8-498A-AA67-0666225A42F3}" type="presOf" srcId="{B6DB679C-C865-4F82-8C1F-D10AFF82174F}" destId="{E27B0244-D2DB-48D7-866A-10FF9AEA5537}" srcOrd="0" destOrd="0" presId="urn:microsoft.com/office/officeart/2005/8/layout/vList5"/>
+    <dgm:cxn modelId="{5DBE8F18-B1E3-4C1C-B9C5-D6072DA8DAC6}" srcId="{A2B8A66F-00A2-489B-A4AD-A84E9CA6D163}" destId="{AA94DCE6-9613-4387-A2D5-632A9737BADF}" srcOrd="0" destOrd="0" parTransId="{16998827-5D9C-407F-AD34-E83863D575A6}" sibTransId="{1AEE6D3F-9838-4279-9EE3-704CEEEF7BDA}"/>
+    <dgm:cxn modelId="{CFD02CDB-2973-4533-A1B6-42DD5AE69130}" type="presOf" srcId="{9BC09347-B33D-4979-9BDB-E36C7B30CBBA}" destId="{E63503F8-AAFE-4BAA-8D4E-448F984C98D8}" srcOrd="0" destOrd="0" presId="urn:microsoft.com/office/officeart/2005/8/layout/vList5"/>
     <dgm:cxn modelId="{5C7C83F4-A3F9-46C8-B997-B717E9651361}" srcId="{9B094859-64CF-43E2-84E3-5C2C137C1AE4}" destId="{A2B8A66F-00A2-489B-A4AD-A84E9CA6D163}" srcOrd="0" destOrd="0" parTransId="{AA678909-AD5D-469C-AFA9-69B96C003BBB}" sibTransId="{90EDBD5F-B7B0-45C8-859F-7ED3086B50DC}"/>
-    <dgm:cxn modelId="{1238CC98-DD3B-4BC5-8E64-E07E41C97C9D}" type="presOf" srcId="{9B094859-64CF-43E2-84E3-5C2C137C1AE4}" destId="{111A599B-EA97-4DC2-BF4C-8A6DA8FE7850}" srcOrd="0" destOrd="0" presId="urn:microsoft.com/office/officeart/2005/8/layout/vList5"/>
+    <dgm:cxn modelId="{58F648DC-CBC0-4F7D-9463-921B95CC3EBD}" type="presOf" srcId="{AA94DCE6-9613-4387-A2D5-632A9737BADF}" destId="{748CF2E3-6A35-43D7-9F44-D9F9BA74867A}" srcOrd="0" destOrd="0" presId="urn:microsoft.com/office/officeart/2005/8/layout/vList5"/>
+    <dgm:cxn modelId="{0E21A504-B936-4C33-8A75-641DA3707E7F}" srcId="{9B094859-64CF-43E2-84E3-5C2C137C1AE4}" destId="{552DEA89-C539-4395-A106-B0D2CFAEC0C4}" srcOrd="3" destOrd="0" parTransId="{4E93E06C-44D9-4AD8-9417-E359CCD1CC4C}" sibTransId="{C876DB4F-7528-4CCF-83D8-03DA5F64EBB9}"/>
+    <dgm:cxn modelId="{D3E52FCE-6791-42F8-8BA3-A14ED795C0FF}" srcId="{19363DDF-615E-40BE-9E5E-4D3D9BB3CAA6}" destId="{3E96148D-D17F-4733-B179-D5496FEB499F}" srcOrd="0" destOrd="0" parTransId="{C9943526-A6EC-4E5C-A1CC-CC84EBBB7DA9}" sibTransId="{3601115B-4296-4145-87CC-E83BC373ECBB}"/>
+    <dgm:cxn modelId="{9DFE0D66-237A-43A5-96DF-5C339908DAEB}" type="presOf" srcId="{552DEA89-C539-4395-A106-B0D2CFAEC0C4}" destId="{60494F3F-B686-4940-983F-1C72649574BB}" srcOrd="0" destOrd="0" presId="urn:microsoft.com/office/officeart/2005/8/layout/vList5"/>
+    <dgm:cxn modelId="{B4147CAF-6A66-4AD5-80B9-30BC3C4F17E1}" srcId="{9B094859-64CF-43E2-84E3-5C2C137C1AE4}" destId="{19363DDF-615E-40BE-9E5E-4D3D9BB3CAA6}" srcOrd="1" destOrd="0" parTransId="{E3A5C0A8-31A9-48E7-92DB-42DF2B29BAB1}" sibTransId="{CFCE6456-C4BB-4A14-8C1A-685F7BEA0B87}"/>
+    <dgm:cxn modelId="{AF8074F0-6C38-48A7-805C-55687DF824B0}" type="presOf" srcId="{19363DDF-615E-40BE-9E5E-4D3D9BB3CAA6}" destId="{87CD7CF8-79B5-416A-967B-F89FBA3DBED1}" srcOrd="0" destOrd="0" presId="urn:microsoft.com/office/officeart/2005/8/layout/vList5"/>
     <dgm:cxn modelId="{3FBAE32D-5A06-464F-ABD0-A3B333C789B5}" type="presOf" srcId="{A2B8A66F-00A2-489B-A4AD-A84E9CA6D163}" destId="{082BB027-6359-45A9-905C-ACA83F9E48B2}" srcOrd="0" destOrd="0" presId="urn:microsoft.com/office/officeart/2005/8/layout/vList5"/>
-    <dgm:cxn modelId="{07548154-88E8-498A-AA67-0666225A42F3}" type="presOf" srcId="{B6DB679C-C865-4F82-8C1F-D10AFF82174F}" destId="{E27B0244-D2DB-48D7-866A-10FF9AEA5537}" srcOrd="0" destOrd="0" presId="urn:microsoft.com/office/officeart/2005/8/layout/vList5"/>
-    <dgm:cxn modelId="{B4147CAF-6A66-4AD5-80B9-30BC3C4F17E1}" srcId="{9B094859-64CF-43E2-84E3-5C2C137C1AE4}" destId="{19363DDF-615E-40BE-9E5E-4D3D9BB3CAA6}" srcOrd="1" destOrd="0" parTransId="{E3A5C0A8-31A9-48E7-92DB-42DF2B29BAB1}" sibTransId="{CFCE6456-C4BB-4A14-8C1A-685F7BEA0B87}"/>
-    <dgm:cxn modelId="{D44312E4-74CF-4B2F-910B-7E06C9D55ABE}" srcId="{9BC09347-B33D-4979-9BDB-E36C7B30CBBA}" destId="{B6DB679C-C865-4F82-8C1F-D10AFF82174F}" srcOrd="0" destOrd="0" parTransId="{6A858F0D-FB09-4262-B0BC-A93F9ED5665B}" sibTransId="{50B38557-20D0-4551-87B9-BE63C766CC2B}"/>
-    <dgm:cxn modelId="{5DBE8F18-B1E3-4C1C-B9C5-D6072DA8DAC6}" srcId="{A2B8A66F-00A2-489B-A4AD-A84E9CA6D163}" destId="{AA94DCE6-9613-4387-A2D5-632A9737BADF}" srcOrd="0" destOrd="0" parTransId="{16998827-5D9C-407F-AD34-E83863D575A6}" sibTransId="{1AEE6D3F-9838-4279-9EE3-704CEEEF7BDA}"/>
     <dgm:cxn modelId="{D8507855-EDC0-4B24-8975-AA8ED513D6EA}" srcId="{552DEA89-C539-4395-A106-B0D2CFAEC0C4}" destId="{0FFFF5FF-ECD8-4251-967E-29766560BAB1}" srcOrd="0" destOrd="0" parTransId="{9F8A1712-A2E8-4AF2-A489-94AF313D43D8}" sibTransId="{26B373E8-6879-45CB-BE35-1AF6147F2A70}"/>
     <dgm:cxn modelId="{5CE65E79-61FC-4AF2-8D8E-41174F0D462E}" type="presOf" srcId="{0FFFF5FF-ECD8-4251-967E-29766560BAB1}" destId="{E245088C-AE90-4831-A6ED-F041C588B53D}" srcOrd="0" destOrd="0" presId="urn:microsoft.com/office/officeart/2005/8/layout/vList5"/>
-    <dgm:cxn modelId="{D3E52FCE-6791-42F8-8BA3-A14ED795C0FF}" srcId="{19363DDF-615E-40BE-9E5E-4D3D9BB3CAA6}" destId="{3E96148D-D17F-4733-B179-D5496FEB499F}" srcOrd="0" destOrd="0" parTransId="{C9943526-A6EC-4E5C-A1CC-CC84EBBB7DA9}" sibTransId="{3601115B-4296-4145-87CC-E83BC373ECBB}"/>
-    <dgm:cxn modelId="{AF8074F0-6C38-48A7-805C-55687DF824B0}" type="presOf" srcId="{19363DDF-615E-40BE-9E5E-4D3D9BB3CAA6}" destId="{87CD7CF8-79B5-416A-967B-F89FBA3DBED1}" srcOrd="0" destOrd="0" presId="urn:microsoft.com/office/officeart/2005/8/layout/vList5"/>
-    <dgm:cxn modelId="{0E21A504-B936-4C33-8A75-641DA3707E7F}" srcId="{9B094859-64CF-43E2-84E3-5C2C137C1AE4}" destId="{552DEA89-C539-4395-A106-B0D2CFAEC0C4}" srcOrd="3" destOrd="0" parTransId="{4E93E06C-44D9-4AD8-9417-E359CCD1CC4C}" sibTransId="{C876DB4F-7528-4CCF-83D8-03DA5F64EBB9}"/>
-    <dgm:cxn modelId="{58F648DC-CBC0-4F7D-9463-921B95CC3EBD}" type="presOf" srcId="{AA94DCE6-9613-4387-A2D5-632A9737BADF}" destId="{748CF2E3-6A35-43D7-9F44-D9F9BA74867A}" srcOrd="0" destOrd="0" presId="urn:microsoft.com/office/officeart/2005/8/layout/vList5"/>
-    <dgm:cxn modelId="{2FB3C88A-9F6A-4884-BD03-9BB760CC7590}" type="presOf" srcId="{3E96148D-D17F-4733-B179-D5496FEB499F}" destId="{CFA3EF0F-E32F-4919-8FAD-A97203F6D04C}" srcOrd="0" destOrd="0" presId="urn:microsoft.com/office/officeart/2005/8/layout/vList5"/>
-    <dgm:cxn modelId="{C344B9F3-4A37-4607-B718-D2DEBE1D5C6E}" srcId="{9B094859-64CF-43E2-84E3-5C2C137C1AE4}" destId="{9BC09347-B33D-4979-9BDB-E36C7B30CBBA}" srcOrd="2" destOrd="0" parTransId="{A7B10C6A-5E76-4F3B-93CA-9027D009C27B}" sibTransId="{5F6C0C8C-6177-488A-A37D-925D034EFCAC}"/>
-    <dgm:cxn modelId="{CFD02CDB-2973-4533-A1B6-42DD5AE69130}" type="presOf" srcId="{9BC09347-B33D-4979-9BDB-E36C7B30CBBA}" destId="{E63503F8-AAFE-4BAA-8D4E-448F984C98D8}" srcOrd="0" destOrd="0" presId="urn:microsoft.com/office/officeart/2005/8/layout/vList5"/>
-    <dgm:cxn modelId="{9DFE0D66-237A-43A5-96DF-5C339908DAEB}" type="presOf" srcId="{552DEA89-C539-4395-A106-B0D2CFAEC0C4}" destId="{60494F3F-B686-4940-983F-1C72649574BB}" srcOrd="0" destOrd="0" presId="urn:microsoft.com/office/officeart/2005/8/layout/vList5"/>
     <dgm:cxn modelId="{FEB22461-8010-4025-BB89-E548578DD158}" type="presParOf" srcId="{111A599B-EA97-4DC2-BF4C-8A6DA8FE7850}" destId="{FB5F408D-1C69-4101-BD49-63EC282DF85D}" srcOrd="0" destOrd="0" presId="urn:microsoft.com/office/officeart/2005/8/layout/vList5"/>
     <dgm:cxn modelId="{275A771A-21D5-4DC7-9CAB-0A95300CE05A}" type="presParOf" srcId="{FB5F408D-1C69-4101-BD49-63EC282DF85D}" destId="{082BB027-6359-45A9-905C-ACA83F9E48B2}" srcOrd="0" destOrd="0" presId="urn:microsoft.com/office/officeart/2005/8/layout/vList5"/>
     <dgm:cxn modelId="{0416CEA8-FF54-4859-AB33-869C41B0E859}" type="presParOf" srcId="{FB5F408D-1C69-4101-BD49-63EC282DF85D}" destId="{748CF2E3-6A35-43D7-9F44-D9F9BA74867A}" srcOrd="1" destOrd="0" presId="urn:microsoft.com/office/officeart/2005/8/layout/vList5"/>
@@ -11424,7 +11470,7 @@
             <a:fld id="{E8A24FED-46CF-4A09-B1CC-1E0B6DF6FD6A}" type="datetimeFigureOut">
               <a:rPr lang="de-DE" smtClean="0"/>
               <a:pPr/>
-              <a:t>26.04.2016</a:t>
+              <a:t>29.04.2016</a:t>
             </a:fld>
             <a:endParaRPr lang="de-DE"/>
           </a:p>
@@ -12728,7 +12774,7 @@
             <a:fld id="{6824E8E0-4EA7-4878-AE2A-C2C03E66CD52}" type="datetimeFigureOut">
               <a:rPr lang="de-DE" smtClean="0"/>
               <a:pPr/>
-              <a:t>26.04.2016</a:t>
+              <a:t>29.04.2016</a:t>
             </a:fld>
             <a:endParaRPr lang="de-DE"/>
           </a:p>
@@ -12913,7 +12959,7 @@
             <a:fld id="{6824E8E0-4EA7-4878-AE2A-C2C03E66CD52}" type="datetimeFigureOut">
               <a:rPr lang="de-DE" smtClean="0"/>
               <a:pPr/>
-              <a:t>26.04.2016</a:t>
+              <a:t>29.04.2016</a:t>
             </a:fld>
             <a:endParaRPr lang="de-DE"/>
           </a:p>
@@ -13090,7 +13136,7 @@
             <a:fld id="{6824E8E0-4EA7-4878-AE2A-C2C03E66CD52}" type="datetimeFigureOut">
               <a:rPr lang="de-DE" smtClean="0"/>
               <a:pPr/>
-              <a:t>26.04.2016</a:t>
+              <a:t>29.04.2016</a:t>
             </a:fld>
             <a:endParaRPr lang="de-DE"/>
           </a:p>
@@ -13257,7 +13303,7 @@
             <a:fld id="{6824E8E0-4EA7-4878-AE2A-C2C03E66CD52}" type="datetimeFigureOut">
               <a:rPr lang="de-DE" smtClean="0"/>
               <a:pPr/>
-              <a:t>26.04.2016</a:t>
+              <a:t>29.04.2016</a:t>
             </a:fld>
             <a:endParaRPr lang="de-DE"/>
           </a:p>
@@ -13480,7 +13526,7 @@
             <a:fld id="{6824E8E0-4EA7-4878-AE2A-C2C03E66CD52}" type="datetimeFigureOut">
               <a:rPr lang="de-DE" smtClean="0"/>
               <a:pPr/>
-              <a:t>26.04.2016</a:t>
+              <a:t>29.04.2016</a:t>
             </a:fld>
             <a:endParaRPr lang="de-DE"/>
           </a:p>
@@ -13741,7 +13787,7 @@
             <a:fld id="{6824E8E0-4EA7-4878-AE2A-C2C03E66CD52}" type="datetimeFigureOut">
               <a:rPr lang="de-DE" smtClean="0"/>
               <a:pPr/>
-              <a:t>26.04.2016</a:t>
+              <a:t>29.04.2016</a:t>
             </a:fld>
             <a:endParaRPr lang="de-DE"/>
           </a:p>
@@ -14147,7 +14193,7 @@
             <a:fld id="{6824E8E0-4EA7-4878-AE2A-C2C03E66CD52}" type="datetimeFigureOut">
               <a:rPr lang="de-DE" smtClean="0"/>
               <a:pPr/>
-              <a:t>26.04.2016</a:t>
+              <a:t>29.04.2016</a:t>
             </a:fld>
             <a:endParaRPr lang="de-DE"/>
           </a:p>
@@ -14280,7 +14326,7 @@
             <a:fld id="{6824E8E0-4EA7-4878-AE2A-C2C03E66CD52}" type="datetimeFigureOut">
               <a:rPr lang="de-DE" smtClean="0"/>
               <a:pPr/>
-              <a:t>26.04.2016</a:t>
+              <a:t>29.04.2016</a:t>
             </a:fld>
             <a:endParaRPr lang="de-DE"/>
           </a:p>
@@ -14382,7 +14428,7 @@
             <a:fld id="{6824E8E0-4EA7-4878-AE2A-C2C03E66CD52}" type="datetimeFigureOut">
               <a:rPr lang="de-DE" smtClean="0"/>
               <a:pPr/>
-              <a:t>26.04.2016</a:t>
+              <a:t>29.04.2016</a:t>
             </a:fld>
             <a:endParaRPr lang="de-DE"/>
           </a:p>
@@ -14629,7 +14675,7 @@
             <a:fld id="{6824E8E0-4EA7-4878-AE2A-C2C03E66CD52}" type="datetimeFigureOut">
               <a:rPr lang="de-DE" smtClean="0"/>
               <a:pPr/>
-              <a:t>26.04.2016</a:t>
+              <a:t>29.04.2016</a:t>
             </a:fld>
             <a:endParaRPr lang="de-DE"/>
           </a:p>
@@ -14875,7 +14921,7 @@
             <a:fld id="{6824E8E0-4EA7-4878-AE2A-C2C03E66CD52}" type="datetimeFigureOut">
               <a:rPr lang="de-DE" smtClean="0"/>
               <a:pPr/>
-              <a:t>26.04.2016</a:t>
+              <a:t>29.04.2016</a:t>
             </a:fld>
             <a:endParaRPr lang="de-DE"/>
           </a:p>
@@ -15701,7 +15747,7 @@
             <a:fld id="{6824E8E0-4EA7-4878-AE2A-C2C03E66CD52}" type="datetimeFigureOut">
               <a:rPr lang="de-DE" smtClean="0"/>
               <a:pPr/>
-              <a:t>26.04.2016</a:t>
+              <a:t>29.04.2016</a:t>
             </a:fld>
             <a:endParaRPr lang="de-DE"/>
           </a:p>
@@ -18039,15 +18085,7 @@
                   <a:schemeClr val="accent2"/>
                 </a:solidFill>
               </a:rPr>
-              <a:t>Static and dynamic component </a:t>
-            </a:r>
-            <a:r>
-              <a:rPr lang="en-US" dirty="0" smtClean="0">
-                <a:solidFill>
-                  <a:schemeClr val="accent2"/>
-                </a:solidFill>
-              </a:rPr>
-              <a:t>configuration</a:t>
+              <a:t>Static and dynamic component configuration</a:t>
             </a:r>
             <a:br>
               <a:rPr lang="en-US" dirty="0" smtClean="0">
@@ -18295,6 +18333,13 @@
   <p:clrMapOvr>
     <a:masterClrMapping/>
   </p:clrMapOvr>
+  <p:timing>
+    <p:tnLst>
+      <p:par>
+        <p:cTn id="1" dur="indefinite" restart="never" nodeType="tmRoot"/>
+      </p:par>
+    </p:tnLst>
+  </p:timing>
 </p:sld>
 </file>
 
@@ -18444,11 +18489,7 @@
               </a:pPr>
               <a:r>
                 <a:rPr lang="en-US" sz="1400" dirty="0" smtClean="0"/>
-                <a:t> Extension </a:t>
-              </a:r>
-              <a:r>
-                <a:rPr lang="en-US" sz="1400" dirty="0" smtClean="0"/>
-                <a:t>Interface</a:t>
+                <a:t> Extension Interface</a:t>
               </a:r>
               <a:endParaRPr lang="en-US" sz="1400" dirty="0"/>
             </a:p>
@@ -18484,7 +18525,6 @@
                 <a:rPr lang="en-US" sz="1400" dirty="0" smtClean="0"/>
                 <a:t> Reactor</a:t>
               </a:r>
-              <a:endParaRPr lang="en-US" sz="1400" dirty="0" smtClean="0"/>
             </a:p>
             <a:p>
               <a:pPr lvl="0">
@@ -18522,11 +18562,7 @@
               </a:br>
               <a:r>
                 <a:rPr lang="en-US" sz="1400" dirty="0" smtClean="0"/>
-                <a:t>  Completion </a:t>
-              </a:r>
-              <a:r>
-                <a:rPr lang="en-US" sz="1400" dirty="0" smtClean="0"/>
-                <a:t>Token</a:t>
+                <a:t>  Completion Token</a:t>
               </a:r>
             </a:p>
             <a:p>
@@ -18570,11 +18606,7 @@
               </a:pPr>
               <a:r>
                 <a:rPr lang="en-US" sz="1400" dirty="0" smtClean="0"/>
-                <a:t> Scoped </a:t>
-              </a:r>
-              <a:r>
-                <a:rPr lang="en-US" sz="1400" dirty="0" smtClean="0"/>
-                <a:t>Locking</a:t>
+                <a:t> Scoped Locking</a:t>
               </a:r>
             </a:p>
             <a:p>
@@ -18601,11 +18633,7 @@
               </a:pPr>
               <a:r>
                 <a:rPr lang="en-US" sz="1400" dirty="0" smtClean="0"/>
-                <a:t> Thread-Safe </a:t>
-              </a:r>
-              <a:r>
-                <a:rPr lang="en-US" sz="1400" dirty="0" smtClean="0"/>
-                <a:t>Interface</a:t>
+                <a:t> Thread-Safe Interface</a:t>
               </a:r>
             </a:p>
             <a:p>
@@ -18656,11 +18684,7 @@
               </a:pPr>
               <a:r>
                 <a:rPr lang="en-US" sz="1400" dirty="0" smtClean="0"/>
-                <a:t> Active </a:t>
-              </a:r>
-              <a:r>
-                <a:rPr lang="en-US" sz="1400" dirty="0" smtClean="0"/>
-                <a:t>Object</a:t>
+                <a:t> Active Object</a:t>
               </a:r>
             </a:p>
             <a:p>
@@ -18670,11 +18694,7 @@
               </a:pPr>
               <a:r>
                 <a:rPr lang="en-US" sz="1400" dirty="0" smtClean="0"/>
-                <a:t> Monitor </a:t>
-              </a:r>
-              <a:r>
-                <a:rPr lang="en-US" sz="1400" dirty="0" smtClean="0"/>
-                <a:t>Object</a:t>
+                <a:t> Monitor Object</a:t>
               </a:r>
             </a:p>
             <a:p>
@@ -18701,7 +18721,6 @@
                 <a:rPr lang="en-US" sz="1400" dirty="0" smtClean="0"/>
                 <a:t> Leader/Followers</a:t>
               </a:r>
-              <a:endParaRPr lang="en-US" sz="1400" dirty="0" smtClean="0"/>
             </a:p>
             <a:p>
               <a:pPr lvl="0">
@@ -18710,11 +18729,7 @@
               </a:pPr>
               <a:r>
                 <a:rPr lang="en-US" sz="1400" dirty="0" smtClean="0"/>
-                <a:t> Thread-Specific </a:t>
-              </a:r>
-              <a:r>
-                <a:rPr lang="en-US" sz="1400" dirty="0" smtClean="0"/>
-                <a:t>Storage</a:t>
+                <a:t> Thread-Specific Storage</a:t>
               </a:r>
               <a:endParaRPr lang="en-US" sz="1400" dirty="0"/>
             </a:p>
@@ -18726,6 +18741,13 @@
   <p:clrMapOvr>
     <a:masterClrMapping/>
   </p:clrMapOvr>
+  <p:timing>
+    <p:tnLst>
+      <p:par>
+        <p:cTn id="1" dur="indefinite" restart="never" nodeType="tmRoot"/>
+      </p:par>
+    </p:tnLst>
+  </p:timing>
 </p:sld>
 </file>
 
@@ -18765,11 +18787,7 @@
           <a:p>
             <a:r>
               <a:rPr lang="en-US" dirty="0" smtClean="0"/>
-              <a:t>Important </a:t>
-            </a:r>
-            <a:r>
-              <a:rPr lang="en-US" dirty="0" smtClean="0"/>
-              <a:t>Patterns</a:t>
+              <a:t>Important Patterns</a:t>
             </a:r>
             <a:endParaRPr lang="en-US" dirty="0"/>
           </a:p>
@@ -18799,7 +18817,6 @@
               <a:rPr lang="en-US" dirty="0" smtClean="0"/>
               <a:t>Wrapper Facade</a:t>
             </a:r>
-            <a:endParaRPr lang="en-US" dirty="0" smtClean="0"/>
           </a:p>
           <a:p>
             <a:pPr lvl="2"/>
@@ -18809,15 +18826,7 @@
                   <a:schemeClr val="accent2"/>
                 </a:solidFill>
               </a:rPr>
-              <a:t>Encapsulate low-level functions </a:t>
-            </a:r>
-            <a:r>
-              <a:rPr lang="en-US" dirty="0" smtClean="0">
-                <a:solidFill>
-                  <a:schemeClr val="accent2"/>
-                </a:solidFill>
-              </a:rPr>
-              <a:t>within OO class interfaces</a:t>
+              <a:t>Encapsulate low-level functions within OO class interfaces</a:t>
             </a:r>
           </a:p>
           <a:p>
@@ -19230,11 +19239,7 @@
           <a:p>
             <a:r>
               <a:rPr lang="en-US" dirty="0" smtClean="0"/>
-              <a:t>Important </a:t>
-            </a:r>
-            <a:r>
-              <a:rPr lang="en-US" dirty="0" smtClean="0"/>
-              <a:t>Patterns</a:t>
+              <a:t>Important Patterns</a:t>
             </a:r>
             <a:endParaRPr lang="en-US" dirty="0"/>
           </a:p>
@@ -19538,11 +19543,7 @@
           <a:p>
             <a:r>
               <a:rPr lang="en-US" dirty="0" smtClean="0"/>
-              <a:t>Important </a:t>
-            </a:r>
-            <a:r>
-              <a:rPr lang="en-US" dirty="0" smtClean="0"/>
-              <a:t>Patterns</a:t>
+              <a:t>Important Patterns</a:t>
             </a:r>
             <a:endParaRPr lang="en-US" dirty="0"/>
           </a:p>
@@ -19570,11 +19571,7 @@
           <a:p>
             <a:r>
               <a:rPr lang="en-US" dirty="0" smtClean="0"/>
-              <a:t>Double-Checked </a:t>
-            </a:r>
-            <a:r>
-              <a:rPr lang="en-US" dirty="0" smtClean="0"/>
-              <a:t>Locking Optimization</a:t>
+              <a:t>Double-Checked Locking Optimization</a:t>
             </a:r>
           </a:p>
           <a:p>
@@ -20169,6 +20166,32 @@
           <a:chExt cx="0" cy="0"/>
         </a:xfrm>
       </p:grpSpPr>
+      <p:pic>
+        <p:nvPicPr>
+          <p:cNvPr id="2052" name="Picture 4" descr="http://www.codeguru.com/images/article/18981/Classes.gif"/>
+          <p:cNvPicPr>
+            <a:picLocks noChangeAspect="1" noChangeArrowheads="1"/>
+          </p:cNvPicPr>
+          <p:nvPr/>
+        </p:nvPicPr>
+        <p:blipFill>
+          <a:blip r:embed="rId2" cstate="print"/>
+          <a:srcRect/>
+          <a:stretch>
+            <a:fillRect/>
+          </a:stretch>
+        </p:blipFill>
+        <p:spPr bwMode="auto">
+          <a:xfrm>
+            <a:off x="2555776" y="3933056"/>
+            <a:ext cx="4032448" cy="3054054"/>
+          </a:xfrm>
+          <a:prstGeom prst="rect">
+            <a:avLst/>
+          </a:prstGeom>
+          <a:noFill/>
+        </p:spPr>
+      </p:pic>
       <p:sp>
         <p:nvSpPr>
           <p:cNvPr id="2" name="Titel 1"/>
@@ -20188,11 +20211,7 @@
           <a:p>
             <a:r>
               <a:rPr lang="en-US" dirty="0" smtClean="0"/>
-              <a:t>Important </a:t>
-            </a:r>
-            <a:r>
-              <a:rPr lang="en-US" dirty="0" smtClean="0"/>
-              <a:t>Patterns</a:t>
+              <a:t>Important Patterns</a:t>
             </a:r>
             <a:endParaRPr lang="en-US" dirty="0"/>
           </a:p>
@@ -20222,7 +20241,6 @@
               <a:rPr lang="en-US" dirty="0" smtClean="0"/>
               <a:t>Active Object / Concurrent Object</a:t>
             </a:r>
-            <a:endParaRPr lang="en-US" dirty="0" smtClean="0"/>
           </a:p>
           <a:p>
             <a:pPr lvl="2"/>
@@ -20237,6 +20255,10 @@
               <a:rPr lang="en-US" dirty="0" smtClean="0"/>
               <a:t>Enhances concurrency and simplifies synchronized access to an object in its own thread of control</a:t>
             </a:r>
+          </a:p>
+          <a:p>
+            <a:pPr lvl="2"/>
+            <a:endParaRPr lang="en-US" dirty="0" smtClean="0"/>
           </a:p>
         </p:txBody>
       </p:sp>
@@ -20362,52 +20384,6 @@
           </p:txBody>
         </p:sp>
       </p:grpSp>
-      <p:sp>
-        <p:nvSpPr>
-          <p:cNvPr id="7" name="Ellipse 6"/>
-          <p:cNvSpPr/>
-          <p:nvPr/>
-        </p:nvSpPr>
-        <p:spPr>
-          <a:xfrm>
-            <a:off x="179512" y="5877272"/>
-            <a:ext cx="1584176" cy="864096"/>
-          </a:xfrm>
-          <a:prstGeom prst="ellipse">
-            <a:avLst/>
-          </a:prstGeom>
-        </p:spPr>
-        <p:style>
-          <a:lnRef idx="1">
-            <a:schemeClr val="accent5"/>
-          </a:lnRef>
-          <a:fillRef idx="3">
-            <a:schemeClr val="accent5"/>
-          </a:fillRef>
-          <a:effectRef idx="2">
-            <a:schemeClr val="accent5"/>
-          </a:effectRef>
-          <a:fontRef idx="minor">
-            <a:schemeClr val="lt1"/>
-          </a:fontRef>
-        </p:style>
-        <p:txBody>
-          <a:bodyPr rtlCol="0" anchor="ctr"/>
-          <a:lstStyle/>
-          <a:p>
-            <a:pPr algn="ctr"/>
-            <a:r>
-              <a:rPr lang="en-US" spc="-120" dirty="0" smtClean="0">
-                <a:latin typeface="Consolas" pitchFamily="49" charset="0"/>
-              </a:rPr>
-              <a:t>Future/ Promise</a:t>
-            </a:r>
-            <a:endParaRPr lang="en-US" spc="-120" dirty="0">
-              <a:latin typeface="Consolas" pitchFamily="49" charset="0"/>
-            </a:endParaRPr>
-          </a:p>
-        </p:txBody>
-      </p:sp>
     </p:spTree>
   </p:cSld>
   <p:clrMapOvr>
@@ -20455,11 +20431,7 @@
           <a:bodyPr/>
           <a:lstStyle/>
           <a:p>
-            <a:r>
-              <a:rPr lang="en-US" smtClean="0"/>
-              <a:t>Sources</a:t>
-            </a:r>
-            <a:endParaRPr lang="en-US"/>
+            <a:endParaRPr lang="de-DE"/>
           </a:p>
         </p:txBody>
       </p:sp>
@@ -20478,32 +20450,1018 @@
           <a:bodyPr/>
           <a:lstStyle/>
           <a:p>
+            <a:endParaRPr lang="de-DE"/>
+          </a:p>
+        </p:txBody>
+      </p:sp>
+      <p:pic>
+        <p:nvPicPr>
+          <p:cNvPr id="4" name="Picture 2" descr="http://image.slidesharecdn.com/activeobject-presentation-120301221004-phpapp02/95/active-object-design-pattern-4-638.jpg?cb=1369843883"/>
+          <p:cNvPicPr>
+            <a:picLocks noChangeAspect="1" noChangeArrowheads="1"/>
+          </p:cNvPicPr>
+          <p:nvPr/>
+        </p:nvPicPr>
+        <p:blipFill>
+          <a:blip r:embed="rId2" cstate="print"/>
+          <a:srcRect/>
+          <a:stretch>
+            <a:fillRect/>
+          </a:stretch>
+        </p:blipFill>
+        <p:spPr bwMode="auto">
+          <a:xfrm>
+            <a:off x="0" y="-72431"/>
+            <a:ext cx="9230928" cy="6930431"/>
+          </a:xfrm>
+          <a:prstGeom prst="rect">
+            <a:avLst/>
+          </a:prstGeom>
+          <a:noFill/>
+        </p:spPr>
+      </p:pic>
+    </p:spTree>
+  </p:cSld>
+  <p:clrMapOvr>
+    <a:masterClrMapping/>
+  </p:clrMapOvr>
+  <p:timing>
+    <p:tnLst>
+      <p:par>
+        <p:cTn id="1" dur="indefinite" restart="never" nodeType="tmRoot"/>
+      </p:par>
+    </p:tnLst>
+  </p:timing>
+</p:sld>
+</file>
+
+<file path=ppt/slides/slide26.xml><?xml version="1.0" encoding="utf-8"?>
+<p:sld xmlns:a="http://schemas.openxmlformats.org/drawingml/2006/main" xmlns:r="http://schemas.openxmlformats.org/officeDocument/2006/relationships" xmlns:p="http://schemas.openxmlformats.org/presentationml/2006/main">
+  <p:cSld>
+    <p:spTree>
+      <p:nvGrpSpPr>
+        <p:cNvPr id="1" name=""/>
+        <p:cNvGrpSpPr/>
+        <p:nvPr/>
+      </p:nvGrpSpPr>
+      <p:grpSpPr>
+        <a:xfrm>
+          <a:off x="0" y="0"/>
+          <a:ext cx="0" cy="0"/>
+          <a:chOff x="0" y="0"/>
+          <a:chExt cx="0" cy="0"/>
+        </a:xfrm>
+      </p:grpSpPr>
+      <p:pic>
+        <p:nvPicPr>
+          <p:cNvPr id="43011" name="Picture 3" descr="E:\Sebastian\Documents\DHBW\eclipse-workspace\ActiveObjectDemo\uml\Synchronous.png"/>
+          <p:cNvPicPr>
+            <a:picLocks noChangeAspect="1" noChangeArrowheads="1"/>
+          </p:cNvPicPr>
+          <p:nvPr/>
+        </p:nvPicPr>
+        <p:blipFill>
+          <a:blip r:embed="rId2" cstate="print"/>
+          <a:srcRect/>
+          <a:stretch>
+            <a:fillRect/>
+          </a:stretch>
+        </p:blipFill>
+        <p:spPr bwMode="auto">
+          <a:xfrm>
+            <a:off x="4860032" y="2974057"/>
+            <a:ext cx="4295775" cy="2543175"/>
+          </a:xfrm>
+          <a:prstGeom prst="rect">
+            <a:avLst/>
+          </a:prstGeom>
+          <a:noFill/>
+        </p:spPr>
+      </p:pic>
+      <p:sp>
+        <p:nvSpPr>
+          <p:cNvPr id="2" name="Titel 1"/>
+          <p:cNvSpPr>
+            <a:spLocks noGrp="1"/>
+          </p:cNvSpPr>
+          <p:nvPr>
+            <p:ph type="title"/>
+          </p:nvPr>
+        </p:nvSpPr>
+        <p:spPr/>
+        <p:txBody>
+          <a:bodyPr/>
+          <a:lstStyle/>
+          <a:p>
+            <a:r>
+              <a:rPr lang="de-DE" dirty="0" err="1" smtClean="0"/>
+              <a:t>Active</a:t>
+            </a:r>
+            <a:r>
+              <a:rPr lang="de-DE" dirty="0" smtClean="0"/>
+              <a:t> </a:t>
+            </a:r>
+            <a:r>
+              <a:rPr lang="de-DE" dirty="0" err="1" smtClean="0"/>
+              <a:t>Object</a:t>
+            </a:r>
+            <a:r>
+              <a:rPr lang="de-DE" dirty="0" smtClean="0"/>
+              <a:t> Pattern</a:t>
+            </a:r>
+            <a:endParaRPr lang="de-DE" dirty="0"/>
+          </a:p>
+        </p:txBody>
+      </p:sp>
+      <p:sp>
+        <p:nvSpPr>
+          <p:cNvPr id="3" name="Inhaltsplatzhalter 2"/>
+          <p:cNvSpPr>
+            <a:spLocks noGrp="1"/>
+          </p:cNvSpPr>
+          <p:nvPr>
+            <p:ph idx="1"/>
+          </p:nvPr>
+        </p:nvSpPr>
+        <p:spPr>
+          <a:xfrm>
+            <a:off x="457200" y="2249424"/>
+            <a:ext cx="4618856" cy="4325112"/>
+          </a:xfrm>
+        </p:spPr>
+        <p:txBody>
+          <a:bodyPr/>
+          <a:lstStyle/>
+          <a:p>
+            <a:r>
+              <a:rPr lang="de-DE" dirty="0" smtClean="0"/>
+              <a:t>Simple </a:t>
+            </a:r>
+            <a:r>
+              <a:rPr lang="de-DE" dirty="0" err="1" smtClean="0"/>
+              <a:t>demo</a:t>
+            </a:r>
+            <a:r>
+              <a:rPr lang="de-DE" dirty="0" smtClean="0"/>
+              <a:t> </a:t>
+            </a:r>
+            <a:r>
+              <a:rPr lang="de-DE" dirty="0" err="1" smtClean="0"/>
+              <a:t>application</a:t>
+            </a:r>
+            <a:r>
+              <a:rPr lang="de-DE" dirty="0" smtClean="0"/>
+              <a:t>:</a:t>
+            </a:r>
+          </a:p>
+          <a:p>
+            <a:pPr lvl="2"/>
+            <a:r>
+              <a:rPr lang="de-DE" dirty="0" smtClean="0"/>
+              <a:t>Database </a:t>
+            </a:r>
+            <a:r>
+              <a:rPr lang="de-DE" dirty="0" err="1" smtClean="0"/>
+              <a:t>mockup</a:t>
+            </a:r>
+            <a:endParaRPr lang="de-DE" dirty="0" smtClean="0"/>
+          </a:p>
+          <a:p>
+            <a:pPr lvl="2"/>
+            <a:r>
+              <a:rPr lang="de-DE" dirty="0" smtClean="0"/>
+              <a:t>Client </a:t>
+            </a:r>
+            <a:r>
+              <a:rPr lang="de-DE" dirty="0" err="1" smtClean="0"/>
+              <a:t>can</a:t>
+            </a:r>
+            <a:r>
+              <a:rPr lang="de-DE" dirty="0" smtClean="0"/>
+              <a:t> </a:t>
+            </a:r>
+            <a:r>
+              <a:rPr lang="de-DE" dirty="0" err="1" smtClean="0"/>
+              <a:t>query</a:t>
+            </a:r>
+            <a:r>
+              <a:rPr lang="de-DE" dirty="0" smtClean="0"/>
+              <a:t> </a:t>
+            </a:r>
+            <a:r>
+              <a:rPr lang="de-DE" dirty="0" err="1" smtClean="0"/>
+              <a:t>some</a:t>
+            </a:r>
+            <a:r>
+              <a:rPr lang="de-DE" dirty="0" smtClean="0"/>
+              <a:t> </a:t>
+            </a:r>
+            <a:r>
+              <a:rPr lang="de-DE" dirty="0" err="1" smtClean="0"/>
+              <a:t>data</a:t>
+            </a:r>
+            <a:r>
+              <a:rPr lang="de-DE" dirty="0" smtClean="0"/>
+              <a:t> </a:t>
+            </a:r>
+            <a:r>
+              <a:rPr lang="de-DE" dirty="0" err="1" smtClean="0"/>
+              <a:t>with</a:t>
+            </a:r>
+            <a:r>
+              <a:rPr lang="de-DE" dirty="0" smtClean="0"/>
+              <a:t/>
+            </a:r>
+            <a:br>
+              <a:rPr lang="de-DE" dirty="0" smtClean="0"/>
+            </a:br>
+            <a:r>
+              <a:rPr lang="de-DE" dirty="0" err="1" smtClean="0"/>
+              <a:t>queryData</a:t>
+            </a:r>
+            <a:r>
+              <a:rPr lang="de-DE" dirty="0" smtClean="0"/>
+              <a:t>()</a:t>
+            </a:r>
+          </a:p>
+          <a:p>
+            <a:pPr lvl="2"/>
+            <a:r>
+              <a:rPr lang="de-DE" dirty="0" err="1" smtClean="0"/>
+              <a:t>Accessing</a:t>
+            </a:r>
+            <a:r>
+              <a:rPr lang="de-DE" dirty="0" smtClean="0"/>
+              <a:t> </a:t>
+            </a:r>
+            <a:r>
+              <a:rPr lang="de-DE" dirty="0" err="1" smtClean="0"/>
+              <a:t>the</a:t>
+            </a:r>
+            <a:r>
+              <a:rPr lang="de-DE" dirty="0" smtClean="0"/>
+              <a:t> „</a:t>
+            </a:r>
+            <a:r>
+              <a:rPr lang="de-DE" dirty="0" err="1" smtClean="0"/>
+              <a:t>database</a:t>
+            </a:r>
+            <a:r>
+              <a:rPr lang="de-DE" dirty="0" smtClean="0"/>
+              <a:t>“ </a:t>
+            </a:r>
+            <a:r>
+              <a:rPr lang="de-DE" dirty="0" err="1" smtClean="0"/>
+              <a:t>takes</a:t>
+            </a:r>
+            <a:r>
+              <a:rPr lang="de-DE" dirty="0" smtClean="0"/>
+              <a:t> a </a:t>
+            </a:r>
+            <a:r>
+              <a:rPr lang="de-DE" dirty="0" err="1" smtClean="0"/>
+              <a:t>lot</a:t>
+            </a:r>
+            <a:r>
+              <a:rPr lang="de-DE" dirty="0" smtClean="0"/>
+              <a:t> </a:t>
+            </a:r>
+            <a:r>
+              <a:rPr lang="de-DE" dirty="0" err="1" smtClean="0"/>
+              <a:t>of</a:t>
+            </a:r>
+            <a:r>
+              <a:rPr lang="de-DE" dirty="0" smtClean="0"/>
+              <a:t> time (~5s)</a:t>
+            </a:r>
+          </a:p>
+          <a:p>
+            <a:r>
+              <a:rPr lang="de-DE" dirty="0" err="1" smtClean="0"/>
+              <a:t>We</a:t>
+            </a:r>
+            <a:r>
+              <a:rPr lang="de-DE" dirty="0" smtClean="0"/>
+              <a:t> </a:t>
+            </a:r>
+            <a:r>
+              <a:rPr lang="de-DE" dirty="0" err="1" smtClean="0"/>
+              <a:t>want</a:t>
+            </a:r>
+            <a:r>
+              <a:rPr lang="de-DE" dirty="0" smtClean="0"/>
+              <a:t> </a:t>
+            </a:r>
+            <a:r>
+              <a:rPr lang="de-DE" dirty="0" err="1" smtClean="0"/>
+              <a:t>to</a:t>
+            </a:r>
+            <a:r>
+              <a:rPr lang="de-DE" dirty="0" smtClean="0"/>
+              <a:t> do multiple </a:t>
+            </a:r>
+            <a:r>
+              <a:rPr lang="de-DE" dirty="0" err="1" smtClean="0"/>
+              <a:t>queries</a:t>
+            </a:r>
+            <a:r>
+              <a:rPr lang="de-DE" dirty="0" smtClean="0"/>
+              <a:t> </a:t>
+            </a:r>
+          </a:p>
+        </p:txBody>
+      </p:sp>
+      <p:sp>
+        <p:nvSpPr>
+          <p:cNvPr id="5" name="Rechteck 4"/>
+          <p:cNvSpPr/>
+          <p:nvPr/>
+        </p:nvSpPr>
+        <p:spPr>
+          <a:xfrm>
+            <a:off x="4788024" y="2902049"/>
+            <a:ext cx="2016224" cy="1080120"/>
+          </a:xfrm>
+          <a:prstGeom prst="rect">
+            <a:avLst/>
+          </a:prstGeom>
+          <a:noFill/>
+          <a:ln>
+            <a:solidFill>
+              <a:schemeClr val="accent3"/>
+            </a:solidFill>
+          </a:ln>
+        </p:spPr>
+        <p:style>
+          <a:lnRef idx="2">
+            <a:schemeClr val="accent1">
+              <a:shade val="50000"/>
+            </a:schemeClr>
+          </a:lnRef>
+          <a:fillRef idx="1">
+            <a:schemeClr val="accent1"/>
+          </a:fillRef>
+          <a:effectRef idx="0">
+            <a:schemeClr val="accent1"/>
+          </a:effectRef>
+          <a:fontRef idx="minor">
+            <a:schemeClr val="lt1"/>
+          </a:fontRef>
+        </p:style>
+        <p:txBody>
+          <a:bodyPr rtlCol="0" anchor="ctr"/>
+          <a:lstStyle/>
+          <a:p>
+            <a:pPr algn="ctr"/>
+            <a:endParaRPr lang="de-DE"/>
+          </a:p>
+        </p:txBody>
+      </p:sp>
+      <p:sp>
+        <p:nvSpPr>
+          <p:cNvPr id="6" name="Textfeld 5"/>
+          <p:cNvSpPr txBox="1"/>
+          <p:nvPr/>
+        </p:nvSpPr>
+        <p:spPr>
+          <a:xfrm>
+            <a:off x="4860032" y="3972877"/>
+            <a:ext cx="1193038" cy="369332"/>
+          </a:xfrm>
+          <a:prstGeom prst="rect">
+            <a:avLst/>
+          </a:prstGeom>
+          <a:noFill/>
+        </p:spPr>
+        <p:txBody>
+          <a:bodyPr wrap="square" rtlCol="0">
+            <a:spAutoFit/>
+          </a:bodyPr>
+          <a:lstStyle/>
+          <a:p>
+            <a:r>
+              <a:rPr lang="de-DE" dirty="0" smtClean="0">
+                <a:solidFill>
+                  <a:schemeClr val="accent3"/>
+                </a:solidFill>
+              </a:rPr>
+              <a:t>Client</a:t>
+            </a:r>
+            <a:endParaRPr lang="de-DE" dirty="0">
+              <a:solidFill>
+                <a:schemeClr val="accent3"/>
+              </a:solidFill>
+            </a:endParaRPr>
+          </a:p>
+        </p:txBody>
+      </p:sp>
+    </p:spTree>
+  </p:cSld>
+  <p:clrMapOvr>
+    <a:masterClrMapping/>
+  </p:clrMapOvr>
+  <p:timing>
+    <p:tnLst>
+      <p:par>
+        <p:cTn id="1" dur="indefinite" restart="never" nodeType="tmRoot"/>
+      </p:par>
+    </p:tnLst>
+  </p:timing>
+</p:sld>
+</file>
+
+<file path=ppt/slides/slide27.xml><?xml version="1.0" encoding="utf-8"?>
+<p:sld xmlns:a="http://schemas.openxmlformats.org/drawingml/2006/main" xmlns:r="http://schemas.openxmlformats.org/officeDocument/2006/relationships" xmlns:p="http://schemas.openxmlformats.org/presentationml/2006/main">
+  <p:cSld>
+    <p:spTree>
+      <p:nvGrpSpPr>
+        <p:cNvPr id="1" name=""/>
+        <p:cNvGrpSpPr/>
+        <p:nvPr/>
+      </p:nvGrpSpPr>
+      <p:grpSpPr>
+        <a:xfrm>
+          <a:off x="0" y="0"/>
+          <a:ext cx="0" cy="0"/>
+          <a:chOff x="0" y="0"/>
+          <a:chExt cx="0" cy="0"/>
+        </a:xfrm>
+      </p:grpSpPr>
+      <p:sp>
+        <p:nvSpPr>
+          <p:cNvPr id="2" name="Titel 1"/>
+          <p:cNvSpPr>
+            <a:spLocks noGrp="1"/>
+          </p:cNvSpPr>
+          <p:nvPr>
+            <p:ph type="title"/>
+          </p:nvPr>
+        </p:nvSpPr>
+        <p:spPr/>
+        <p:txBody>
+          <a:bodyPr/>
+          <a:lstStyle/>
+          <a:p>
+            <a:r>
+              <a:rPr lang="de-DE" dirty="0" err="1" smtClean="0"/>
+              <a:t>Active</a:t>
+            </a:r>
+            <a:r>
+              <a:rPr lang="de-DE" dirty="0" smtClean="0"/>
+              <a:t> </a:t>
+            </a:r>
+            <a:r>
+              <a:rPr lang="de-DE" dirty="0" err="1" smtClean="0"/>
+              <a:t>Object</a:t>
+            </a:r>
+            <a:r>
+              <a:rPr lang="de-DE" dirty="0" smtClean="0"/>
+              <a:t> Pattern</a:t>
+            </a:r>
+            <a:endParaRPr lang="de-DE" dirty="0"/>
+          </a:p>
+        </p:txBody>
+      </p:sp>
+      <p:pic>
+        <p:nvPicPr>
+          <p:cNvPr id="43012" name="Picture 4" descr="E:\Sebastian\Documents\DHBW\eclipse-workspace\ActiveObjectDemo\uml\Asynchronous.png"/>
+          <p:cNvPicPr>
+            <a:picLocks noChangeAspect="1" noChangeArrowheads="1"/>
+          </p:cNvPicPr>
+          <p:nvPr/>
+        </p:nvPicPr>
+        <p:blipFill>
+          <a:blip r:embed="rId2" cstate="print"/>
+          <a:srcRect/>
+          <a:stretch>
+            <a:fillRect/>
+          </a:stretch>
+        </p:blipFill>
+        <p:spPr bwMode="auto">
+          <a:xfrm>
+            <a:off x="0" y="2550285"/>
+            <a:ext cx="9144000" cy="4047067"/>
+          </a:xfrm>
+          <a:prstGeom prst="rect">
+            <a:avLst/>
+          </a:prstGeom>
+          <a:noFill/>
+        </p:spPr>
+      </p:pic>
+      <p:sp>
+        <p:nvSpPr>
+          <p:cNvPr id="8" name="Rechteck 7"/>
+          <p:cNvSpPr/>
+          <p:nvPr/>
+        </p:nvSpPr>
+        <p:spPr>
+          <a:xfrm>
+            <a:off x="0" y="2492896"/>
+            <a:ext cx="1763688" cy="1152128"/>
+          </a:xfrm>
+          <a:prstGeom prst="rect">
+            <a:avLst/>
+          </a:prstGeom>
+          <a:noFill/>
+          <a:ln>
+            <a:solidFill>
+              <a:schemeClr val="accent3"/>
+            </a:solidFill>
+          </a:ln>
+        </p:spPr>
+        <p:style>
+          <a:lnRef idx="2">
+            <a:schemeClr val="accent1">
+              <a:shade val="50000"/>
+            </a:schemeClr>
+          </a:lnRef>
+          <a:fillRef idx="1">
+            <a:schemeClr val="accent1"/>
+          </a:fillRef>
+          <a:effectRef idx="0">
+            <a:schemeClr val="accent1"/>
+          </a:effectRef>
+          <a:fontRef idx="minor">
+            <a:schemeClr val="lt1"/>
+          </a:fontRef>
+        </p:style>
+        <p:txBody>
+          <a:bodyPr rtlCol="0" anchor="ctr"/>
+          <a:lstStyle/>
+          <a:p>
+            <a:pPr algn="ctr"/>
+            <a:endParaRPr lang="de-DE"/>
+          </a:p>
+        </p:txBody>
+      </p:sp>
+      <p:sp>
+        <p:nvSpPr>
+          <p:cNvPr id="12" name="Textfeld 11"/>
+          <p:cNvSpPr txBox="1"/>
+          <p:nvPr/>
+        </p:nvSpPr>
+        <p:spPr>
+          <a:xfrm>
+            <a:off x="4644008" y="2123564"/>
+            <a:ext cx="1152128" cy="369332"/>
+          </a:xfrm>
+          <a:prstGeom prst="rect">
+            <a:avLst/>
+          </a:prstGeom>
+          <a:noFill/>
+        </p:spPr>
+        <p:txBody>
+          <a:bodyPr wrap="square" rtlCol="0">
+            <a:spAutoFit/>
+          </a:bodyPr>
+          <a:lstStyle/>
+          <a:p>
+            <a:r>
+              <a:rPr lang="de-DE" dirty="0" smtClean="0">
+                <a:solidFill>
+                  <a:srgbClr val="FF0000"/>
+                </a:solidFill>
+              </a:rPr>
+              <a:t>Hidden</a:t>
+            </a:r>
+            <a:endParaRPr lang="de-DE" dirty="0">
+              <a:solidFill>
+                <a:srgbClr val="FF0000"/>
+              </a:solidFill>
+            </a:endParaRPr>
+          </a:p>
+        </p:txBody>
+      </p:sp>
+      <p:sp>
+        <p:nvSpPr>
+          <p:cNvPr id="14" name="Textfeld 13"/>
+          <p:cNvSpPr txBox="1"/>
+          <p:nvPr/>
+        </p:nvSpPr>
+        <p:spPr>
+          <a:xfrm>
+            <a:off x="2627784" y="2123564"/>
+            <a:ext cx="1944216" cy="369332"/>
+          </a:xfrm>
+          <a:prstGeom prst="rect">
+            <a:avLst/>
+          </a:prstGeom>
+          <a:noFill/>
+        </p:spPr>
+        <p:txBody>
+          <a:bodyPr wrap="square" rtlCol="0">
+            <a:spAutoFit/>
+          </a:bodyPr>
+          <a:lstStyle/>
+          <a:p>
+            <a:r>
+              <a:rPr lang="de-DE" dirty="0" smtClean="0">
+                <a:solidFill>
+                  <a:schemeClr val="accent3"/>
+                </a:solidFill>
+              </a:rPr>
+              <a:t>Visible </a:t>
+            </a:r>
+            <a:r>
+              <a:rPr lang="de-DE" dirty="0" err="1" smtClean="0">
+                <a:solidFill>
+                  <a:schemeClr val="accent3"/>
+                </a:solidFill>
+              </a:rPr>
+              <a:t>for</a:t>
+            </a:r>
+            <a:r>
+              <a:rPr lang="de-DE" dirty="0" smtClean="0">
+                <a:solidFill>
+                  <a:schemeClr val="accent3"/>
+                </a:solidFill>
+              </a:rPr>
+              <a:t> Client</a:t>
+            </a:r>
+            <a:endParaRPr lang="de-DE" dirty="0">
+              <a:solidFill>
+                <a:schemeClr val="accent3"/>
+              </a:solidFill>
+            </a:endParaRPr>
+          </a:p>
+        </p:txBody>
+      </p:sp>
+      <p:sp>
+        <p:nvSpPr>
+          <p:cNvPr id="17" name="Rechteck 16"/>
+          <p:cNvSpPr/>
+          <p:nvPr/>
+        </p:nvSpPr>
+        <p:spPr>
+          <a:xfrm>
+            <a:off x="4572000" y="2132856"/>
+            <a:ext cx="4572000" cy="4725144"/>
+          </a:xfrm>
+          <a:prstGeom prst="rect">
+            <a:avLst/>
+          </a:prstGeom>
+          <a:noFill/>
+          <a:ln w="28575">
+            <a:solidFill>
+              <a:srgbClr val="FF0000"/>
+            </a:solidFill>
+          </a:ln>
+        </p:spPr>
+        <p:style>
+          <a:lnRef idx="2">
+            <a:schemeClr val="accent1">
+              <a:shade val="50000"/>
+            </a:schemeClr>
+          </a:lnRef>
+          <a:fillRef idx="1">
+            <a:schemeClr val="accent1"/>
+          </a:fillRef>
+          <a:effectRef idx="0">
+            <a:schemeClr val="accent1"/>
+          </a:effectRef>
+          <a:fontRef idx="minor">
+            <a:schemeClr val="lt1"/>
+          </a:fontRef>
+        </p:style>
+        <p:txBody>
+          <a:bodyPr rtlCol="0" anchor="ctr"/>
+          <a:lstStyle/>
+          <a:p>
+            <a:pPr algn="ctr"/>
+            <a:endParaRPr lang="de-DE"/>
+          </a:p>
+        </p:txBody>
+      </p:sp>
+      <p:sp>
+        <p:nvSpPr>
+          <p:cNvPr id="18" name="Textfeld 17"/>
+          <p:cNvSpPr txBox="1"/>
+          <p:nvPr/>
+        </p:nvSpPr>
+        <p:spPr>
+          <a:xfrm>
+            <a:off x="0" y="3645024"/>
+            <a:ext cx="1043608" cy="369332"/>
+          </a:xfrm>
+          <a:prstGeom prst="rect">
+            <a:avLst/>
+          </a:prstGeom>
+          <a:noFill/>
+        </p:spPr>
+        <p:txBody>
+          <a:bodyPr wrap="square" rtlCol="0">
+            <a:spAutoFit/>
+          </a:bodyPr>
+          <a:lstStyle/>
+          <a:p>
+            <a:r>
+              <a:rPr lang="de-DE" dirty="0" smtClean="0">
+                <a:solidFill>
+                  <a:schemeClr val="accent3"/>
+                </a:solidFill>
+              </a:rPr>
+              <a:t>Client</a:t>
+            </a:r>
+            <a:endParaRPr lang="de-DE" dirty="0">
+              <a:solidFill>
+                <a:schemeClr val="accent3"/>
+              </a:solidFill>
+            </a:endParaRPr>
+          </a:p>
+        </p:txBody>
+      </p:sp>
+    </p:spTree>
+  </p:cSld>
+  <p:clrMapOvr>
+    <a:masterClrMapping/>
+  </p:clrMapOvr>
+  <p:timing>
+    <p:tnLst>
+      <p:par>
+        <p:cTn id="1" dur="indefinite" restart="never" nodeType="tmRoot"/>
+      </p:par>
+    </p:tnLst>
+  </p:timing>
+</p:sld>
+</file>
+
+<file path=ppt/slides/slide28.xml><?xml version="1.0" encoding="utf-8"?>
+<p:sld xmlns:a="http://schemas.openxmlformats.org/drawingml/2006/main" xmlns:r="http://schemas.openxmlformats.org/officeDocument/2006/relationships" xmlns:p="http://schemas.openxmlformats.org/presentationml/2006/main">
+  <p:cSld>
+    <p:spTree>
+      <p:nvGrpSpPr>
+        <p:cNvPr id="1" name=""/>
+        <p:cNvGrpSpPr/>
+        <p:nvPr/>
+      </p:nvGrpSpPr>
+      <p:grpSpPr>
+        <a:xfrm>
+          <a:off x="0" y="0"/>
+          <a:ext cx="0" cy="0"/>
+          <a:chOff x="0" y="0"/>
+          <a:chExt cx="0" cy="0"/>
+        </a:xfrm>
+      </p:grpSpPr>
+      <p:sp>
+        <p:nvSpPr>
+          <p:cNvPr id="4" name="Titel 3"/>
+          <p:cNvSpPr>
+            <a:spLocks noGrp="1"/>
+          </p:cNvSpPr>
+          <p:nvPr>
+            <p:ph type="ctrTitle"/>
+          </p:nvPr>
+        </p:nvSpPr>
+        <p:spPr/>
+        <p:txBody>
+          <a:bodyPr/>
+          <a:lstStyle/>
+          <a:p>
+            <a:r>
+              <a:rPr lang="de-DE" dirty="0" err="1" smtClean="0"/>
+              <a:t>Thank</a:t>
+            </a:r>
+            <a:r>
+              <a:rPr lang="de-DE" dirty="0" smtClean="0"/>
+              <a:t> </a:t>
+            </a:r>
+            <a:r>
+              <a:rPr lang="de-DE" dirty="0" err="1" smtClean="0"/>
+              <a:t>you</a:t>
+            </a:r>
+            <a:r>
+              <a:rPr lang="de-DE" dirty="0" smtClean="0"/>
+              <a:t> </a:t>
+            </a:r>
+            <a:r>
+              <a:rPr lang="de-DE" dirty="0" err="1" smtClean="0"/>
+              <a:t>for</a:t>
+            </a:r>
+            <a:r>
+              <a:rPr lang="de-DE" dirty="0" smtClean="0"/>
+              <a:t> </a:t>
+            </a:r>
+            <a:r>
+              <a:rPr lang="de-DE" dirty="0" err="1" smtClean="0"/>
+              <a:t>your</a:t>
+            </a:r>
+            <a:r>
+              <a:rPr lang="de-DE" dirty="0" smtClean="0"/>
+              <a:t> </a:t>
+            </a:r>
+            <a:r>
+              <a:rPr lang="de-DE" dirty="0" err="1" smtClean="0"/>
+              <a:t>attantion</a:t>
+            </a:r>
+            <a:r>
+              <a:rPr lang="de-DE" dirty="0" smtClean="0"/>
+              <a:t>!</a:t>
+            </a:r>
+            <a:endParaRPr lang="de-DE" dirty="0"/>
+          </a:p>
+        </p:txBody>
+      </p:sp>
+      <p:sp>
+        <p:nvSpPr>
+          <p:cNvPr id="5" name="Untertitel 4"/>
+          <p:cNvSpPr>
+            <a:spLocks noGrp="1"/>
+          </p:cNvSpPr>
+          <p:nvPr>
+            <p:ph type="subTitle" idx="1"/>
+          </p:nvPr>
+        </p:nvSpPr>
+        <p:spPr/>
+        <p:txBody>
+          <a:bodyPr/>
+          <a:lstStyle/>
+          <a:p>
+            <a:endParaRPr lang="de-DE"/>
+          </a:p>
+        </p:txBody>
+      </p:sp>
+    </p:spTree>
+  </p:cSld>
+  <p:clrMapOvr>
+    <a:masterClrMapping/>
+  </p:clrMapOvr>
+  <p:timing>
+    <p:tnLst>
+      <p:par>
+        <p:cTn id="1" dur="indefinite" restart="never" nodeType="tmRoot"/>
+      </p:par>
+    </p:tnLst>
+  </p:timing>
+</p:sld>
+</file>
+
+<file path=ppt/slides/slide29.xml><?xml version="1.0" encoding="utf-8"?>
+<p:sld xmlns:a="http://schemas.openxmlformats.org/drawingml/2006/main" xmlns:r="http://schemas.openxmlformats.org/officeDocument/2006/relationships" xmlns:p="http://schemas.openxmlformats.org/presentationml/2006/main">
+  <p:cSld>
+    <p:spTree>
+      <p:nvGrpSpPr>
+        <p:cNvPr id="1" name=""/>
+        <p:cNvGrpSpPr/>
+        <p:nvPr/>
+      </p:nvGrpSpPr>
+      <p:grpSpPr>
+        <a:xfrm>
+          <a:off x="0" y="0"/>
+          <a:ext cx="0" cy="0"/>
+          <a:chOff x="0" y="0"/>
+          <a:chExt cx="0" cy="0"/>
+        </a:xfrm>
+      </p:grpSpPr>
+      <p:sp>
+        <p:nvSpPr>
+          <p:cNvPr id="2" name="Titel 1"/>
+          <p:cNvSpPr>
+            <a:spLocks noGrp="1"/>
+          </p:cNvSpPr>
+          <p:nvPr>
+            <p:ph type="title"/>
+          </p:nvPr>
+        </p:nvSpPr>
+        <p:spPr/>
+        <p:txBody>
+          <a:bodyPr/>
+          <a:lstStyle/>
+          <a:p>
             <a:r>
               <a:rPr lang="en-US" smtClean="0"/>
-              <a:t>Christopher Alexander, Sara Ishikawa, MurraySilverstein, Max Jacobson, Ingrid Fiksdahl-King, and Shlomo Angel.</a:t>
-            </a:r>
-            <a:r>
-              <a:rPr lang="en-US" i="1" smtClean="0"/>
-              <a:t>A Pattern Language. Oxford University </a:t>
-            </a:r>
+              <a:t>Sources</a:t>
+            </a:r>
+            <a:endParaRPr lang="en-US"/>
+          </a:p>
+        </p:txBody>
+      </p:sp>
+      <p:sp>
+        <p:nvSpPr>
+          <p:cNvPr id="3" name="Inhaltsplatzhalter 2"/>
+          <p:cNvSpPr>
+            <a:spLocks noGrp="1"/>
+          </p:cNvSpPr>
+          <p:nvPr>
+            <p:ph idx="1"/>
+          </p:nvPr>
+        </p:nvSpPr>
+        <p:spPr/>
+        <p:txBody>
+          <a:bodyPr>
+            <a:normAutofit lnSpcReduction="10000"/>
+          </a:bodyPr>
+          <a:lstStyle/>
+          <a:p>
+            <a:r>
+              <a:rPr lang="en-US" dirty="0" smtClean="0"/>
+              <a:t>Christopher Alexander, Sara Ishikawa, </a:t>
+            </a:r>
+            <a:r>
+              <a:rPr lang="en-US" dirty="0" err="1" smtClean="0"/>
+              <a:t>MurraySilverstein</a:t>
+            </a:r>
+            <a:r>
+              <a:rPr lang="en-US" dirty="0" smtClean="0"/>
+              <a:t>, Max Jacobson, Ingrid </a:t>
+            </a:r>
+            <a:r>
+              <a:rPr lang="en-US" dirty="0" err="1" smtClean="0"/>
+              <a:t>Fiksdahl</a:t>
+            </a:r>
+            <a:r>
+              <a:rPr lang="en-US" dirty="0" smtClean="0"/>
+              <a:t>-King, and </a:t>
+            </a:r>
+            <a:r>
+              <a:rPr lang="en-US" dirty="0" err="1" smtClean="0"/>
+              <a:t>Shlomo</a:t>
+            </a:r>
+            <a:r>
+              <a:rPr lang="en-US" dirty="0" smtClean="0"/>
+              <a:t> </a:t>
+            </a:r>
+            <a:r>
+              <a:rPr lang="en-US" dirty="0" err="1" smtClean="0"/>
+              <a:t>Angel.</a:t>
+            </a:r>
+            <a:r>
+              <a:rPr lang="en-US" i="1" dirty="0" err="1" smtClean="0"/>
+              <a:t>A</a:t>
+            </a:r>
+            <a:r>
+              <a:rPr lang="en-US" i="1" dirty="0" smtClean="0"/>
+              <a:t> Pattern Language. Oxford University </a:t>
+            </a:r>
+            <a:r>
+              <a:rPr lang="en-US" dirty="0" smtClean="0"/>
+              <a:t>Press, </a:t>
+            </a:r>
+            <a:r>
+              <a:rPr lang="en-US" dirty="0" err="1" smtClean="0"/>
+              <a:t>NewYork</a:t>
+            </a:r>
+            <a:r>
+              <a:rPr lang="en-US" dirty="0" smtClean="0"/>
+              <a:t>, 1977</a:t>
+            </a:r>
+            <a:r>
+              <a:rPr lang="en-US" dirty="0" smtClean="0"/>
+              <a:t>.</a:t>
+            </a:r>
+          </a:p>
+          <a:p>
+            <a:r>
+              <a:rPr lang="en-US" dirty="0" smtClean="0">
+                <a:hlinkClick r:id="rId2"/>
+              </a:rPr>
+              <a:t>http://</a:t>
+            </a:r>
+            <a:r>
+              <a:rPr lang="en-US" dirty="0" smtClean="0">
+                <a:hlinkClick r:id="rId2"/>
+              </a:rPr>
+              <a:t>www.codeguru.com/images/article/18981/Classes.gif</a:t>
+            </a:r>
+            <a:endParaRPr lang="en-US" dirty="0" smtClean="0"/>
+          </a:p>
+          <a:p>
+            <a:r>
+              <a:rPr lang="en-US" smtClean="0">
+                <a:hlinkClick r:id="rId3"/>
+              </a:rPr>
+              <a:t>http</a:t>
+            </a:r>
+            <a:r>
+              <a:rPr lang="en-US" smtClean="0">
+                <a:hlinkClick r:id="rId3"/>
+              </a:rPr>
+              <a:t>://</a:t>
+            </a:r>
+            <a:r>
+              <a:rPr lang="en-US" smtClean="0">
+                <a:hlinkClick r:id="rId3"/>
+              </a:rPr>
+              <a:t>www.patterns-kompakt.de/patterns/activeobject.html</a:t>
+            </a:r>
+            <a:endParaRPr lang="en-US" smtClean="0"/>
+          </a:p>
+          <a:p>
             <a:r>
               <a:rPr lang="en-US" smtClean="0"/>
-              <a:t>Press, NewYork, 1977.</a:t>
-            </a:r>
-          </a:p>
-          <a:p>
-            <a:r>
-              <a:rPr lang="en-US" smtClean="0"/>
-              <a:t>All others are in the file: </a:t>
-            </a:r>
-            <a:r>
-              <a:rPr lang="en-US" sz="2400" smtClean="0">
+              <a:t>All </a:t>
+            </a:r>
+            <a:r>
+              <a:rPr lang="en-US" dirty="0" smtClean="0"/>
+              <a:t>others are in the file: </a:t>
+            </a:r>
+            <a:r>
+              <a:rPr lang="en-US" sz="2400" dirty="0" smtClean="0">
                 <a:latin typeface="Bell MT" pitchFamily="18" charset="0"/>
                 <a:cs typeface="Arial" pitchFamily="34" charset="0"/>
               </a:rPr>
               <a:t>Presentation/Outline.docx</a:t>
             </a:r>
-            <a:endParaRPr lang="en-US">
+            <a:endParaRPr lang="en-US" dirty="0">
               <a:latin typeface="Bell MT" pitchFamily="18" charset="0"/>
               <a:cs typeface="Arial" pitchFamily="34" charset="0"/>
             </a:endParaRPr>

</xml_diff>